<commit_message>
update to the powerpoint prior to pictures
</commit_message>
<xml_diff>
--- a/Turn Up The Data.pptx
+++ b/Turn Up The Data.pptx
@@ -5,18 +5,19 @@
     <p:sldMasterId id="2147483927" r:id="rId1"/>
   </p:sldMasterIdLst>
   <p:notesMasterIdLst>
-    <p:notesMasterId r:id="rId11"/>
+    <p:notesMasterId r:id="rId12"/>
   </p:notesMasterIdLst>
   <p:sldIdLst>
     <p:sldId id="256" r:id="rId2"/>
     <p:sldId id="261" r:id="rId3"/>
     <p:sldId id="262" r:id="rId4"/>
     <p:sldId id="263" r:id="rId5"/>
-    <p:sldId id="264" r:id="rId6"/>
-    <p:sldId id="265" r:id="rId7"/>
-    <p:sldId id="266" r:id="rId8"/>
-    <p:sldId id="267" r:id="rId9"/>
-    <p:sldId id="268" r:id="rId10"/>
+    <p:sldId id="269" r:id="rId6"/>
+    <p:sldId id="264" r:id="rId7"/>
+    <p:sldId id="265" r:id="rId8"/>
+    <p:sldId id="266" r:id="rId9"/>
+    <p:sldId id="267" r:id="rId10"/>
+    <p:sldId id="268" r:id="rId11"/>
   </p:sldIdLst>
   <p:sldSz cx="12192000" cy="6858000"/>
   <p:notesSz cx="6858000" cy="9144000"/>
@@ -858,6 +859,12 @@
             </a:r>
           </a:p>
           <a:p>
+            <a:r>
+              <a:rPr lang="en-US" dirty="0"/>
+              <a:t>	-explicit songs gained prevalence after 2019 (&gt;50%)</a:t>
+            </a:r>
+          </a:p>
+          <a:p>
             <a:endParaRPr lang="en-US" dirty="0"/>
           </a:p>
           <a:p>
@@ -870,6 +877,24 @@
             <a:r>
               <a:rPr lang="en-US" dirty="0"/>
               <a:t>	-genre</a:t>
+            </a:r>
+          </a:p>
+          <a:p>
+            <a:r>
+              <a:rPr lang="en-US" dirty="0"/>
+              <a:t>	-loop by year</a:t>
+            </a:r>
+          </a:p>
+          <a:p>
+            <a:r>
+              <a:rPr lang="en-US" dirty="0"/>
+              <a:t>	-unable to merge in artist data set because it was all of their songs combined instead of individual songs</a:t>
+            </a:r>
+          </a:p>
+          <a:p>
+            <a:r>
+              <a:rPr lang="en-US" dirty="0"/>
+              <a:t>	-determining sample size while trying to limit bias</a:t>
             </a:r>
           </a:p>
           <a:p>
@@ -990,7 +1015,7 @@
     </p:spTree>
     <p:extLst>
       <p:ext uri="{BB962C8B-B14F-4D97-AF65-F5344CB8AC3E}">
-        <p14:creationId xmlns:p14="http://schemas.microsoft.com/office/powerpoint/2010/main" val="3677490936"/>
+        <p14:creationId xmlns:p14="http://schemas.microsoft.com/office/powerpoint/2010/main" val="2611747033"/>
       </p:ext>
     </p:extLst>
   </p:cSld>
@@ -1074,7 +1099,7 @@
     </p:spTree>
     <p:extLst>
       <p:ext uri="{BB962C8B-B14F-4D97-AF65-F5344CB8AC3E}">
-        <p14:creationId xmlns:p14="http://schemas.microsoft.com/office/powerpoint/2010/main" val="582708718"/>
+        <p14:creationId xmlns:p14="http://schemas.microsoft.com/office/powerpoint/2010/main" val="3677490936"/>
       </p:ext>
     </p:extLst>
   </p:cSld>
@@ -1158,7 +1183,7 @@
     </p:spTree>
     <p:extLst>
       <p:ext uri="{BB962C8B-B14F-4D97-AF65-F5344CB8AC3E}">
-        <p14:creationId xmlns:p14="http://schemas.microsoft.com/office/powerpoint/2010/main" val="444601832"/>
+        <p14:creationId xmlns:p14="http://schemas.microsoft.com/office/powerpoint/2010/main" val="582708718"/>
       </p:ext>
     </p:extLst>
   </p:cSld>
@@ -1212,54 +1237,7 @@
           <a:bodyPr/>
           <a:lstStyle/>
           <a:p>
-            <a:r>
-              <a:rPr lang="en-US" b="1" dirty="0"/>
-              <a:t>Problem solving along the way: </a:t>
-            </a:r>
-          </a:p>
-          <a:p>
-            <a:r>
-              <a:rPr lang="en-US" dirty="0"/>
-              <a:t>Our approach was to split up the work load and really dive into the material individually that they had chosen or been assigned.</a:t>
-            </a:r>
-          </a:p>
-          <a:p>
-            <a:r>
-              <a:rPr lang="en-US" dirty="0"/>
-              <a:t>When people got stuck we were able to come together as a team and look through to see if we needed to adjust code, attack the data in a different way, or change the question being asked to something plausible</a:t>
-            </a:r>
-          </a:p>
-          <a:p>
-            <a:r>
-              <a:rPr lang="en-US" dirty="0"/>
-              <a:t>By approaching problems this way we were able to leverage all of our strengths into a cohesive unit and kept progress moving</a:t>
-            </a:r>
-          </a:p>
-          <a:p>
             <a:endParaRPr lang="en-US" dirty="0"/>
-          </a:p>
-          <a:p>
-            <a:r>
-              <a:rPr lang="en-US" b="1" dirty="0"/>
-              <a:t>Expanded research possibilities</a:t>
-            </a:r>
-          </a:p>
-          <a:p>
-            <a:pPr marL="0" indent="0">
-              <a:buFontTx/>
-              <a:buNone/>
-            </a:pPr>
-            <a:r>
-              <a:rPr lang="en-US" b="0" dirty="0"/>
-              <a:t>Taking the time periods leading up to and immediately following major events to see how music was altered</a:t>
-            </a:r>
-          </a:p>
-          <a:p>
-            <a:pPr marL="171450" indent="-171450">
-              <a:buFontTx/>
-              <a:buChar char="-"/>
-            </a:pPr>
-            <a:endParaRPr lang="en-US" b="1" dirty="0"/>
           </a:p>
         </p:txBody>
       </p:sp>
@@ -1289,7 +1267,7 @@
     </p:spTree>
     <p:extLst>
       <p:ext uri="{BB962C8B-B14F-4D97-AF65-F5344CB8AC3E}">
-        <p14:creationId xmlns:p14="http://schemas.microsoft.com/office/powerpoint/2010/main" val="4171389560"/>
+        <p14:creationId xmlns:p14="http://schemas.microsoft.com/office/powerpoint/2010/main" val="444601832"/>
       </p:ext>
     </p:extLst>
   </p:cSld>
@@ -1343,7 +1321,100 @@
           <a:bodyPr/>
           <a:lstStyle/>
           <a:p>
+            <a:r>
+              <a:rPr lang="en-US" b="1" dirty="0"/>
+              <a:t>Problem solving along the way: </a:t>
+            </a:r>
+          </a:p>
+          <a:p>
+            <a:r>
+              <a:rPr lang="en-US" dirty="0"/>
+              <a:t>Our approach was to split up the work load and really dive into the material individually that they had chosen or been assigned.</a:t>
+            </a:r>
+          </a:p>
+          <a:p>
+            <a:r>
+              <a:rPr lang="en-US" dirty="0"/>
+              <a:t>When people got stuck we were able to come together as a team and look through to see if we needed to adjust code, attack the data in a different way, or change the question being asked to something plausible</a:t>
+            </a:r>
+          </a:p>
+          <a:p>
+            <a:r>
+              <a:rPr lang="en-US" dirty="0"/>
+              <a:t>By approaching problems this way we were able to leverage all of our strengths into a cohesive unit and kept progress moving</a:t>
+            </a:r>
+          </a:p>
+          <a:p>
             <a:endParaRPr lang="en-US" dirty="0"/>
+          </a:p>
+          <a:p>
+            <a:r>
+              <a:rPr lang="en-US" b="1" dirty="0"/>
+              <a:t>Expanded research possibilities</a:t>
+            </a:r>
+          </a:p>
+          <a:p>
+            <a:pPr marL="0" indent="0">
+              <a:buFontTx/>
+              <a:buNone/>
+            </a:pPr>
+            <a:r>
+              <a:rPr lang="en-US" b="0" dirty="0"/>
+              <a:t>Taking the time periods leading up to and immediately following major world events to see how music was altered</a:t>
+            </a:r>
+          </a:p>
+          <a:p>
+            <a:pPr marL="0" indent="0">
+              <a:buFontTx/>
+              <a:buNone/>
+            </a:pPr>
+            <a:r>
+              <a:rPr lang="en-US" b="0" dirty="0"/>
+              <a:t>Or doing the same thing but with specific influential artists </a:t>
+            </a:r>
+            <a:r>
+              <a:rPr lang="en-US" b="0" dirty="0" err="1"/>
+              <a:t>ie</a:t>
+            </a:r>
+            <a:r>
+              <a:rPr lang="en-US" b="0" dirty="0"/>
+              <a:t>.- </a:t>
+            </a:r>
+            <a:r>
+              <a:rPr lang="en-US" b="0" dirty="0" err="1"/>
+              <a:t>beatles</a:t>
+            </a:r>
+            <a:r>
+              <a:rPr lang="en-US" b="0" dirty="0"/>
+              <a:t>, NWA, Elvis, </a:t>
+            </a:r>
+          </a:p>
+          <a:p>
+            <a:pPr marL="0" indent="0">
+              <a:buFontTx/>
+              <a:buNone/>
+            </a:pPr>
+            <a:r>
+              <a:rPr lang="en-US" b="0" dirty="0"/>
+              <a:t>Take our approach from a decade by decade approach</a:t>
+            </a:r>
+          </a:p>
+          <a:p>
+            <a:pPr marL="0" indent="0">
+              <a:buFontTx/>
+              <a:buNone/>
+            </a:pPr>
+            <a:r>
+              <a:rPr lang="en-US" b="0" dirty="0"/>
+              <a:t>Assign value ranges for genres to consolidate the genre list that is present in this dataset</a:t>
+            </a:r>
+          </a:p>
+          <a:p>
+            <a:pPr marL="0" indent="0">
+              <a:buFontTx/>
+              <a:buNone/>
+            </a:pPr>
+            <a:endParaRPr lang="en-US" b="1" dirty="0"/>
           </a:p>
         </p:txBody>
       </p:sp>
@@ -1365,6 +1436,90 @@
             <a:fld id="{3E3BB913-60C7-43E3-B2B5-53B86365DC39}" type="slidenum">
               <a:rPr lang="en-US" smtClean="0"/>
               <a:t>9</a:t>
+            </a:fld>
+            <a:endParaRPr lang="en-US"/>
+          </a:p>
+        </p:txBody>
+      </p:sp>
+    </p:spTree>
+    <p:extLst>
+      <p:ext uri="{BB962C8B-B14F-4D97-AF65-F5344CB8AC3E}">
+        <p14:creationId xmlns:p14="http://schemas.microsoft.com/office/powerpoint/2010/main" val="4171389560"/>
+      </p:ext>
+    </p:extLst>
+  </p:cSld>
+  <p:clrMapOvr>
+    <a:masterClrMapping/>
+  </p:clrMapOvr>
+</p:notes>
+</file>
+
+<file path=ppt/notesSlides/notesSlide9.xml><?xml version="1.0" encoding="utf-8"?>
+<p:notes xmlns:a="http://schemas.openxmlformats.org/drawingml/2006/main" xmlns:r="http://schemas.openxmlformats.org/officeDocument/2006/relationships" xmlns:p="http://schemas.openxmlformats.org/presentationml/2006/main">
+  <p:cSld>
+    <p:spTree>
+      <p:nvGrpSpPr>
+        <p:cNvPr id="1" name=""/>
+        <p:cNvGrpSpPr/>
+        <p:nvPr/>
+      </p:nvGrpSpPr>
+      <p:grpSpPr>
+        <a:xfrm>
+          <a:off x="0" y="0"/>
+          <a:ext cx="0" cy="0"/>
+          <a:chOff x="0" y="0"/>
+          <a:chExt cx="0" cy="0"/>
+        </a:xfrm>
+      </p:grpSpPr>
+      <p:sp>
+        <p:nvSpPr>
+          <p:cNvPr id="2" name="Slide Image Placeholder 1"/>
+          <p:cNvSpPr>
+            <a:spLocks noGrp="1" noRot="1" noChangeAspect="1"/>
+          </p:cNvSpPr>
+          <p:nvPr>
+            <p:ph type="sldImg"/>
+          </p:nvPr>
+        </p:nvSpPr>
+        <p:spPr/>
+      </p:sp>
+      <p:sp>
+        <p:nvSpPr>
+          <p:cNvPr id="3" name="Notes Placeholder 2"/>
+          <p:cNvSpPr>
+            <a:spLocks noGrp="1"/>
+          </p:cNvSpPr>
+          <p:nvPr>
+            <p:ph type="body" idx="1"/>
+          </p:nvPr>
+        </p:nvSpPr>
+        <p:spPr/>
+        <p:txBody>
+          <a:bodyPr/>
+          <a:lstStyle/>
+          <a:p>
+            <a:endParaRPr lang="en-US" dirty="0"/>
+          </a:p>
+        </p:txBody>
+      </p:sp>
+      <p:sp>
+        <p:nvSpPr>
+          <p:cNvPr id="4" name="Slide Number Placeholder 3"/>
+          <p:cNvSpPr>
+            <a:spLocks noGrp="1"/>
+          </p:cNvSpPr>
+          <p:nvPr>
+            <p:ph type="sldNum" sz="quarter" idx="5"/>
+          </p:nvPr>
+        </p:nvSpPr>
+        <p:spPr/>
+        <p:txBody>
+          <a:bodyPr/>
+          <a:lstStyle/>
+          <a:p>
+            <a:fld id="{3E3BB913-60C7-43E3-B2B5-53B86365DC39}" type="slidenum">
+              <a:rPr lang="en-US" smtClean="0"/>
+              <a:t>10</a:t>
             </a:fld>
             <a:endParaRPr lang="en-US"/>
           </a:p>
@@ -5294,6 +5449,238 @@
 </p:sld>
 </file>
 
+<file path=ppt/slides/slide10.xml><?xml version="1.0" encoding="utf-8"?>
+<p:sld xmlns:a="http://schemas.openxmlformats.org/drawingml/2006/main" xmlns:r="http://schemas.openxmlformats.org/officeDocument/2006/relationships" xmlns:p="http://schemas.openxmlformats.org/presentationml/2006/main">
+  <p:cSld>
+    <p:bg>
+      <p:bgPr>
+        <a:solidFill>
+          <a:schemeClr val="bg1"/>
+        </a:solidFill>
+        <a:effectLst/>
+      </p:bgPr>
+    </p:bg>
+    <p:spTree>
+      <p:nvGrpSpPr>
+        <p:cNvPr id="1" name=""/>
+        <p:cNvGrpSpPr/>
+        <p:nvPr/>
+      </p:nvGrpSpPr>
+      <p:grpSpPr>
+        <a:xfrm>
+          <a:off x="0" y="0"/>
+          <a:ext cx="0" cy="0"/>
+          <a:chOff x="0" y="0"/>
+          <a:chExt cx="0" cy="0"/>
+        </a:xfrm>
+      </p:grpSpPr>
+      <p:sp useBgFill="1">
+        <p:nvSpPr>
+          <p:cNvPr id="31" name="Rectangle 8">
+            <a:extLst>
+              <a:ext uri="{FF2B5EF4-FFF2-40B4-BE49-F238E27FC236}">
+                <a16:creationId xmlns:a16="http://schemas.microsoft.com/office/drawing/2014/main" id="{4AA13AD3-0A4F-475A-BEBB-DEEFF5C096C3}"/>
+              </a:ext>
+              <a:ext uri="{C183D7F6-B498-43B3-948B-1728B52AA6E4}">
+                <adec:decorative xmlns:adec="http://schemas.microsoft.com/office/drawing/2017/decorative" val="1"/>
+              </a:ext>
+            </a:extLst>
+          </p:cNvPr>
+          <p:cNvSpPr>
+            <a:spLocks noGrp="1" noRot="1" noChangeAspect="1" noMove="1" noResize="1" noEditPoints="1" noAdjustHandles="1" noChangeArrowheads="1" noChangeShapeType="1" noTextEdit="1"/>
+          </p:cNvSpPr>
+          <p:nvPr>
+            <p:extLst>
+              <p:ext uri="{386F3935-93C4-4BCD-93E2-E3B085C9AB24}">
+                <p16:designElem xmlns:p16="http://schemas.microsoft.com/office/powerpoint/2015/main" val="1"/>
+              </p:ext>
+            </p:extLst>
+          </p:nvPr>
+        </p:nvSpPr>
+        <p:spPr>
+          <a:xfrm>
+            <a:off x="-7462" y="0"/>
+            <a:ext cx="12188952" cy="6858000"/>
+          </a:xfrm>
+          <a:prstGeom prst="rect">
+            <a:avLst/>
+          </a:prstGeom>
+          <a:ln>
+            <a:noFill/>
+          </a:ln>
+        </p:spPr>
+        <p:style>
+          <a:lnRef idx="2">
+            <a:schemeClr val="accent1">
+              <a:shade val="50000"/>
+            </a:schemeClr>
+          </a:lnRef>
+          <a:fillRef idx="1">
+            <a:schemeClr val="accent1"/>
+          </a:fillRef>
+          <a:effectRef idx="0">
+            <a:schemeClr val="accent1"/>
+          </a:effectRef>
+          <a:fontRef idx="minor">
+            <a:schemeClr val="lt1"/>
+          </a:fontRef>
+        </p:style>
+        <p:txBody>
+          <a:bodyPr rtlCol="0" anchor="ctr"/>
+          <a:lstStyle/>
+          <a:p>
+            <a:pPr algn="ctr"/>
+            <a:endParaRPr lang="en-US"/>
+          </a:p>
+        </p:txBody>
+      </p:sp>
+      <p:sp>
+        <p:nvSpPr>
+          <p:cNvPr id="32" name="Rectangle 10">
+            <a:extLst>
+              <a:ext uri="{FF2B5EF4-FFF2-40B4-BE49-F238E27FC236}">
+                <a16:creationId xmlns:a16="http://schemas.microsoft.com/office/drawing/2014/main" id="{D65E0E3C-32F3-480B-9842-7611BBE2EE9F}"/>
+              </a:ext>
+              <a:ext uri="{C183D7F6-B498-43B3-948B-1728B52AA6E4}">
+                <adec:decorative xmlns:adec="http://schemas.microsoft.com/office/drawing/2017/decorative" val="1"/>
+              </a:ext>
+            </a:extLst>
+          </p:cNvPr>
+          <p:cNvSpPr>
+            <a:spLocks noGrp="1" noRot="1" noChangeAspect="1" noMove="1" noResize="1" noEditPoints="1" noAdjustHandles="1" noChangeArrowheads="1" noChangeShapeType="1" noTextEdit="1"/>
+          </p:cNvSpPr>
+          <p:nvPr>
+            <p:extLst>
+              <p:ext uri="{386F3935-93C4-4BCD-93E2-E3B085C9AB24}">
+                <p16:designElem xmlns:p16="http://schemas.microsoft.com/office/powerpoint/2015/main" val="1"/>
+              </p:ext>
+            </p:extLst>
+          </p:nvPr>
+        </p:nvSpPr>
+        <p:spPr>
+          <a:xfrm>
+            <a:off x="4657345" y="0"/>
+            <a:ext cx="7534655" cy="6858000"/>
+          </a:xfrm>
+          <a:prstGeom prst="rect">
+            <a:avLst/>
+          </a:prstGeom>
+          <a:solidFill>
+            <a:schemeClr val="tx1"/>
+          </a:solidFill>
+          <a:ln>
+            <a:noFill/>
+          </a:ln>
+        </p:spPr>
+        <p:style>
+          <a:lnRef idx="2">
+            <a:schemeClr val="accent1">
+              <a:shade val="50000"/>
+            </a:schemeClr>
+          </a:lnRef>
+          <a:fillRef idx="1">
+            <a:schemeClr val="accent1"/>
+          </a:fillRef>
+          <a:effectRef idx="0">
+            <a:schemeClr val="accent1"/>
+          </a:effectRef>
+          <a:fontRef idx="minor">
+            <a:schemeClr val="lt1"/>
+          </a:fontRef>
+        </p:style>
+        <p:txBody>
+          <a:bodyPr rtlCol="0" anchor="ctr"/>
+          <a:lstStyle/>
+          <a:p>
+            <a:pPr algn="ctr"/>
+            <a:endParaRPr lang="en-US"/>
+          </a:p>
+        </p:txBody>
+      </p:sp>
+      <p:sp>
+        <p:nvSpPr>
+          <p:cNvPr id="2" name="Title 1">
+            <a:extLst>
+              <a:ext uri="{FF2B5EF4-FFF2-40B4-BE49-F238E27FC236}">
+                <a16:creationId xmlns:a16="http://schemas.microsoft.com/office/drawing/2014/main" id="{31FFC03B-C047-4CED-95E5-A1F9374884A4}"/>
+              </a:ext>
+            </a:extLst>
+          </p:cNvPr>
+          <p:cNvSpPr>
+            <a:spLocks noGrp="1"/>
+          </p:cNvSpPr>
+          <p:nvPr>
+            <p:ph type="ctrTitle"/>
+          </p:nvPr>
+        </p:nvSpPr>
+        <p:spPr>
+          <a:xfrm>
+            <a:off x="4685807" y="0"/>
+            <a:ext cx="7495683" cy="6857999"/>
+          </a:xfrm>
+        </p:spPr>
+        <p:txBody>
+          <a:bodyPr anchor="ctr">
+            <a:normAutofit/>
+          </a:bodyPr>
+          <a:lstStyle/>
+          <a:p>
+            <a:r>
+              <a:rPr lang="en-US" sz="16000" dirty="0">
+                <a:solidFill>
+                  <a:schemeClr val="bg1"/>
+                </a:solidFill>
+              </a:rPr>
+              <a:t>Q&amp;A</a:t>
+            </a:r>
+          </a:p>
+        </p:txBody>
+      </p:sp>
+      <p:pic>
+        <p:nvPicPr>
+          <p:cNvPr id="33" name="Picture 3" descr="Audio waveform abstract on neon colors">
+            <a:extLst>
+              <a:ext uri="{FF2B5EF4-FFF2-40B4-BE49-F238E27FC236}">
+                <a16:creationId xmlns:a16="http://schemas.microsoft.com/office/drawing/2014/main" id="{03EE9E1F-3E38-4AC2-B47A-E6AA844ED669}"/>
+              </a:ext>
+            </a:extLst>
+          </p:cNvPr>
+          <p:cNvPicPr>
+            <a:picLocks noChangeAspect="1"/>
+          </p:cNvPicPr>
+          <p:nvPr/>
+        </p:nvPicPr>
+        <p:blipFill rotWithShape="1">
+          <a:blip r:embed="rId3"/>
+          <a:srcRect l="54670" r="-1" b="-1"/>
+          <a:stretch/>
+        </p:blipFill>
+        <p:spPr>
+          <a:xfrm>
+            <a:off x="10510" y="10"/>
+            <a:ext cx="4657325" cy="6857990"/>
+          </a:xfrm>
+          <a:prstGeom prst="rect">
+            <a:avLst/>
+          </a:prstGeom>
+        </p:spPr>
+      </p:pic>
+    </p:spTree>
+    <p:extLst>
+      <p:ext uri="{BB962C8B-B14F-4D97-AF65-F5344CB8AC3E}">
+        <p14:creationId xmlns:p14="http://schemas.microsoft.com/office/powerpoint/2010/main" val="2211727667"/>
+      </p:ext>
+    </p:extLst>
+  </p:cSld>
+  <p:clrMapOvr>
+    <a:masterClrMapping/>
+  </p:clrMapOvr>
+  <p:transition>
+    <p:wipe/>
+  </p:transition>
+</p:sld>
+</file>
+
 <file path=ppt/slides/slide2.xml><?xml version="1.0" encoding="utf-8"?>
 <p:sld xmlns:a="http://schemas.openxmlformats.org/drawingml/2006/main" xmlns:r="http://schemas.openxmlformats.org/officeDocument/2006/relationships" xmlns:p="http://schemas.openxmlformats.org/presentationml/2006/main">
   <p:cSld>
@@ -5849,6 +6236,150 @@
           <a:p>
             <a:r>
               <a:rPr lang="en-US" sz="5400" dirty="0"/>
+              <a:t>Our base </a:t>
+            </a:r>
+            <a:r>
+              <a:rPr lang="en-US" sz="5400" dirty="0" err="1"/>
+              <a:t>dataframe</a:t>
+            </a:r>
+            <a:endParaRPr lang="en-US" sz="5400" dirty="0"/>
+          </a:p>
+        </p:txBody>
+      </p:sp>
+      <p:sp>
+        <p:nvSpPr>
+          <p:cNvPr id="3" name="Content Placeholder 2">
+            <a:extLst>
+              <a:ext uri="{FF2B5EF4-FFF2-40B4-BE49-F238E27FC236}">
+                <a16:creationId xmlns:a16="http://schemas.microsoft.com/office/drawing/2014/main" id="{FD456E9F-06AD-4361-89B7-68735BC26226}"/>
+              </a:ext>
+            </a:extLst>
+          </p:cNvPr>
+          <p:cNvSpPr>
+            <a:spLocks noGrp="1"/>
+          </p:cNvSpPr>
+          <p:nvPr>
+            <p:ph idx="1"/>
+          </p:nvPr>
+        </p:nvSpPr>
+        <p:spPr/>
+        <p:txBody>
+          <a:bodyPr/>
+          <a:lstStyle/>
+          <a:p>
+            <a:pPr marL="514350" indent="-514350">
+              <a:buFont typeface="Wingdings" panose="05000000000000000000" pitchFamily="2" charset="2"/>
+              <a:buChar char="Ø"/>
+            </a:pPr>
+            <a:endParaRPr lang="en-US" dirty="0"/>
+          </a:p>
+        </p:txBody>
+      </p:sp>
+      <p:pic>
+        <p:nvPicPr>
+          <p:cNvPr id="1032" name="Picture 8" descr="Music notes sign Pink neon icon in the brick wall - stock vector |  Crushpixel">
+            <a:extLst>
+              <a:ext uri="{FF2B5EF4-FFF2-40B4-BE49-F238E27FC236}">
+                <a16:creationId xmlns:a16="http://schemas.microsoft.com/office/drawing/2014/main" id="{FCFF1D86-4905-429B-BDC1-BB20988244CF}"/>
+              </a:ext>
+            </a:extLst>
+          </p:cNvPr>
+          <p:cNvPicPr>
+            <a:picLocks noChangeAspect="1" noChangeArrowheads="1"/>
+          </p:cNvPicPr>
+          <p:nvPr/>
+        </p:nvPicPr>
+        <p:blipFill>
+          <a:blip r:embed="rId3">
+            <a:extLst>
+              <a:ext uri="{28A0092B-C50C-407E-A947-70E740481C1C}">
+                <a14:useLocalDpi xmlns:a14="http://schemas.microsoft.com/office/drawing/2010/main" val="0"/>
+              </a:ext>
+            </a:extLst>
+          </a:blip>
+          <a:srcRect/>
+          <a:stretch>
+            <a:fillRect/>
+          </a:stretch>
+        </p:blipFill>
+        <p:spPr bwMode="auto">
+          <a:xfrm>
+            <a:off x="9559637" y="0"/>
+            <a:ext cx="2632364" cy="2216727"/>
+          </a:xfrm>
+          <a:prstGeom prst="rect">
+            <a:avLst/>
+          </a:prstGeom>
+          <a:noFill/>
+          <a:extLst>
+            <a:ext uri="{909E8E84-426E-40DD-AFC4-6F175D3DCCD1}">
+              <a14:hiddenFill xmlns:a14="http://schemas.microsoft.com/office/drawing/2010/main">
+                <a:solidFill>
+                  <a:srgbClr val="FFFFFF"/>
+                </a:solidFill>
+              </a14:hiddenFill>
+            </a:ext>
+          </a:extLst>
+        </p:spPr>
+      </p:pic>
+    </p:spTree>
+    <p:extLst>
+      <p:ext uri="{BB962C8B-B14F-4D97-AF65-F5344CB8AC3E}">
+        <p14:creationId xmlns:p14="http://schemas.microsoft.com/office/powerpoint/2010/main" val="3641392357"/>
+      </p:ext>
+    </p:extLst>
+  </p:cSld>
+  <p:clrMapOvr>
+    <a:masterClrMapping/>
+  </p:clrMapOvr>
+  <p:transition>
+    <p:wipe/>
+  </p:transition>
+</p:sld>
+</file>
+
+<file path=ppt/slides/slide6.xml><?xml version="1.0" encoding="utf-8"?>
+<p:sld xmlns:a="http://schemas.openxmlformats.org/drawingml/2006/main" xmlns:r="http://schemas.openxmlformats.org/officeDocument/2006/relationships" xmlns:p="http://schemas.openxmlformats.org/presentationml/2006/main">
+  <p:cSld>
+    <p:spTree>
+      <p:nvGrpSpPr>
+        <p:cNvPr id="1" name=""/>
+        <p:cNvGrpSpPr/>
+        <p:nvPr/>
+      </p:nvGrpSpPr>
+      <p:grpSpPr>
+        <a:xfrm>
+          <a:off x="0" y="0"/>
+          <a:ext cx="0" cy="0"/>
+          <a:chOff x="0" y="0"/>
+          <a:chExt cx="0" cy="0"/>
+        </a:xfrm>
+      </p:grpSpPr>
+      <p:sp>
+        <p:nvSpPr>
+          <p:cNvPr id="2" name="Title 1">
+            <a:extLst>
+              <a:ext uri="{FF2B5EF4-FFF2-40B4-BE49-F238E27FC236}">
+                <a16:creationId xmlns:a16="http://schemas.microsoft.com/office/drawing/2014/main" id="{FE04FC5D-740C-495D-BE03-23B345B8902E}"/>
+              </a:ext>
+            </a:extLst>
+          </p:cNvPr>
+          <p:cNvSpPr>
+            <a:spLocks noGrp="1"/>
+          </p:cNvSpPr>
+          <p:nvPr>
+            <p:ph type="title"/>
+          </p:nvPr>
+        </p:nvSpPr>
+        <p:spPr/>
+        <p:txBody>
+          <a:bodyPr anchor="ctr">
+            <a:normAutofit/>
+          </a:bodyPr>
+          <a:lstStyle/>
+          <a:p>
+            <a:r>
+              <a:rPr lang="en-US" sz="5400" dirty="0"/>
               <a:t>Data Analysis</a:t>
             </a:r>
           </a:p>
@@ -5942,7 +6473,7 @@
 </p:sld>
 </file>
 
-<file path=ppt/slides/slide6.xml><?xml version="1.0" encoding="utf-8"?>
+<file path=ppt/slides/slide7.xml><?xml version="1.0" encoding="utf-8"?>
 <p:sld xmlns:a="http://schemas.openxmlformats.org/drawingml/2006/main" xmlns:r="http://schemas.openxmlformats.org/officeDocument/2006/relationships" xmlns:p="http://schemas.openxmlformats.org/presentationml/2006/main">
   <p:cSld>
     <p:spTree>
@@ -6077,7 +6608,7 @@
 </p:sld>
 </file>
 
-<file path=ppt/slides/slide7.xml><?xml version="1.0" encoding="utf-8"?>
+<file path=ppt/slides/slide8.xml><?xml version="1.0" encoding="utf-8"?>
 <p:sld xmlns:a="http://schemas.openxmlformats.org/drawingml/2006/main" xmlns:r="http://schemas.openxmlformats.org/officeDocument/2006/relationships" xmlns:p="http://schemas.openxmlformats.org/presentationml/2006/main">
   <p:cSld>
     <p:spTree>
@@ -6212,7 +6743,7 @@
 </p:sld>
 </file>
 
-<file path=ppt/slides/slide8.xml><?xml version="1.0" encoding="utf-8"?>
+<file path=ppt/slides/slide9.xml><?xml version="1.0" encoding="utf-8"?>
 <p:sld xmlns:a="http://schemas.openxmlformats.org/drawingml/2006/main" xmlns:r="http://schemas.openxmlformats.org/officeDocument/2006/relationships" xmlns:p="http://schemas.openxmlformats.org/presentationml/2006/main">
   <p:cSld>
     <p:spTree>
@@ -6352,238 +6883,6 @@
     <p:extLst>
       <p:ext uri="{BB962C8B-B14F-4D97-AF65-F5344CB8AC3E}">
         <p14:creationId xmlns:p14="http://schemas.microsoft.com/office/powerpoint/2010/main" val="1392541458"/>
-      </p:ext>
-    </p:extLst>
-  </p:cSld>
-  <p:clrMapOvr>
-    <a:masterClrMapping/>
-  </p:clrMapOvr>
-  <p:transition>
-    <p:wipe/>
-  </p:transition>
-</p:sld>
-</file>
-
-<file path=ppt/slides/slide9.xml><?xml version="1.0" encoding="utf-8"?>
-<p:sld xmlns:a="http://schemas.openxmlformats.org/drawingml/2006/main" xmlns:r="http://schemas.openxmlformats.org/officeDocument/2006/relationships" xmlns:p="http://schemas.openxmlformats.org/presentationml/2006/main">
-  <p:cSld>
-    <p:bg>
-      <p:bgPr>
-        <a:solidFill>
-          <a:schemeClr val="bg1"/>
-        </a:solidFill>
-        <a:effectLst/>
-      </p:bgPr>
-    </p:bg>
-    <p:spTree>
-      <p:nvGrpSpPr>
-        <p:cNvPr id="1" name=""/>
-        <p:cNvGrpSpPr/>
-        <p:nvPr/>
-      </p:nvGrpSpPr>
-      <p:grpSpPr>
-        <a:xfrm>
-          <a:off x="0" y="0"/>
-          <a:ext cx="0" cy="0"/>
-          <a:chOff x="0" y="0"/>
-          <a:chExt cx="0" cy="0"/>
-        </a:xfrm>
-      </p:grpSpPr>
-      <p:sp useBgFill="1">
-        <p:nvSpPr>
-          <p:cNvPr id="31" name="Rectangle 8">
-            <a:extLst>
-              <a:ext uri="{FF2B5EF4-FFF2-40B4-BE49-F238E27FC236}">
-                <a16:creationId xmlns:a16="http://schemas.microsoft.com/office/drawing/2014/main" id="{4AA13AD3-0A4F-475A-BEBB-DEEFF5C096C3}"/>
-              </a:ext>
-              <a:ext uri="{C183D7F6-B498-43B3-948B-1728B52AA6E4}">
-                <adec:decorative xmlns:adec="http://schemas.microsoft.com/office/drawing/2017/decorative" val="1"/>
-              </a:ext>
-            </a:extLst>
-          </p:cNvPr>
-          <p:cNvSpPr>
-            <a:spLocks noGrp="1" noRot="1" noChangeAspect="1" noMove="1" noResize="1" noEditPoints="1" noAdjustHandles="1" noChangeArrowheads="1" noChangeShapeType="1" noTextEdit="1"/>
-          </p:cNvSpPr>
-          <p:nvPr>
-            <p:extLst>
-              <p:ext uri="{386F3935-93C4-4BCD-93E2-E3B085C9AB24}">
-                <p16:designElem xmlns:p16="http://schemas.microsoft.com/office/powerpoint/2015/main" val="1"/>
-              </p:ext>
-            </p:extLst>
-          </p:nvPr>
-        </p:nvSpPr>
-        <p:spPr>
-          <a:xfrm>
-            <a:off x="-7462" y="0"/>
-            <a:ext cx="12188952" cy="6858000"/>
-          </a:xfrm>
-          <a:prstGeom prst="rect">
-            <a:avLst/>
-          </a:prstGeom>
-          <a:ln>
-            <a:noFill/>
-          </a:ln>
-        </p:spPr>
-        <p:style>
-          <a:lnRef idx="2">
-            <a:schemeClr val="accent1">
-              <a:shade val="50000"/>
-            </a:schemeClr>
-          </a:lnRef>
-          <a:fillRef idx="1">
-            <a:schemeClr val="accent1"/>
-          </a:fillRef>
-          <a:effectRef idx="0">
-            <a:schemeClr val="accent1"/>
-          </a:effectRef>
-          <a:fontRef idx="minor">
-            <a:schemeClr val="lt1"/>
-          </a:fontRef>
-        </p:style>
-        <p:txBody>
-          <a:bodyPr rtlCol="0" anchor="ctr"/>
-          <a:lstStyle/>
-          <a:p>
-            <a:pPr algn="ctr"/>
-            <a:endParaRPr lang="en-US"/>
-          </a:p>
-        </p:txBody>
-      </p:sp>
-      <p:sp>
-        <p:nvSpPr>
-          <p:cNvPr id="32" name="Rectangle 10">
-            <a:extLst>
-              <a:ext uri="{FF2B5EF4-FFF2-40B4-BE49-F238E27FC236}">
-                <a16:creationId xmlns:a16="http://schemas.microsoft.com/office/drawing/2014/main" id="{D65E0E3C-32F3-480B-9842-7611BBE2EE9F}"/>
-              </a:ext>
-              <a:ext uri="{C183D7F6-B498-43B3-948B-1728B52AA6E4}">
-                <adec:decorative xmlns:adec="http://schemas.microsoft.com/office/drawing/2017/decorative" val="1"/>
-              </a:ext>
-            </a:extLst>
-          </p:cNvPr>
-          <p:cNvSpPr>
-            <a:spLocks noGrp="1" noRot="1" noChangeAspect="1" noMove="1" noResize="1" noEditPoints="1" noAdjustHandles="1" noChangeArrowheads="1" noChangeShapeType="1" noTextEdit="1"/>
-          </p:cNvSpPr>
-          <p:nvPr>
-            <p:extLst>
-              <p:ext uri="{386F3935-93C4-4BCD-93E2-E3B085C9AB24}">
-                <p16:designElem xmlns:p16="http://schemas.microsoft.com/office/powerpoint/2015/main" val="1"/>
-              </p:ext>
-            </p:extLst>
-          </p:nvPr>
-        </p:nvSpPr>
-        <p:spPr>
-          <a:xfrm>
-            <a:off x="4657345" y="0"/>
-            <a:ext cx="7534655" cy="6858000"/>
-          </a:xfrm>
-          <a:prstGeom prst="rect">
-            <a:avLst/>
-          </a:prstGeom>
-          <a:solidFill>
-            <a:schemeClr val="tx1"/>
-          </a:solidFill>
-          <a:ln>
-            <a:noFill/>
-          </a:ln>
-        </p:spPr>
-        <p:style>
-          <a:lnRef idx="2">
-            <a:schemeClr val="accent1">
-              <a:shade val="50000"/>
-            </a:schemeClr>
-          </a:lnRef>
-          <a:fillRef idx="1">
-            <a:schemeClr val="accent1"/>
-          </a:fillRef>
-          <a:effectRef idx="0">
-            <a:schemeClr val="accent1"/>
-          </a:effectRef>
-          <a:fontRef idx="minor">
-            <a:schemeClr val="lt1"/>
-          </a:fontRef>
-        </p:style>
-        <p:txBody>
-          <a:bodyPr rtlCol="0" anchor="ctr"/>
-          <a:lstStyle/>
-          <a:p>
-            <a:pPr algn="ctr"/>
-            <a:endParaRPr lang="en-US"/>
-          </a:p>
-        </p:txBody>
-      </p:sp>
-      <p:sp>
-        <p:nvSpPr>
-          <p:cNvPr id="2" name="Title 1">
-            <a:extLst>
-              <a:ext uri="{FF2B5EF4-FFF2-40B4-BE49-F238E27FC236}">
-                <a16:creationId xmlns:a16="http://schemas.microsoft.com/office/drawing/2014/main" id="{31FFC03B-C047-4CED-95E5-A1F9374884A4}"/>
-              </a:ext>
-            </a:extLst>
-          </p:cNvPr>
-          <p:cNvSpPr>
-            <a:spLocks noGrp="1"/>
-          </p:cNvSpPr>
-          <p:nvPr>
-            <p:ph type="ctrTitle"/>
-          </p:nvPr>
-        </p:nvSpPr>
-        <p:spPr>
-          <a:xfrm>
-            <a:off x="4685807" y="0"/>
-            <a:ext cx="7495683" cy="6857999"/>
-          </a:xfrm>
-        </p:spPr>
-        <p:txBody>
-          <a:bodyPr anchor="ctr">
-            <a:normAutofit/>
-          </a:bodyPr>
-          <a:lstStyle/>
-          <a:p>
-            <a:r>
-              <a:rPr lang="en-US" sz="16000" dirty="0">
-                <a:solidFill>
-                  <a:schemeClr val="bg1"/>
-                </a:solidFill>
-              </a:rPr>
-              <a:t>Q&amp;A</a:t>
-            </a:r>
-          </a:p>
-        </p:txBody>
-      </p:sp>
-      <p:pic>
-        <p:nvPicPr>
-          <p:cNvPr id="33" name="Picture 3" descr="Audio waveform abstract on neon colors">
-            <a:extLst>
-              <a:ext uri="{FF2B5EF4-FFF2-40B4-BE49-F238E27FC236}">
-                <a16:creationId xmlns:a16="http://schemas.microsoft.com/office/drawing/2014/main" id="{03EE9E1F-3E38-4AC2-B47A-E6AA844ED669}"/>
-              </a:ext>
-            </a:extLst>
-          </p:cNvPr>
-          <p:cNvPicPr>
-            <a:picLocks noChangeAspect="1"/>
-          </p:cNvPicPr>
-          <p:nvPr/>
-        </p:nvPicPr>
-        <p:blipFill rotWithShape="1">
-          <a:blip r:embed="rId3"/>
-          <a:srcRect l="54670" r="-1" b="-1"/>
-          <a:stretch/>
-        </p:blipFill>
-        <p:spPr>
-          <a:xfrm>
-            <a:off x="10510" y="10"/>
-            <a:ext cx="4657325" cy="6857990"/>
-          </a:xfrm>
-          <a:prstGeom prst="rect">
-            <a:avLst/>
-          </a:prstGeom>
-        </p:spPr>
-      </p:pic>
-    </p:spTree>
-    <p:extLst>
-      <p:ext uri="{BB962C8B-B14F-4D97-AF65-F5344CB8AC3E}">
-        <p14:creationId xmlns:p14="http://schemas.microsoft.com/office/powerpoint/2010/main" val="2211727667"/>
       </p:ext>
     </p:extLst>
   </p:cSld>

</xml_diff>

<commit_message>
added initial analysis and base dataframe
</commit_message>
<xml_diff>
--- a/Turn Up The Data.pptx
+++ b/Turn Up The Data.pptx
@@ -1069,6 +1069,130 @@
           <a:bodyPr/>
           <a:lstStyle/>
           <a:p>
+            <a:pPr algn="l"/>
+            <a:r>
+              <a:rPr lang="en-US" b="1" i="0" dirty="0">
+                <a:solidFill>
+                  <a:srgbClr val="1D1C1D"/>
+                </a:solidFill>
+                <a:effectLst/>
+                <a:latin typeface="Monaco"/>
+              </a:rPr>
+              <a:t>##Tempo</a:t>
+            </a:r>
+          </a:p>
+          <a:p>
+            <a:pPr algn="l"/>
+            <a:r>
+              <a:rPr lang="en-US" b="0" i="0" dirty="0">
+                <a:solidFill>
+                  <a:srgbClr val="1D1C1D"/>
+                </a:solidFill>
+                <a:effectLst/>
+                <a:latin typeface="Monaco"/>
+              </a:rPr>
+              <a:t>The tempo of popular songs has primarily increased as time has gone one. This is almost certainly due to the invention and subsequent success of popular genres (in their more or less respective order of invention) Rock, Dance (which evolved from Disco when it absorbed some of the more muscular qualities of rock music) and Hip-Hop. Often made to be played loud in public spaces (concerts, clubs, shopping malls, etc..) these genres rely on beats, rhythms and vocals to fill in the empty spaces. Today’s most popular songs are very often the ones that keep going and keep listeners moving as well.</a:t>
+            </a:r>
+          </a:p>
+          <a:p>
+            <a:pPr algn="l"/>
+            <a:r>
+              <a:rPr lang="en-US" b="0" i="0" dirty="0">
+                <a:solidFill>
+                  <a:srgbClr val="1D1C1D"/>
+                </a:solidFill>
+                <a:effectLst/>
+                <a:latin typeface="Monaco"/>
+              </a:rPr>
+              <a:t>​</a:t>
+            </a:r>
+          </a:p>
+          <a:p>
+            <a:pPr algn="l"/>
+            <a:r>
+              <a:rPr lang="en-US" b="1" i="0" dirty="0">
+                <a:solidFill>
+                  <a:srgbClr val="1D1C1D"/>
+                </a:solidFill>
+                <a:effectLst/>
+                <a:latin typeface="Monaco"/>
+              </a:rPr>
+              <a:t>##Acousticness</a:t>
+            </a:r>
+          </a:p>
+          <a:p>
+            <a:pPr algn="l"/>
+            <a:r>
+              <a:rPr lang="en-US" b="0" i="0" dirty="0">
+                <a:solidFill>
+                  <a:srgbClr val="1D1C1D"/>
+                </a:solidFill>
+                <a:effectLst/>
+                <a:latin typeface="Monaco"/>
+              </a:rPr>
+              <a:t>The similarity between the graphs for both most popular and least popular songs by </a:t>
+            </a:r>
+            <a:r>
+              <a:rPr lang="en-US" b="0" i="0" dirty="0" err="1">
+                <a:solidFill>
+                  <a:srgbClr val="1D1C1D"/>
+                </a:solidFill>
+                <a:effectLst/>
+                <a:latin typeface="Monaco"/>
+              </a:rPr>
+              <a:t>Acousticness</a:t>
+            </a:r>
+            <a:r>
+              <a:rPr lang="en-US" b="0" i="0" dirty="0">
+                <a:solidFill>
+                  <a:srgbClr val="1D1C1D"/>
+                </a:solidFill>
+                <a:effectLst/>
+                <a:latin typeface="Monaco"/>
+              </a:rPr>
+              <a:t> speaks towards the decrease in popularity of acoustic instrumentation in contemporary popular music. A far-cry from the audience that sparked a now legendary near-riot when Dylan went electric in 1965 at the Newport Folk Festival, today’s listeners show a clear preference towards songs with electric/electronic instrumentation. Acoustic vs electric/electronic is now more of a matter of choice for musicians, and the meaning of sounds has thus changed over time. To most contemporary listeners, acoustic instrumentation often sets the expectation that a song or album will be of the more introspective singer/songwriter variety (think John Mayer or Sufjan Stevens) and very likely “sad”. With this in mind, it should not come to a surprise that listeners looking to lift their spirits during the Pandemic seem to have been drawn more towards less Acoustic music. </a:t>
+            </a:r>
+          </a:p>
+          <a:p>
+            <a:pPr algn="l"/>
+            <a:r>
+              <a:rPr lang="en-US" b="0" i="0" dirty="0">
+                <a:solidFill>
+                  <a:srgbClr val="1D1C1D"/>
+                </a:solidFill>
+                <a:effectLst/>
+                <a:latin typeface="Monaco"/>
+              </a:rPr>
+              <a:t>​</a:t>
+            </a:r>
+          </a:p>
+          <a:p>
+            <a:pPr algn="l"/>
+            <a:r>
+              <a:rPr lang="en-US" b="1" i="0" dirty="0">
+                <a:solidFill>
+                  <a:srgbClr val="1D1C1D"/>
+                </a:solidFill>
+                <a:effectLst/>
+                <a:latin typeface="Monaco"/>
+              </a:rPr>
+              <a:t>##Danceability</a:t>
+            </a:r>
+          </a:p>
+          <a:p>
+            <a:pPr algn="l"/>
+            <a:r>
+              <a:rPr lang="en-US" b="0" i="0" dirty="0">
+                <a:solidFill>
+                  <a:srgbClr val="1D1C1D"/>
+                </a:solidFill>
+                <a:effectLst/>
+                <a:latin typeface="Monaco"/>
+              </a:rPr>
+              <a:t>This is one that has stayed varied consistently over time, with less extreme popularity swings as we near the present day. One of primary reason’s for pop music’s existence has always been to get bodies to the dance floor, so it makes sense that this is a reliable variant. The sudden increase towards 2020 is somewhat surprising at first glance given international lockdown measures, but less so when one considers that many socially distanced listeners are/were very likely trying to make themselves feel as if are still at “the party” in some capacity.</a:t>
+            </a:r>
+          </a:p>
+          <a:p>
             <a:endParaRPr lang="en-US" dirty="0"/>
           </a:p>
         </p:txBody>
@@ -1152,6 +1276,196 @@
         <p:txBody>
           <a:bodyPr/>
           <a:lstStyle/>
+          <a:p>
+            <a:pPr algn="l"/>
+            <a:r>
+              <a:rPr lang="en-US" b="1" i="0" dirty="0">
+                <a:solidFill>
+                  <a:srgbClr val="1D1C1D"/>
+                </a:solidFill>
+                <a:effectLst/>
+                <a:latin typeface="Monaco"/>
+              </a:rPr>
+              <a:t>##Duration</a:t>
+            </a:r>
+          </a:p>
+          <a:p>
+            <a:pPr algn="l"/>
+            <a:r>
+              <a:rPr lang="en-US" b="0" i="0" dirty="0">
+                <a:solidFill>
+                  <a:srgbClr val="1D1C1D"/>
+                </a:solidFill>
+                <a:effectLst/>
+                <a:latin typeface="Monaco"/>
+              </a:rPr>
+              <a:t>Like Danceability, this one has held steady over time. What was once dictated by a track’s ability to fit on a record or play on the radio between ad breaks has been solidified by the average listener’s attention span as well. It’s not unheard of for longer suite-style rock songs (</a:t>
+            </a:r>
+            <a:r>
+              <a:rPr lang="en-US" b="0" i="1" dirty="0">
+                <a:solidFill>
+                  <a:srgbClr val="1D1C1D"/>
+                </a:solidFill>
+                <a:effectLst/>
+                <a:latin typeface="Monaco"/>
+              </a:rPr>
+              <a:t>*Bohemian Rhapsody*</a:t>
+            </a:r>
+            <a:r>
+              <a:rPr lang="en-US" b="0" i="0" dirty="0">
+                <a:solidFill>
+                  <a:srgbClr val="1D1C1D"/>
+                </a:solidFill>
+                <a:effectLst/>
+                <a:latin typeface="Monaco"/>
+              </a:rPr>
+              <a:t> will never die) or extended dance remixes to find success, but the three-to-five minute pop song is virtually as old as the Music Industry and is not going anywhere.</a:t>
+            </a:r>
+          </a:p>
+          <a:p>
+            <a:pPr algn="l"/>
+            <a:r>
+              <a:rPr lang="en-US" b="0" i="0" dirty="0">
+                <a:solidFill>
+                  <a:srgbClr val="1D1C1D"/>
+                </a:solidFill>
+                <a:effectLst/>
+                <a:latin typeface="Monaco"/>
+              </a:rPr>
+              <a:t>​</a:t>
+            </a:r>
+          </a:p>
+          <a:p>
+            <a:pPr algn="l"/>
+            <a:r>
+              <a:rPr lang="en-US" b="1" i="0" dirty="0">
+                <a:solidFill>
+                  <a:srgbClr val="1D1C1D"/>
+                </a:solidFill>
+                <a:effectLst/>
+                <a:latin typeface="Monaco"/>
+              </a:rPr>
+              <a:t>##Energy</a:t>
+            </a:r>
+          </a:p>
+          <a:p>
+            <a:pPr algn="l"/>
+            <a:r>
+              <a:rPr lang="en-US" b="0" i="0" dirty="0">
+                <a:solidFill>
+                  <a:srgbClr val="1D1C1D"/>
+                </a:solidFill>
+                <a:effectLst/>
+                <a:latin typeface="Monaco"/>
+              </a:rPr>
+              <a:t>Popular music has become more energetic as time has gone on. This increase very likely has more to do with the capabilities and innovation of modern instruments. Electric and electronic instrumentation have allowed artists to exponentially increase the energy, and listeners and dance floors have been eager to keep up.</a:t>
+            </a:r>
+          </a:p>
+          <a:p>
+            <a:pPr algn="l"/>
+            <a:r>
+              <a:rPr lang="en-US" b="1" i="0" dirty="0">
+                <a:solidFill>
+                  <a:srgbClr val="1D1C1D"/>
+                </a:solidFill>
+                <a:effectLst/>
+                <a:latin typeface="Monaco"/>
+              </a:rPr>
+              <a:t>​</a:t>
+            </a:r>
+          </a:p>
+          <a:p>
+            <a:pPr algn="l"/>
+            <a:r>
+              <a:rPr lang="en-US" b="1" i="0" dirty="0">
+                <a:solidFill>
+                  <a:srgbClr val="1D1C1D"/>
+                </a:solidFill>
+                <a:effectLst/>
+                <a:latin typeface="Monaco"/>
+              </a:rPr>
+              <a:t>##Explicitness</a:t>
+            </a:r>
+          </a:p>
+          <a:p>
+            <a:pPr algn="l"/>
+            <a:r>
+              <a:rPr lang="en-US" b="0" i="0" dirty="0">
+                <a:solidFill>
+                  <a:srgbClr val="1D1C1D"/>
+                </a:solidFill>
+                <a:effectLst/>
+                <a:latin typeface="Monaco"/>
+              </a:rPr>
+              <a:t>The popularity of explicit songs has increased over time as well. They used to be basically non-existent, but cultural standards (particularly around the late ‘60s) began to loosen in relation to what was allowed on disc. Where making a song that couldn’t be played on the radio was once a deal-breaker for many artists, the largely streaming-based nature of most music (and the perpetually near-impossible nature of actually getting a song on the radio) now makes the decision of how explicit a song should be less relevant to many artists. This gives them significantly more freedom.</a:t>
+            </a:r>
+          </a:p>
+          <a:p>
+            <a:pPr algn="l"/>
+            <a:r>
+              <a:rPr lang="en-US" b="0" i="0" dirty="0">
+                <a:solidFill>
+                  <a:srgbClr val="1D1C1D"/>
+                </a:solidFill>
+                <a:effectLst/>
+                <a:latin typeface="Monaco"/>
+              </a:rPr>
+              <a:t>​</a:t>
+            </a:r>
+          </a:p>
+          <a:p>
+            <a:pPr algn="l"/>
+            <a:r>
+              <a:rPr lang="en-US" b="0" i="0" dirty="0">
+                <a:solidFill>
+                  <a:srgbClr val="1D1C1D"/>
+                </a:solidFill>
+                <a:effectLst/>
+                <a:latin typeface="Monaco"/>
+              </a:rPr>
+              <a:t>And most listeners do not seem put off by the explicit nature of popular songs. Just like popular cable shows like </a:t>
+            </a:r>
+            <a:r>
+              <a:rPr lang="en-US" b="0" i="1" dirty="0">
+                <a:solidFill>
+                  <a:srgbClr val="1D1C1D"/>
+                </a:solidFill>
+                <a:effectLst/>
+                <a:latin typeface="Monaco"/>
+              </a:rPr>
+              <a:t>*The Sopranos*</a:t>
+            </a:r>
+            <a:r>
+              <a:rPr lang="en-US" b="0" i="0" dirty="0">
+                <a:solidFill>
+                  <a:srgbClr val="1D1C1D"/>
+                </a:solidFill>
+                <a:effectLst/>
+                <a:latin typeface="Monaco"/>
+              </a:rPr>
+              <a:t> and </a:t>
+            </a:r>
+            <a:r>
+              <a:rPr lang="en-US" b="0" i="1" dirty="0">
+                <a:solidFill>
+                  <a:srgbClr val="1D1C1D"/>
+                </a:solidFill>
+                <a:effectLst/>
+                <a:latin typeface="Monaco"/>
+              </a:rPr>
+              <a:t>*Game of Thrones*</a:t>
+            </a:r>
+            <a:r>
+              <a:rPr lang="en-US" b="0" i="0" dirty="0">
+                <a:solidFill>
+                  <a:srgbClr val="1D1C1D"/>
+                </a:solidFill>
+                <a:effectLst/>
+                <a:latin typeface="Monaco"/>
+              </a:rPr>
+              <a:t> offer viewers with “premium” content often more explicit than what they can see in movie theaters, occasional explicit words or themes can remind listeners that they are getting their money’s worth over the same handful of “clean edits” that make their way into popular radio rotation.</a:t>
+            </a:r>
+          </a:p>
           <a:p>
             <a:endParaRPr lang="en-US" dirty="0"/>
           </a:p>
@@ -6246,35 +6560,35 @@
           </a:p>
         </p:txBody>
       </p:sp>
-      <p:sp>
-        <p:nvSpPr>
-          <p:cNvPr id="3" name="Content Placeholder 2">
-            <a:extLst>
-              <a:ext uri="{FF2B5EF4-FFF2-40B4-BE49-F238E27FC236}">
-                <a16:creationId xmlns:a16="http://schemas.microsoft.com/office/drawing/2014/main" id="{FD456E9F-06AD-4361-89B7-68735BC26226}"/>
-              </a:ext>
-            </a:extLst>
-          </p:cNvPr>
-          <p:cNvSpPr>
-            <a:spLocks noGrp="1"/>
-          </p:cNvSpPr>
+      <p:pic>
+        <p:nvPicPr>
+          <p:cNvPr id="5" name="Content Placeholder 4">
+            <a:extLst>
+              <a:ext uri="{FF2B5EF4-FFF2-40B4-BE49-F238E27FC236}">
+                <a16:creationId xmlns:a16="http://schemas.microsoft.com/office/drawing/2014/main" id="{F2563ABE-E41A-46D9-97CC-35C431BDCF27}"/>
+              </a:ext>
+            </a:extLst>
+          </p:cNvPr>
+          <p:cNvPicPr>
+            <a:picLocks noGrp="1" noChangeAspect="1"/>
+          </p:cNvPicPr>
           <p:nvPr>
             <p:ph idx="1"/>
           </p:nvPr>
-        </p:nvSpPr>
-        <p:spPr/>
-        <p:txBody>
-          <a:bodyPr/>
-          <a:lstStyle/>
-          <a:p>
-            <a:pPr marL="514350" indent="-514350">
-              <a:buFont typeface="Wingdings" panose="05000000000000000000" pitchFamily="2" charset="2"/>
-              <a:buChar char="Ø"/>
-            </a:pPr>
-            <a:endParaRPr lang="en-US" dirty="0"/>
-          </a:p>
-        </p:txBody>
-      </p:sp>
+        </p:nvPicPr>
+        <p:blipFill>
+          <a:blip r:embed="rId3"/>
+          <a:stretch>
+            <a:fillRect/>
+          </a:stretch>
+        </p:blipFill>
+        <p:spPr>
+          <a:xfrm>
+            <a:off x="545432" y="2637640"/>
+            <a:ext cx="11035495" cy="3474401"/>
+          </a:xfrm>
+        </p:spPr>
+      </p:pic>
       <p:pic>
         <p:nvPicPr>
           <p:cNvPr id="1032" name="Picture 8" descr="Music notes sign Pink neon icon in the brick wall - stock vector |  Crushpixel">
@@ -6290,7 +6604,7 @@
           <p:nvPr/>
         </p:nvPicPr>
         <p:blipFill>
-          <a:blip r:embed="rId3">
+          <a:blip r:embed="rId4">
             <a:extLst>
               <a:ext uri="{28A0092B-C50C-407E-A947-70E740481C1C}">
                 <a14:useLocalDpi xmlns:a14="http://schemas.microsoft.com/office/drawing/2010/main" val="0"/>
@@ -6406,7 +6720,35 @@
           <a:bodyPr/>
           <a:lstStyle/>
           <a:p>
+            <a:pPr marL="457200" indent="-457200">
+              <a:buFont typeface="Wingdings" panose="05000000000000000000" pitchFamily="2" charset="2"/>
+              <a:buChar char="Ø"/>
+            </a:pPr>
+            <a:r>
+              <a:rPr lang="en-US" dirty="0"/>
+              <a:t>Tempo</a:t>
+            </a:r>
+          </a:p>
+          <a:p>
+            <a:pPr marL="457200" indent="-457200">
+              <a:buFont typeface="Wingdings" panose="05000000000000000000" pitchFamily="2" charset="2"/>
+              <a:buChar char="Ø"/>
+            </a:pPr>
+            <a:r>
+              <a:rPr lang="en-US" dirty="0" err="1"/>
+              <a:t>Accousticness</a:t>
+            </a:r>
             <a:endParaRPr lang="en-US" dirty="0"/>
+          </a:p>
+          <a:p>
+            <a:pPr marL="457200" indent="-457200">
+              <a:buFont typeface="Wingdings" panose="05000000000000000000" pitchFamily="2" charset="2"/>
+              <a:buChar char="Ø"/>
+            </a:pPr>
+            <a:r>
+              <a:rPr lang="en-US" dirty="0"/>
+              <a:t>Danceability</a:t>
+            </a:r>
           </a:p>
         </p:txBody>
       </p:sp>
@@ -6541,7 +6883,34 @@
           <a:bodyPr/>
           <a:lstStyle/>
           <a:p>
-            <a:endParaRPr lang="en-US" dirty="0"/>
+            <a:pPr marL="457200" indent="-457200">
+              <a:buFont typeface="Wingdings" panose="05000000000000000000" pitchFamily="2" charset="2"/>
+              <a:buChar char="Ø"/>
+            </a:pPr>
+            <a:r>
+              <a:rPr lang="en-US" dirty="0"/>
+              <a:t>Duration</a:t>
+            </a:r>
+          </a:p>
+          <a:p>
+            <a:pPr marL="457200" indent="-457200">
+              <a:buFont typeface="Wingdings" panose="05000000000000000000" pitchFamily="2" charset="2"/>
+              <a:buChar char="Ø"/>
+            </a:pPr>
+            <a:r>
+              <a:rPr lang="en-US" dirty="0"/>
+              <a:t>Energy</a:t>
+            </a:r>
+          </a:p>
+          <a:p>
+            <a:pPr marL="457200" indent="-457200">
+              <a:buFont typeface="Wingdings" panose="05000000000000000000" pitchFamily="2" charset="2"/>
+              <a:buChar char="Ø"/>
+            </a:pPr>
+            <a:r>
+              <a:rPr lang="en-US" dirty="0"/>
+              <a:t>Explicitness</a:t>
+            </a:r>
           </a:p>
         </p:txBody>
       </p:sp>

</xml_diff>

<commit_message>
completed presentation slides - just need to update notes
</commit_message>
<xml_diff>
--- a/Turn Up The Data.pptx
+++ b/Turn Up The Data.pptx
@@ -5,7 +5,7 @@
     <p:sldMasterId id="2147483927" r:id="rId1"/>
   </p:sldMasterIdLst>
   <p:notesMasterIdLst>
-    <p:notesMasterId r:id="rId13"/>
+    <p:notesMasterId r:id="rId18"/>
   </p:notesMasterIdLst>
   <p:sldIdLst>
     <p:sldId id="256" r:id="rId2"/>
@@ -13,12 +13,17 @@
     <p:sldId id="262" r:id="rId4"/>
     <p:sldId id="263" r:id="rId5"/>
     <p:sldId id="269" r:id="rId6"/>
-    <p:sldId id="264" r:id="rId7"/>
-    <p:sldId id="265" r:id="rId8"/>
-    <p:sldId id="270" r:id="rId9"/>
-    <p:sldId id="266" r:id="rId10"/>
-    <p:sldId id="267" r:id="rId11"/>
-    <p:sldId id="268" r:id="rId12"/>
+    <p:sldId id="273" r:id="rId7"/>
+    <p:sldId id="272" r:id="rId8"/>
+    <p:sldId id="264" r:id="rId9"/>
+    <p:sldId id="274" r:id="rId10"/>
+    <p:sldId id="275" r:id="rId11"/>
+    <p:sldId id="265" r:id="rId12"/>
+    <p:sldId id="276" r:id="rId13"/>
+    <p:sldId id="277" r:id="rId14"/>
+    <p:sldId id="266" r:id="rId15"/>
+    <p:sldId id="267" r:id="rId16"/>
+    <p:sldId id="268" r:id="rId17"/>
   </p:sldIdLst>
   <p:sldSz cx="12192000" cy="6858000"/>
   <p:notesSz cx="6858000" cy="9144000"/>
@@ -284,7 +289,7 @@
           <a:p>
             <a:fld id="{07C4D0F0-52E5-487E-8828-0E2211A1C9F1}" type="datetimeFigureOut">
               <a:rPr lang="en-US" smtClean="0"/>
-              <a:t>4/4/2021</a:t>
+              <a:t>4/5/2021</a:t>
             </a:fld>
             <a:endParaRPr lang="en-US"/>
           </a:p>
@@ -675,6 +680,702 @@
 </p:notes>
 </file>
 
+<file path=ppt/notesSlides/notesSlide10.xml><?xml version="1.0" encoding="utf-8"?>
+<p:notes xmlns:a="http://schemas.openxmlformats.org/drawingml/2006/main" xmlns:r="http://schemas.openxmlformats.org/officeDocument/2006/relationships" xmlns:p="http://schemas.openxmlformats.org/presentationml/2006/main">
+  <p:cSld>
+    <p:spTree>
+      <p:nvGrpSpPr>
+        <p:cNvPr id="1" name=""/>
+        <p:cNvGrpSpPr/>
+        <p:nvPr/>
+      </p:nvGrpSpPr>
+      <p:grpSpPr>
+        <a:xfrm>
+          <a:off x="0" y="0"/>
+          <a:ext cx="0" cy="0"/>
+          <a:chOff x="0" y="0"/>
+          <a:chExt cx="0" cy="0"/>
+        </a:xfrm>
+      </p:grpSpPr>
+      <p:sp>
+        <p:nvSpPr>
+          <p:cNvPr id="2" name="Slide Image Placeholder 1"/>
+          <p:cNvSpPr>
+            <a:spLocks noGrp="1" noRot="1" noChangeAspect="1"/>
+          </p:cNvSpPr>
+          <p:nvPr>
+            <p:ph type="sldImg"/>
+          </p:nvPr>
+        </p:nvSpPr>
+        <p:spPr/>
+      </p:sp>
+      <p:sp>
+        <p:nvSpPr>
+          <p:cNvPr id="3" name="Notes Placeholder 2"/>
+          <p:cNvSpPr>
+            <a:spLocks noGrp="1"/>
+          </p:cNvSpPr>
+          <p:nvPr>
+            <p:ph type="body" idx="1"/>
+          </p:nvPr>
+        </p:nvSpPr>
+        <p:spPr/>
+        <p:txBody>
+          <a:bodyPr/>
+          <a:lstStyle/>
+          <a:p>
+            <a:endParaRPr lang="en-US" dirty="0"/>
+          </a:p>
+        </p:txBody>
+      </p:sp>
+      <p:sp>
+        <p:nvSpPr>
+          <p:cNvPr id="4" name="Slide Number Placeholder 3"/>
+          <p:cNvSpPr>
+            <a:spLocks noGrp="1"/>
+          </p:cNvSpPr>
+          <p:nvPr>
+            <p:ph type="sldNum" sz="quarter" idx="5"/>
+          </p:nvPr>
+        </p:nvSpPr>
+        <p:spPr/>
+        <p:txBody>
+          <a:bodyPr/>
+          <a:lstStyle/>
+          <a:p>
+            <a:fld id="{3E3BB913-60C7-43E3-B2B5-53B86365DC39}" type="slidenum">
+              <a:rPr lang="en-US" smtClean="0"/>
+              <a:t>11</a:t>
+            </a:fld>
+            <a:endParaRPr lang="en-US"/>
+          </a:p>
+        </p:txBody>
+      </p:sp>
+    </p:spTree>
+    <p:extLst>
+      <p:ext uri="{BB962C8B-B14F-4D97-AF65-F5344CB8AC3E}">
+        <p14:creationId xmlns:p14="http://schemas.microsoft.com/office/powerpoint/2010/main" val="582708718"/>
+      </p:ext>
+    </p:extLst>
+  </p:cSld>
+  <p:clrMapOvr>
+    <a:masterClrMapping/>
+  </p:clrMapOvr>
+</p:notes>
+</file>
+
+<file path=ppt/notesSlides/notesSlide11.xml><?xml version="1.0" encoding="utf-8"?>
+<p:notes xmlns:a="http://schemas.openxmlformats.org/drawingml/2006/main" xmlns:r="http://schemas.openxmlformats.org/officeDocument/2006/relationships" xmlns:p="http://schemas.openxmlformats.org/presentationml/2006/main">
+  <p:cSld>
+    <p:spTree>
+      <p:nvGrpSpPr>
+        <p:cNvPr id="1" name=""/>
+        <p:cNvGrpSpPr/>
+        <p:nvPr/>
+      </p:nvGrpSpPr>
+      <p:grpSpPr>
+        <a:xfrm>
+          <a:off x="0" y="0"/>
+          <a:ext cx="0" cy="0"/>
+          <a:chOff x="0" y="0"/>
+          <a:chExt cx="0" cy="0"/>
+        </a:xfrm>
+      </p:grpSpPr>
+      <p:sp>
+        <p:nvSpPr>
+          <p:cNvPr id="2" name="Slide Image Placeholder 1"/>
+          <p:cNvSpPr>
+            <a:spLocks noGrp="1" noRot="1" noChangeAspect="1"/>
+          </p:cNvSpPr>
+          <p:nvPr>
+            <p:ph type="sldImg"/>
+          </p:nvPr>
+        </p:nvSpPr>
+        <p:spPr/>
+      </p:sp>
+      <p:sp>
+        <p:nvSpPr>
+          <p:cNvPr id="3" name="Notes Placeholder 2"/>
+          <p:cNvSpPr>
+            <a:spLocks noGrp="1"/>
+          </p:cNvSpPr>
+          <p:nvPr>
+            <p:ph type="body" idx="1"/>
+          </p:nvPr>
+        </p:nvSpPr>
+        <p:spPr/>
+        <p:txBody>
+          <a:bodyPr/>
+          <a:lstStyle/>
+          <a:p>
+            <a:pPr algn="l"/>
+            <a:r>
+              <a:rPr lang="en-US" b="0" i="0" dirty="0">
+                <a:solidFill>
+                  <a:srgbClr val="1D1C1D"/>
+                </a:solidFill>
+                <a:effectLst/>
+                <a:latin typeface="Monaco"/>
+              </a:rPr>
+              <a:t>##Loudness</a:t>
+            </a:r>
+          </a:p>
+          <a:p>
+            <a:pPr algn="l"/>
+            <a:r>
+              <a:rPr lang="en-US" b="0" i="0" dirty="0">
+                <a:solidFill>
+                  <a:srgbClr val="1D1C1D"/>
+                </a:solidFill>
+                <a:effectLst/>
+                <a:latin typeface="Monaco"/>
+              </a:rPr>
+              <a:t>Louder songs tend to be more popular than their quiet competition. As improvements in recording technology have allowed music to be recorded and played at higher volumes before they begin to distort, popular artists have been happy to turn it up. Louder songs are more likely to grab a listener’s attention on the radio, a personalized “Release Radar” playlist or even a television commercial.</a:t>
+            </a:r>
+          </a:p>
+          <a:p>
+            <a:endParaRPr lang="en-US" dirty="0"/>
+          </a:p>
+        </p:txBody>
+      </p:sp>
+      <p:sp>
+        <p:nvSpPr>
+          <p:cNvPr id="4" name="Slide Number Placeholder 3"/>
+          <p:cNvSpPr>
+            <a:spLocks noGrp="1"/>
+          </p:cNvSpPr>
+          <p:nvPr>
+            <p:ph type="sldNum" sz="quarter" idx="5"/>
+          </p:nvPr>
+        </p:nvSpPr>
+        <p:spPr/>
+        <p:txBody>
+          <a:bodyPr/>
+          <a:lstStyle/>
+          <a:p>
+            <a:fld id="{3E3BB913-60C7-43E3-B2B5-53B86365DC39}" type="slidenum">
+              <a:rPr lang="en-US" smtClean="0"/>
+              <a:t>12</a:t>
+            </a:fld>
+            <a:endParaRPr lang="en-US"/>
+          </a:p>
+        </p:txBody>
+      </p:sp>
+    </p:spTree>
+    <p:extLst>
+      <p:ext uri="{BB962C8B-B14F-4D97-AF65-F5344CB8AC3E}">
+        <p14:creationId xmlns:p14="http://schemas.microsoft.com/office/powerpoint/2010/main" val="3467845700"/>
+      </p:ext>
+    </p:extLst>
+  </p:cSld>
+  <p:clrMapOvr>
+    <a:masterClrMapping/>
+  </p:clrMapOvr>
+</p:notes>
+</file>
+
+<file path=ppt/notesSlides/notesSlide12.xml><?xml version="1.0" encoding="utf-8"?>
+<p:notes xmlns:a="http://schemas.openxmlformats.org/drawingml/2006/main" xmlns:r="http://schemas.openxmlformats.org/officeDocument/2006/relationships" xmlns:p="http://schemas.openxmlformats.org/presentationml/2006/main">
+  <p:cSld>
+    <p:spTree>
+      <p:nvGrpSpPr>
+        <p:cNvPr id="1" name=""/>
+        <p:cNvGrpSpPr/>
+        <p:nvPr/>
+      </p:nvGrpSpPr>
+      <p:grpSpPr>
+        <a:xfrm>
+          <a:off x="0" y="0"/>
+          <a:ext cx="0" cy="0"/>
+          <a:chOff x="0" y="0"/>
+          <a:chExt cx="0" cy="0"/>
+        </a:xfrm>
+      </p:grpSpPr>
+      <p:sp>
+        <p:nvSpPr>
+          <p:cNvPr id="2" name="Slide Image Placeholder 1"/>
+          <p:cNvSpPr>
+            <a:spLocks noGrp="1" noRot="1" noChangeAspect="1"/>
+          </p:cNvSpPr>
+          <p:nvPr>
+            <p:ph type="sldImg"/>
+          </p:nvPr>
+        </p:nvSpPr>
+        <p:spPr/>
+      </p:sp>
+      <p:sp>
+        <p:nvSpPr>
+          <p:cNvPr id="3" name="Notes Placeholder 2"/>
+          <p:cNvSpPr>
+            <a:spLocks noGrp="1"/>
+          </p:cNvSpPr>
+          <p:nvPr>
+            <p:ph type="body" idx="1"/>
+          </p:nvPr>
+        </p:nvSpPr>
+        <p:spPr/>
+        <p:txBody>
+          <a:bodyPr/>
+          <a:lstStyle/>
+          <a:p>
+            <a:pPr algn="l"/>
+            <a:r>
+              <a:rPr lang="en-US" b="0" i="0" dirty="0">
+                <a:solidFill>
+                  <a:srgbClr val="1D1C1D"/>
+                </a:solidFill>
+                <a:effectLst/>
+                <a:latin typeface="Monaco"/>
+              </a:rPr>
+              <a:t>##Speechiness</a:t>
+            </a:r>
+          </a:p>
+          <a:p>
+            <a:pPr algn="l"/>
+            <a:r>
+              <a:rPr lang="en-US" b="0" i="0" dirty="0">
+                <a:solidFill>
+                  <a:srgbClr val="1D1C1D"/>
+                </a:solidFill>
+                <a:effectLst/>
+                <a:latin typeface="Monaco"/>
+              </a:rPr>
+              <a:t>Songs and tracks with higher levels of </a:t>
+            </a:r>
+            <a:r>
+              <a:rPr lang="en-US" b="0" i="0" dirty="0" err="1">
+                <a:solidFill>
+                  <a:srgbClr val="1D1C1D"/>
+                </a:solidFill>
+                <a:effectLst/>
+                <a:latin typeface="Monaco"/>
+              </a:rPr>
+              <a:t>speechiness</a:t>
+            </a:r>
+            <a:r>
+              <a:rPr lang="en-US" b="0" i="0" dirty="0">
+                <a:solidFill>
+                  <a:srgbClr val="1D1C1D"/>
+                </a:solidFill>
+                <a:effectLst/>
+                <a:latin typeface="Monaco"/>
+              </a:rPr>
+              <a:t> are quite simply not popular. As soon as tracks incorporate more than a just a few lines of spoken (as opposed to sung) vocals, they sacrifice whatever chance they had at popularity.</a:t>
+            </a:r>
+          </a:p>
+          <a:p>
+            <a:endParaRPr lang="en-US" dirty="0"/>
+          </a:p>
+        </p:txBody>
+      </p:sp>
+      <p:sp>
+        <p:nvSpPr>
+          <p:cNvPr id="4" name="Slide Number Placeholder 3"/>
+          <p:cNvSpPr>
+            <a:spLocks noGrp="1"/>
+          </p:cNvSpPr>
+          <p:nvPr>
+            <p:ph type="sldNum" sz="quarter" idx="5"/>
+          </p:nvPr>
+        </p:nvSpPr>
+        <p:spPr/>
+        <p:txBody>
+          <a:bodyPr/>
+          <a:lstStyle/>
+          <a:p>
+            <a:fld id="{3E3BB913-60C7-43E3-B2B5-53B86365DC39}" type="slidenum">
+              <a:rPr lang="en-US" smtClean="0"/>
+              <a:t>13</a:t>
+            </a:fld>
+            <a:endParaRPr lang="en-US"/>
+          </a:p>
+        </p:txBody>
+      </p:sp>
+    </p:spTree>
+    <p:extLst>
+      <p:ext uri="{BB962C8B-B14F-4D97-AF65-F5344CB8AC3E}">
+        <p14:creationId xmlns:p14="http://schemas.microsoft.com/office/powerpoint/2010/main" val="359026798"/>
+      </p:ext>
+    </p:extLst>
+  </p:cSld>
+  <p:clrMapOvr>
+    <a:masterClrMapping/>
+  </p:clrMapOvr>
+</p:notes>
+</file>
+
+<file path=ppt/notesSlides/notesSlide13.xml><?xml version="1.0" encoding="utf-8"?>
+<p:notes xmlns:a="http://schemas.openxmlformats.org/drawingml/2006/main" xmlns:r="http://schemas.openxmlformats.org/officeDocument/2006/relationships" xmlns:p="http://schemas.openxmlformats.org/presentationml/2006/main">
+  <p:cSld>
+    <p:spTree>
+      <p:nvGrpSpPr>
+        <p:cNvPr id="1" name=""/>
+        <p:cNvGrpSpPr/>
+        <p:nvPr/>
+      </p:nvGrpSpPr>
+      <p:grpSpPr>
+        <a:xfrm>
+          <a:off x="0" y="0"/>
+          <a:ext cx="0" cy="0"/>
+          <a:chOff x="0" y="0"/>
+          <a:chExt cx="0" cy="0"/>
+        </a:xfrm>
+      </p:grpSpPr>
+      <p:sp>
+        <p:nvSpPr>
+          <p:cNvPr id="2" name="Slide Image Placeholder 1"/>
+          <p:cNvSpPr>
+            <a:spLocks noGrp="1" noRot="1" noChangeAspect="1"/>
+          </p:cNvSpPr>
+          <p:nvPr>
+            <p:ph type="sldImg"/>
+          </p:nvPr>
+        </p:nvSpPr>
+        <p:spPr/>
+      </p:sp>
+      <p:sp>
+        <p:nvSpPr>
+          <p:cNvPr id="3" name="Notes Placeholder 2"/>
+          <p:cNvSpPr>
+            <a:spLocks noGrp="1"/>
+          </p:cNvSpPr>
+          <p:nvPr>
+            <p:ph type="body" idx="1"/>
+          </p:nvPr>
+        </p:nvSpPr>
+        <p:spPr/>
+        <p:txBody>
+          <a:bodyPr/>
+          <a:lstStyle/>
+          <a:p>
+            <a:endParaRPr lang="en-US" dirty="0"/>
+          </a:p>
+        </p:txBody>
+      </p:sp>
+      <p:sp>
+        <p:nvSpPr>
+          <p:cNvPr id="4" name="Slide Number Placeholder 3"/>
+          <p:cNvSpPr>
+            <a:spLocks noGrp="1"/>
+          </p:cNvSpPr>
+          <p:nvPr>
+            <p:ph type="sldNum" sz="quarter" idx="5"/>
+          </p:nvPr>
+        </p:nvSpPr>
+        <p:spPr/>
+        <p:txBody>
+          <a:bodyPr/>
+          <a:lstStyle/>
+          <a:p>
+            <a:fld id="{3E3BB913-60C7-43E3-B2B5-53B86365DC39}" type="slidenum">
+              <a:rPr lang="en-US" smtClean="0"/>
+              <a:t>14</a:t>
+            </a:fld>
+            <a:endParaRPr lang="en-US"/>
+          </a:p>
+        </p:txBody>
+      </p:sp>
+    </p:spTree>
+    <p:extLst>
+      <p:ext uri="{BB962C8B-B14F-4D97-AF65-F5344CB8AC3E}">
+        <p14:creationId xmlns:p14="http://schemas.microsoft.com/office/powerpoint/2010/main" val="444601832"/>
+      </p:ext>
+    </p:extLst>
+  </p:cSld>
+  <p:clrMapOvr>
+    <a:masterClrMapping/>
+  </p:clrMapOvr>
+</p:notes>
+</file>
+
+<file path=ppt/notesSlides/notesSlide14.xml><?xml version="1.0" encoding="utf-8"?>
+<p:notes xmlns:a="http://schemas.openxmlformats.org/drawingml/2006/main" xmlns:r="http://schemas.openxmlformats.org/officeDocument/2006/relationships" xmlns:p="http://schemas.openxmlformats.org/presentationml/2006/main">
+  <p:cSld>
+    <p:spTree>
+      <p:nvGrpSpPr>
+        <p:cNvPr id="1" name=""/>
+        <p:cNvGrpSpPr/>
+        <p:nvPr/>
+      </p:nvGrpSpPr>
+      <p:grpSpPr>
+        <a:xfrm>
+          <a:off x="0" y="0"/>
+          <a:ext cx="0" cy="0"/>
+          <a:chOff x="0" y="0"/>
+          <a:chExt cx="0" cy="0"/>
+        </a:xfrm>
+      </p:grpSpPr>
+      <p:sp>
+        <p:nvSpPr>
+          <p:cNvPr id="2" name="Slide Image Placeholder 1"/>
+          <p:cNvSpPr>
+            <a:spLocks noGrp="1" noRot="1" noChangeAspect="1"/>
+          </p:cNvSpPr>
+          <p:nvPr>
+            <p:ph type="sldImg"/>
+          </p:nvPr>
+        </p:nvSpPr>
+        <p:spPr/>
+      </p:sp>
+      <p:sp>
+        <p:nvSpPr>
+          <p:cNvPr id="3" name="Notes Placeholder 2"/>
+          <p:cNvSpPr>
+            <a:spLocks noGrp="1"/>
+          </p:cNvSpPr>
+          <p:nvPr>
+            <p:ph type="body" idx="1"/>
+          </p:nvPr>
+        </p:nvSpPr>
+        <p:spPr/>
+        <p:txBody>
+          <a:bodyPr/>
+          <a:lstStyle/>
+          <a:p>
+            <a:r>
+              <a:rPr lang="en-US" b="1" dirty="0"/>
+              <a:t>Problem solving along the way: </a:t>
+            </a:r>
+          </a:p>
+          <a:p>
+            <a:r>
+              <a:rPr lang="en-US" dirty="0"/>
+              <a:t>Our approach was to split up the work load and really dive into the material individually that they had chosen or been assigned.</a:t>
+            </a:r>
+          </a:p>
+          <a:p>
+            <a:r>
+              <a:rPr lang="en-US" dirty="0"/>
+              <a:t>When people got stuck we were able to come together as a team and look through to see if we needed to adjust code, attack the data in a different way, or change the question being asked to something plausible</a:t>
+            </a:r>
+          </a:p>
+          <a:p>
+            <a:r>
+              <a:rPr lang="en-US" dirty="0"/>
+              <a:t>By approaching problems this way we were able to leverage all of our strengths into a cohesive unit and kept progress moving</a:t>
+            </a:r>
+          </a:p>
+          <a:p>
+            <a:endParaRPr lang="en-US" dirty="0"/>
+          </a:p>
+          <a:p>
+            <a:r>
+              <a:rPr lang="en-US" b="1" dirty="0"/>
+              <a:t>Data limitations:</a:t>
+            </a:r>
+          </a:p>
+          <a:p>
+            <a:r>
+              <a:rPr lang="en-US" b="0" dirty="0"/>
+              <a:t>Popularity is skewed to reflect current values rather than over time</a:t>
+            </a:r>
+          </a:p>
+          <a:p>
+            <a:r>
+              <a:rPr lang="en-US" b="0" dirty="0"/>
+              <a:t>Limited music listeners</a:t>
+            </a:r>
+          </a:p>
+          <a:p>
+            <a:r>
+              <a:rPr lang="en-US" b="0" dirty="0"/>
+              <a:t>Limited artists rights/songs</a:t>
+            </a:r>
+          </a:p>
+          <a:p>
+            <a:endParaRPr lang="en-US" dirty="0"/>
+          </a:p>
+          <a:p>
+            <a:r>
+              <a:rPr lang="en-US" b="1" dirty="0"/>
+              <a:t>Expanded research possibilities</a:t>
+            </a:r>
+          </a:p>
+          <a:p>
+            <a:pPr marL="0" indent="0">
+              <a:buFontTx/>
+              <a:buNone/>
+            </a:pPr>
+            <a:r>
+              <a:rPr lang="en-US" b="0" dirty="0"/>
+              <a:t>Taking the time periods leading up to and immediately following major world events to see how music was altered</a:t>
+            </a:r>
+          </a:p>
+          <a:p>
+            <a:pPr marL="0" indent="0">
+              <a:buFontTx/>
+              <a:buNone/>
+            </a:pPr>
+            <a:r>
+              <a:rPr lang="en-US" b="0" dirty="0"/>
+              <a:t>Or doing the same thing but with specific influential artists </a:t>
+            </a:r>
+            <a:r>
+              <a:rPr lang="en-US" b="0" dirty="0" err="1"/>
+              <a:t>ie</a:t>
+            </a:r>
+            <a:r>
+              <a:rPr lang="en-US" b="0" dirty="0"/>
+              <a:t>.- </a:t>
+            </a:r>
+            <a:r>
+              <a:rPr lang="en-US" b="0" dirty="0" err="1"/>
+              <a:t>beatles</a:t>
+            </a:r>
+            <a:r>
+              <a:rPr lang="en-US" b="0" dirty="0"/>
+              <a:t>, NWA, Elvis, </a:t>
+            </a:r>
+          </a:p>
+          <a:p>
+            <a:pPr marL="0" indent="0">
+              <a:buFontTx/>
+              <a:buNone/>
+            </a:pPr>
+            <a:r>
+              <a:rPr lang="en-US" b="0" dirty="0"/>
+              <a:t>Take our approach from a decade by decade approach</a:t>
+            </a:r>
+          </a:p>
+          <a:p>
+            <a:pPr marL="0" indent="0">
+              <a:buFontTx/>
+              <a:buNone/>
+            </a:pPr>
+            <a:r>
+              <a:rPr lang="en-US" b="0" dirty="0"/>
+              <a:t>Assign value ranges for genres to consolidate the genre list that is present in this dataset</a:t>
+            </a:r>
+          </a:p>
+          <a:p>
+            <a:pPr marL="0" indent="0">
+              <a:buFontTx/>
+              <a:buNone/>
+            </a:pPr>
+            <a:endParaRPr lang="en-US" b="1" dirty="0"/>
+          </a:p>
+        </p:txBody>
+      </p:sp>
+      <p:sp>
+        <p:nvSpPr>
+          <p:cNvPr id="4" name="Slide Number Placeholder 3"/>
+          <p:cNvSpPr>
+            <a:spLocks noGrp="1"/>
+          </p:cNvSpPr>
+          <p:nvPr>
+            <p:ph type="sldNum" sz="quarter" idx="5"/>
+          </p:nvPr>
+        </p:nvSpPr>
+        <p:spPr/>
+        <p:txBody>
+          <a:bodyPr/>
+          <a:lstStyle/>
+          <a:p>
+            <a:fld id="{3E3BB913-60C7-43E3-B2B5-53B86365DC39}" type="slidenum">
+              <a:rPr lang="en-US" smtClean="0"/>
+              <a:t>15</a:t>
+            </a:fld>
+            <a:endParaRPr lang="en-US"/>
+          </a:p>
+        </p:txBody>
+      </p:sp>
+    </p:spTree>
+    <p:extLst>
+      <p:ext uri="{BB962C8B-B14F-4D97-AF65-F5344CB8AC3E}">
+        <p14:creationId xmlns:p14="http://schemas.microsoft.com/office/powerpoint/2010/main" val="4171389560"/>
+      </p:ext>
+    </p:extLst>
+  </p:cSld>
+  <p:clrMapOvr>
+    <a:masterClrMapping/>
+  </p:clrMapOvr>
+</p:notes>
+</file>
+
+<file path=ppt/notesSlides/notesSlide15.xml><?xml version="1.0" encoding="utf-8"?>
+<p:notes xmlns:a="http://schemas.openxmlformats.org/drawingml/2006/main" xmlns:r="http://schemas.openxmlformats.org/officeDocument/2006/relationships" xmlns:p="http://schemas.openxmlformats.org/presentationml/2006/main">
+  <p:cSld>
+    <p:spTree>
+      <p:nvGrpSpPr>
+        <p:cNvPr id="1" name=""/>
+        <p:cNvGrpSpPr/>
+        <p:nvPr/>
+      </p:nvGrpSpPr>
+      <p:grpSpPr>
+        <a:xfrm>
+          <a:off x="0" y="0"/>
+          <a:ext cx="0" cy="0"/>
+          <a:chOff x="0" y="0"/>
+          <a:chExt cx="0" cy="0"/>
+        </a:xfrm>
+      </p:grpSpPr>
+      <p:sp>
+        <p:nvSpPr>
+          <p:cNvPr id="2" name="Slide Image Placeholder 1"/>
+          <p:cNvSpPr>
+            <a:spLocks noGrp="1" noRot="1" noChangeAspect="1"/>
+          </p:cNvSpPr>
+          <p:nvPr>
+            <p:ph type="sldImg"/>
+          </p:nvPr>
+        </p:nvSpPr>
+        <p:spPr/>
+      </p:sp>
+      <p:sp>
+        <p:nvSpPr>
+          <p:cNvPr id="3" name="Notes Placeholder 2"/>
+          <p:cNvSpPr>
+            <a:spLocks noGrp="1"/>
+          </p:cNvSpPr>
+          <p:nvPr>
+            <p:ph type="body" idx="1"/>
+          </p:nvPr>
+        </p:nvSpPr>
+        <p:spPr/>
+        <p:txBody>
+          <a:bodyPr/>
+          <a:lstStyle/>
+          <a:p>
+            <a:endParaRPr lang="en-US" dirty="0"/>
+          </a:p>
+        </p:txBody>
+      </p:sp>
+      <p:sp>
+        <p:nvSpPr>
+          <p:cNvPr id="4" name="Slide Number Placeholder 3"/>
+          <p:cNvSpPr>
+            <a:spLocks noGrp="1"/>
+          </p:cNvSpPr>
+          <p:nvPr>
+            <p:ph type="sldNum" sz="quarter" idx="5"/>
+          </p:nvPr>
+        </p:nvSpPr>
+        <p:spPr/>
+        <p:txBody>
+          <a:bodyPr/>
+          <a:lstStyle/>
+          <a:p>
+            <a:fld id="{3E3BB913-60C7-43E3-B2B5-53B86365DC39}" type="slidenum">
+              <a:rPr lang="en-US" smtClean="0"/>
+              <a:t>16</a:t>
+            </a:fld>
+            <a:endParaRPr lang="en-US"/>
+          </a:p>
+        </p:txBody>
+      </p:sp>
+    </p:spTree>
+    <p:extLst>
+      <p:ext uri="{BB962C8B-B14F-4D97-AF65-F5344CB8AC3E}">
+        <p14:creationId xmlns:p14="http://schemas.microsoft.com/office/powerpoint/2010/main" val="1287062211"/>
+      </p:ext>
+    </p:extLst>
+  </p:cSld>
+  <p:clrMapOvr>
+    <a:masterClrMapping/>
+  </p:clrMapOvr>
+</p:notes>
+</file>
+
 <file path=ppt/notesSlides/notesSlide2.xml><?xml version="1.0" encoding="utf-8"?>
 <p:notes xmlns:a="http://schemas.openxmlformats.org/drawingml/2006/main" xmlns:r="http://schemas.openxmlformats.org/officeDocument/2006/relationships" xmlns:p="http://schemas.openxmlformats.org/presentationml/2006/main">
   <p:cSld>
@@ -719,12 +1420,57 @@
           <a:bodyPr/>
           <a:lstStyle/>
           <a:p>
+            <a:pPr marL="0" lvl="0" indent="0" algn="l" rtl="0">
+              <a:spcBef>
+                <a:spcPts val="0"/>
+              </a:spcBef>
+              <a:spcAft>
+                <a:spcPts val="0"/>
+              </a:spcAft>
+              <a:buNone/>
+            </a:pPr>
+            <a:r>
+              <a:rPr lang="en-US" dirty="0"/>
+              <a:t>Based on questions we wanted to investigate, had to consider ….</a:t>
+            </a:r>
+          </a:p>
+          <a:p>
+            <a:pPr marL="0" lvl="0" indent="0" algn="l" rtl="0">
+              <a:spcBef>
+                <a:spcPts val="0"/>
+              </a:spcBef>
+              <a:spcAft>
+                <a:spcPts val="0"/>
+              </a:spcAft>
+              <a:buNone/>
+            </a:pPr>
+            <a:endParaRPr lang="en-US" dirty="0"/>
+          </a:p>
+          <a:p>
+            <a:pPr marL="0" lvl="0" indent="0" algn="l" rtl="0">
+              <a:spcBef>
+                <a:spcPts val="0"/>
+              </a:spcBef>
+              <a:spcAft>
+                <a:spcPts val="0"/>
+              </a:spcAft>
+              <a:buNone/>
+            </a:pPr>
             <a:r>
               <a:rPr lang="en-US" dirty="0"/>
               <a:t>Dataset:</a:t>
             </a:r>
           </a:p>
           <a:p>
+            <a:pPr marL="0" lvl="0" indent="0" algn="l" rtl="0">
+              <a:spcBef>
+                <a:spcPts val="0"/>
+              </a:spcBef>
+              <a:spcAft>
+                <a:spcPts val="0"/>
+              </a:spcAft>
+              <a:buNone/>
+            </a:pPr>
             <a:r>
               <a:rPr lang="en-US" dirty="0"/>
               <a:t>	Created by </a:t>
@@ -743,22 +1489,49 @@
             </a:r>
             <a:r>
               <a:rPr lang="en-US" dirty="0"/>
-              <a:t> Ay</a:t>
-            </a:r>
-          </a:p>
-          <a:p>
+              <a:t> Ay (pulled from Spotify Web API)</a:t>
+            </a:r>
+          </a:p>
+          <a:p>
+            <a:pPr marL="0" lvl="0" indent="0" algn="l" rtl="0">
+              <a:spcBef>
+                <a:spcPts val="0"/>
+              </a:spcBef>
+              <a:spcAft>
+                <a:spcPts val="0"/>
+              </a:spcAft>
+              <a:buNone/>
+            </a:pPr>
             <a:r>
               <a:rPr lang="en-US" dirty="0"/>
-              <a:t>	More than 175,000 songs</a:t>
-            </a:r>
-          </a:p>
-          <a:p>
+              <a:t>	More than 175,000 songs with tracks from 1921 - 2021</a:t>
+            </a:r>
+          </a:p>
+          <a:p>
+            <a:pPr marL="0" lvl="0" indent="0" algn="l" rtl="0">
+              <a:spcBef>
+                <a:spcPts val="0"/>
+              </a:spcBef>
+              <a:spcAft>
+                <a:spcPts val="0"/>
+              </a:spcAft>
+              <a:buNone/>
+            </a:pPr>
             <a:r>
               <a:rPr lang="en-US" dirty="0"/>
               <a:t>Numerical:</a:t>
             </a:r>
           </a:p>
           <a:p>
+            <a:pPr marL="0" lvl="0" indent="0" algn="l" rtl="0">
+              <a:spcBef>
+                <a:spcPts val="0"/>
+              </a:spcBef>
+              <a:spcAft>
+                <a:spcPts val="0"/>
+              </a:spcAft>
+              <a:buNone/>
+            </a:pPr>
             <a:r>
               <a:rPr lang="en-US" dirty="0"/>
               <a:t>	</a:t>
@@ -777,29 +1550,7 @@
             </a:r>
             <a:r>
               <a:rPr lang="en-US" dirty="0"/>
-              <a:t>, valence, </a:t>
-            </a:r>
-            <a:r>
-              <a:rPr lang="en-US" dirty="0" err="1"/>
-              <a:t>popularirty</a:t>
-            </a:r>
-            <a:r>
-              <a:rPr lang="en-US" dirty="0"/>
-              <a:t>, tempo, l</a:t>
-            </a:r>
-          </a:p>
-          <a:p>
-            <a:r>
-              <a:rPr lang="en-US" dirty="0"/>
-              <a:t>	</a:t>
-            </a:r>
-            <a:r>
-              <a:rPr lang="en-US" dirty="0" err="1"/>
-              <a:t>iveness</a:t>
-            </a:r>
-            <a:r>
-              <a:rPr lang="en-US" dirty="0"/>
-              <a:t>, loudness, </a:t>
+              <a:t>, valence, popularity, tempo, liveness, loudness, </a:t>
             </a:r>
             <a:r>
               <a:rPr lang="en-US" dirty="0" err="1"/>
@@ -811,33 +1562,33 @@
             </a:r>
           </a:p>
           <a:p>
+            <a:pPr marL="0" lvl="0" indent="0" algn="l" rtl="0">
+              <a:spcBef>
+                <a:spcPts val="0"/>
+              </a:spcBef>
+              <a:spcAft>
+                <a:spcPts val="0"/>
+              </a:spcAft>
+              <a:buNone/>
+            </a:pPr>
             <a:r>
               <a:rPr lang="en-US" dirty="0"/>
               <a:t>Categorical:</a:t>
             </a:r>
           </a:p>
           <a:p>
+            <a:pPr marL="0" lvl="0" indent="0" algn="l" rtl="0">
+              <a:spcBef>
+                <a:spcPts val="0"/>
+              </a:spcBef>
+              <a:spcAft>
+                <a:spcPts val="0"/>
+              </a:spcAft>
+              <a:buNone/>
+            </a:pPr>
             <a:r>
               <a:rPr lang="en-US" dirty="0"/>
               <a:t>	Mode, explicitness, key, artist, song name, and release date</a:t>
-            </a:r>
-          </a:p>
-          <a:p>
-            <a:r>
-              <a:rPr lang="en-US" dirty="0"/>
-              <a:t>Questions:</a:t>
-            </a:r>
-          </a:p>
-          <a:p>
-            <a:r>
-              <a:rPr lang="en-US" dirty="0"/>
-              <a:t>	As we looked into the dataset we had to alter our main question to answer the secondary questions that were most important to us</a:t>
-            </a:r>
-          </a:p>
-          <a:p>
-            <a:r>
-              <a:rPr lang="en-US" dirty="0"/>
-              <a:t>	</a:t>
             </a:r>
           </a:p>
         </p:txBody>
@@ -922,63 +1673,201 @@
           <a:bodyPr/>
           <a:lstStyle/>
           <a:p>
+            <a:pPr marL="0" lvl="0" indent="0" algn="l" rtl="0">
+              <a:spcBef>
+                <a:spcPts val="0"/>
+              </a:spcBef>
+              <a:spcAft>
+                <a:spcPts val="0"/>
+              </a:spcAft>
+              <a:buClr>
+                <a:schemeClr val="dk1"/>
+              </a:buClr>
+              <a:buFont typeface="Arial"/>
+              <a:buNone/>
+            </a:pPr>
             <a:r>
               <a:rPr lang="en-US" dirty="0"/>
-              <a:t>Sorting Process:</a:t>
-            </a:r>
-          </a:p>
-          <a:p>
+              <a:t>Insights from exploration:</a:t>
+            </a:r>
+          </a:p>
+          <a:p>
+            <a:pPr marL="457200" lvl="0" indent="-317500" algn="l" rtl="0">
+              <a:spcBef>
+                <a:spcPts val="0"/>
+              </a:spcBef>
+              <a:spcAft>
+                <a:spcPts val="0"/>
+              </a:spcAft>
+              <a:buSzPts val="1400"/>
+              <a:buChar char="-"/>
+            </a:pPr>
+            <a:r>
+              <a:rPr lang="en-US" dirty="0"/>
+              <a:t>understanding each parameter - Spotify API documentation</a:t>
+            </a:r>
+          </a:p>
+          <a:p>
+            <a:pPr marL="457200" lvl="0" indent="-317500" algn="l" rtl="0">
+              <a:spcBef>
+                <a:spcPts val="0"/>
+              </a:spcBef>
+              <a:spcAft>
+                <a:spcPts val="0"/>
+              </a:spcAft>
+              <a:buSzPts val="1400"/>
+              <a:buChar char="-"/>
+            </a:pPr>
+            <a:r>
+              <a:rPr lang="en-US" dirty="0"/>
+              <a:t>3000+ genres with unclean labels</a:t>
+            </a:r>
+          </a:p>
+          <a:p>
+            <a:pPr marL="457200" lvl="0" indent="-317500" algn="l" rtl="0">
+              <a:spcBef>
+                <a:spcPts val="0"/>
+              </a:spcBef>
+              <a:spcAft>
+                <a:spcPts val="0"/>
+              </a:spcAft>
+              <a:buSzPts val="1400"/>
+              <a:buChar char="-"/>
+            </a:pPr>
+            <a:r>
+              <a:rPr lang="en-US" dirty="0"/>
+              <a:t>trends of music attributes grouped by year - not too telling as it doesn’t say much about popularity</a:t>
+            </a:r>
+          </a:p>
+          <a:p>
+            <a:pPr marL="457200" lvl="0" indent="-317500" algn="l" rtl="0">
+              <a:spcBef>
+                <a:spcPts val="0"/>
+              </a:spcBef>
+              <a:spcAft>
+                <a:spcPts val="0"/>
+              </a:spcAft>
+              <a:buSzPts val="1400"/>
+              <a:buChar char="-"/>
+            </a:pPr>
+            <a:r>
+              <a:rPr lang="en-US" dirty="0"/>
+              <a:t>reduce sample size to most popular tracks only and look at music attribute trends (trend over year and correlation against popularity)</a:t>
+            </a:r>
+          </a:p>
+          <a:p>
+            <a:pPr marL="0" lvl="0" indent="0" algn="l" rtl="0">
+              <a:spcBef>
+                <a:spcPts val="0"/>
+              </a:spcBef>
+              <a:spcAft>
+                <a:spcPts val="0"/>
+              </a:spcAft>
+              <a:buNone/>
+            </a:pPr>
             <a:endParaRPr lang="en-US" dirty="0"/>
           </a:p>
           <a:p>
+            <a:pPr marL="0" lvl="0" indent="0" algn="l" rtl="0">
+              <a:spcBef>
+                <a:spcPts val="0"/>
+              </a:spcBef>
+              <a:spcAft>
+                <a:spcPts val="0"/>
+              </a:spcAft>
+              <a:buNone/>
+            </a:pPr>
             <a:r>
               <a:rPr lang="en-US" dirty="0"/>
-              <a:t>Insights along the way:</a:t>
-            </a:r>
-          </a:p>
-          <a:p>
+              <a:t>Cleanup:</a:t>
+            </a:r>
+          </a:p>
+          <a:p>
+            <a:pPr marL="457200" lvl="0" indent="-317500" algn="l" rtl="0">
+              <a:spcBef>
+                <a:spcPts val="0"/>
+              </a:spcBef>
+              <a:spcAft>
+                <a:spcPts val="0"/>
+              </a:spcAft>
+              <a:buClr>
+                <a:schemeClr val="dk1"/>
+              </a:buClr>
+              <a:buSzPts val="1400"/>
+              <a:buChar char="-"/>
+            </a:pPr>
             <a:r>
               <a:rPr lang="en-US" dirty="0"/>
-              <a:t>	-explicit songs gained prevalence after 2019 (&gt;50%)</a:t>
-            </a:r>
-          </a:p>
-          <a:p>
+              <a:t>readability - change duration to minutes instead of </a:t>
+            </a:r>
+            <a:r>
+              <a:rPr lang="en-US" dirty="0" err="1"/>
+              <a:t>ms</a:t>
+            </a:r>
             <a:endParaRPr lang="en-US" dirty="0"/>
           </a:p>
           <a:p>
+            <a:pPr marL="457200" lvl="0" indent="-317500" algn="l" rtl="0">
+              <a:spcBef>
+                <a:spcPts val="0"/>
+              </a:spcBef>
+              <a:spcAft>
+                <a:spcPts val="0"/>
+              </a:spcAft>
+              <a:buSzPts val="1400"/>
+              <a:buChar char="-"/>
+            </a:pPr>
             <a:r>
               <a:rPr lang="en-US" dirty="0"/>
-              <a:t>Problems arising:</a:t>
-            </a:r>
-          </a:p>
-          <a:p>
+              <a:t>convert objects to floats - we want to look at average values per year which cannot be done for object data types</a:t>
+            </a:r>
+          </a:p>
+          <a:p>
+            <a:pPr marL="457200" lvl="0" indent="-317500" algn="l" rtl="0">
+              <a:spcBef>
+                <a:spcPts val="0"/>
+              </a:spcBef>
+              <a:spcAft>
+                <a:spcPts val="0"/>
+              </a:spcAft>
+              <a:buSzPts val="1400"/>
+              <a:buChar char="-"/>
+            </a:pPr>
             <a:r>
               <a:rPr lang="en-US" dirty="0"/>
-              <a:t>	-genre</a:t>
-            </a:r>
-          </a:p>
-          <a:p>
+              <a:t>rename column headers based on cleanup</a:t>
+            </a:r>
+          </a:p>
+          <a:p>
+            <a:pPr marL="457200" lvl="0" indent="-317500" algn="l" rtl="0">
+              <a:spcBef>
+                <a:spcPts val="0"/>
+              </a:spcBef>
+              <a:spcAft>
+                <a:spcPts val="0"/>
+              </a:spcAft>
+              <a:buSzPts val="1400"/>
+              <a:buChar char="-"/>
+            </a:pPr>
             <a:r>
               <a:rPr lang="en-US" dirty="0"/>
-              <a:t>	-loop by year</a:t>
-            </a:r>
-          </a:p>
-          <a:p>
+              <a:t>drop any columns that are not needed</a:t>
+            </a:r>
+          </a:p>
+          <a:p>
+            <a:pPr marL="457200" lvl="0" indent="-317500" algn="l" rtl="0">
+              <a:spcBef>
+                <a:spcPts val="0"/>
+              </a:spcBef>
+              <a:spcAft>
+                <a:spcPts val="0"/>
+              </a:spcAft>
+              <a:buSzPts val="1400"/>
+              <a:buChar char="-"/>
+            </a:pPr>
             <a:r>
               <a:rPr lang="en-US" dirty="0"/>
-              <a:t>	-unable to merge in artist data set because it was all of their songs combined instead of individual songs</a:t>
-            </a:r>
-          </a:p>
-          <a:p>
-            <a:r>
-              <a:rPr lang="en-US" dirty="0"/>
-              <a:t>	-determining sample size while trying to limit bias</a:t>
-            </a:r>
-          </a:p>
-          <a:p>
-            <a:r>
-              <a:rPr lang="en-US" dirty="0"/>
-              <a:t>Consolidating &amp; revising questions</a:t>
+              <a:t>once clean, output to separate csv to do analysis</a:t>
             </a:r>
           </a:p>
         </p:txBody>
@@ -1147,130 +2036,6 @@
           <a:bodyPr/>
           <a:lstStyle/>
           <a:p>
-            <a:pPr algn="l"/>
-            <a:r>
-              <a:rPr lang="en-US" b="1" i="0" dirty="0">
-                <a:solidFill>
-                  <a:srgbClr val="1D1C1D"/>
-                </a:solidFill>
-                <a:effectLst/>
-                <a:latin typeface="Monaco"/>
-              </a:rPr>
-              <a:t>##Tempo</a:t>
-            </a:r>
-          </a:p>
-          <a:p>
-            <a:pPr algn="l"/>
-            <a:r>
-              <a:rPr lang="en-US" b="0" i="0" dirty="0">
-                <a:solidFill>
-                  <a:srgbClr val="1D1C1D"/>
-                </a:solidFill>
-                <a:effectLst/>
-                <a:latin typeface="Monaco"/>
-              </a:rPr>
-              <a:t>The tempo of popular songs has primarily increased as time has gone one. This is almost certainly due to the invention and subsequent success of popular genres (in their more or less respective order of invention) Rock, Dance (which evolved from Disco when it absorbed some of the more muscular qualities of rock music) and Hip-Hop. Often made to be played loud in public spaces (concerts, clubs, shopping malls, etc..) these genres rely on beats, rhythms and vocals to fill in the empty spaces. Today’s most popular songs are very often the ones that keep going and keep listeners moving as well.</a:t>
-            </a:r>
-          </a:p>
-          <a:p>
-            <a:pPr algn="l"/>
-            <a:r>
-              <a:rPr lang="en-US" b="0" i="0" dirty="0">
-                <a:solidFill>
-                  <a:srgbClr val="1D1C1D"/>
-                </a:solidFill>
-                <a:effectLst/>
-                <a:latin typeface="Monaco"/>
-              </a:rPr>
-              <a:t>​</a:t>
-            </a:r>
-          </a:p>
-          <a:p>
-            <a:pPr algn="l"/>
-            <a:r>
-              <a:rPr lang="en-US" b="1" i="0" dirty="0">
-                <a:solidFill>
-                  <a:srgbClr val="1D1C1D"/>
-                </a:solidFill>
-                <a:effectLst/>
-                <a:latin typeface="Monaco"/>
-              </a:rPr>
-              <a:t>##Acousticness</a:t>
-            </a:r>
-          </a:p>
-          <a:p>
-            <a:pPr algn="l"/>
-            <a:r>
-              <a:rPr lang="en-US" b="0" i="0" dirty="0">
-                <a:solidFill>
-                  <a:srgbClr val="1D1C1D"/>
-                </a:solidFill>
-                <a:effectLst/>
-                <a:latin typeface="Monaco"/>
-              </a:rPr>
-              <a:t>The similarity between the graphs for both most popular and least popular songs by </a:t>
-            </a:r>
-            <a:r>
-              <a:rPr lang="en-US" b="0" i="0" dirty="0" err="1">
-                <a:solidFill>
-                  <a:srgbClr val="1D1C1D"/>
-                </a:solidFill>
-                <a:effectLst/>
-                <a:latin typeface="Monaco"/>
-              </a:rPr>
-              <a:t>Acousticness</a:t>
-            </a:r>
-            <a:r>
-              <a:rPr lang="en-US" b="0" i="0" dirty="0">
-                <a:solidFill>
-                  <a:srgbClr val="1D1C1D"/>
-                </a:solidFill>
-                <a:effectLst/>
-                <a:latin typeface="Monaco"/>
-              </a:rPr>
-              <a:t> speaks towards the decrease in popularity of acoustic instrumentation in contemporary popular music. A far-cry from the audience that sparked a now legendary near-riot when Dylan went electric in 1965 at the Newport Folk Festival, today’s listeners show a clear preference towards songs with electric/electronic instrumentation. Acoustic vs electric/electronic is now more of a matter of choice for musicians, and the meaning of sounds has thus changed over time. To most contemporary listeners, acoustic instrumentation often sets the expectation that a song or album will be of the more introspective singer/songwriter variety (think John Mayer or Sufjan Stevens) and very likely “sad”. With this in mind, it should not come to a surprise that listeners looking to lift their spirits during the Pandemic seem to have been drawn more towards less Acoustic music. </a:t>
-            </a:r>
-          </a:p>
-          <a:p>
-            <a:pPr algn="l"/>
-            <a:r>
-              <a:rPr lang="en-US" b="0" i="0" dirty="0">
-                <a:solidFill>
-                  <a:srgbClr val="1D1C1D"/>
-                </a:solidFill>
-                <a:effectLst/>
-                <a:latin typeface="Monaco"/>
-              </a:rPr>
-              <a:t>​</a:t>
-            </a:r>
-          </a:p>
-          <a:p>
-            <a:pPr algn="l"/>
-            <a:r>
-              <a:rPr lang="en-US" b="1" i="0" dirty="0">
-                <a:solidFill>
-                  <a:srgbClr val="1D1C1D"/>
-                </a:solidFill>
-                <a:effectLst/>
-                <a:latin typeface="Monaco"/>
-              </a:rPr>
-              <a:t>##Danceability</a:t>
-            </a:r>
-          </a:p>
-          <a:p>
-            <a:pPr algn="l"/>
-            <a:r>
-              <a:rPr lang="en-US" b="0" i="0" dirty="0">
-                <a:solidFill>
-                  <a:srgbClr val="1D1C1D"/>
-                </a:solidFill>
-                <a:effectLst/>
-                <a:latin typeface="Monaco"/>
-              </a:rPr>
-              <a:t>This is one that has stayed varied consistently over time, with less extreme popularity swings as we near the present day. One of primary reason’s for pop music’s existence has always been to get bodies to the dance floor, so it makes sense that this is a reliable variant. The sudden increase towards 2020 is somewhat surprising at first glance given international lockdown measures, but less so when one considers that many socially distanced listeners are/were very likely trying to make themselves feel as if are still at “the party” in some capacity.</a:t>
-            </a:r>
-          </a:p>
-          <a:p>
             <a:endParaRPr lang="en-US" dirty="0"/>
           </a:p>
         </p:txBody>
@@ -1301,7 +2066,7 @@
     </p:spTree>
     <p:extLst>
       <p:ext uri="{BB962C8B-B14F-4D97-AF65-F5344CB8AC3E}">
-        <p14:creationId xmlns:p14="http://schemas.microsoft.com/office/powerpoint/2010/main" val="3677490936"/>
+        <p14:creationId xmlns:p14="http://schemas.microsoft.com/office/powerpoint/2010/main" val="612177856"/>
       </p:ext>
     </p:extLst>
   </p:cSld>
@@ -1357,191 +2122,81 @@
           <a:p>
             <a:pPr algn="l"/>
             <a:r>
-              <a:rPr lang="en-US" b="1" i="0" dirty="0">
-                <a:solidFill>
-                  <a:srgbClr val="1D1C1D"/>
-                </a:solidFill>
+              <a:rPr lang="en-US" b="0" i="0" dirty="0">
                 <a:effectLst/>
-                <a:latin typeface="Monaco"/>
+                <a:latin typeface="Arial" panose="020B0604020202020204" pitchFamily="34" charset="0"/>
               </a:rPr>
-              <a:t>##Duration</a:t>
+              <a:t>•</a:t>
             </a:r>
           </a:p>
           <a:p>
             <a:pPr algn="l"/>
             <a:r>
               <a:rPr lang="en-US" b="0" i="0" dirty="0">
-                <a:solidFill>
-                  <a:srgbClr val="1D1C1D"/>
-                </a:solidFill>
                 <a:effectLst/>
-                <a:latin typeface="Monaco"/>
+                <a:latin typeface="Arial" panose="020B0604020202020204" pitchFamily="34" charset="0"/>
               </a:rPr>
-              <a:t>Like Danceability, this one has held steady over time. What was once dictated by a track’s ability to fit on a record or play on the radio between ad breaks has been solidified by the average listener’s attention span as well. It’s not unheard of for longer suite-style rock songs (</a:t>
-            </a:r>
-            <a:r>
-              <a:rPr lang="en-US" b="0" i="1" dirty="0">
-                <a:solidFill>
-                  <a:srgbClr val="1D1C1D"/>
-                </a:solidFill>
+              <a:t>Hypothesis – There is a relationship between variable x and the popularity of </a:t>
+            </a:r>
+          </a:p>
+          <a:p>
+            <a:pPr algn="l"/>
+            <a:r>
+              <a:rPr lang="en-US" b="0" i="0" dirty="0">
                 <a:effectLst/>
-                <a:latin typeface="Monaco"/>
+                <a:latin typeface="Arial" panose="020B0604020202020204" pitchFamily="34" charset="0"/>
               </a:rPr>
-              <a:t>*Bohemian Rhapsody*</a:t>
-            </a:r>
+              <a:t>the song</a:t>
+            </a:r>
+          </a:p>
+          <a:p>
+            <a:pPr algn="l"/>
             <a:r>
               <a:rPr lang="en-US" b="0" i="0" dirty="0">
-                <a:solidFill>
-                  <a:srgbClr val="1D1C1D"/>
-                </a:solidFill>
                 <a:effectLst/>
-                <a:latin typeface="Monaco"/>
+                <a:latin typeface="Arial" panose="020B0604020202020204" pitchFamily="34" charset="0"/>
               </a:rPr>
-              <a:t> will never die) or extended dance remixes to find success, but the three-to-five minute pop song is virtually as old as the Music Industry and is not going anywhere.</a:t>
+              <a:t>•</a:t>
             </a:r>
           </a:p>
           <a:p>
             <a:pPr algn="l"/>
             <a:r>
               <a:rPr lang="en-US" b="0" i="0" dirty="0">
-                <a:solidFill>
-                  <a:srgbClr val="1D1C1D"/>
-                </a:solidFill>
                 <a:effectLst/>
-                <a:latin typeface="Monaco"/>
+                <a:latin typeface="Arial" panose="020B0604020202020204" pitchFamily="34" charset="0"/>
               </a:rPr>
-              <a:t>​</a:t>
+              <a:t>Null hypothesis- There is no relationship between variable x and the songs </a:t>
             </a:r>
           </a:p>
           <a:p>
             <a:pPr algn="l"/>
             <a:r>
-              <a:rPr lang="en-US" b="1" i="0" dirty="0">
-                <a:solidFill>
-                  <a:srgbClr val="1D1C1D"/>
-                </a:solidFill>
+              <a:rPr lang="en-US" b="0" i="0" dirty="0">
                 <a:effectLst/>
-                <a:latin typeface="Monaco"/>
+                <a:latin typeface="Arial" panose="020B0604020202020204" pitchFamily="34" charset="0"/>
               </a:rPr>
-              <a:t>##Energy</a:t>
+              <a:t>popularity</a:t>
             </a:r>
           </a:p>
           <a:p>
             <a:pPr algn="l"/>
             <a:r>
               <a:rPr lang="en-US" b="0" i="0" dirty="0">
-                <a:solidFill>
-                  <a:srgbClr val="1D1C1D"/>
-                </a:solidFill>
                 <a:effectLst/>
-                <a:latin typeface="Monaco"/>
+                <a:latin typeface="Arial" panose="020B0604020202020204" pitchFamily="34" charset="0"/>
               </a:rPr>
-              <a:t>Popular music has become more energetic as time has gone on. This increase very likely has more to do with the capabilities and innovation of modern instruments. Electric and electronic instrumentation have allowed artists to exponentially increase the energy, and listeners and dance floors have been eager to keep up.</a:t>
+              <a:t>Both variables are numerical we used a Pearson’s Correlation test. We set our Alpha</a:t>
             </a:r>
           </a:p>
           <a:p>
             <a:pPr algn="l"/>
             <a:r>
-              <a:rPr lang="en-US" b="1" i="0" dirty="0">
-                <a:solidFill>
-                  <a:srgbClr val="1D1C1D"/>
-                </a:solidFill>
+              <a:rPr lang="en-US" b="0" i="0" dirty="0">
                 <a:effectLst/>
-                <a:latin typeface="Monaco"/>
+                <a:latin typeface="Arial" panose="020B0604020202020204" pitchFamily="34" charset="0"/>
               </a:rPr>
-              <a:t>​</a:t>
-            </a:r>
-          </a:p>
-          <a:p>
-            <a:pPr algn="l"/>
-            <a:r>
-              <a:rPr lang="en-US" b="1" i="0" dirty="0">
-                <a:solidFill>
-                  <a:srgbClr val="1D1C1D"/>
-                </a:solidFill>
-                <a:effectLst/>
-                <a:latin typeface="Monaco"/>
-              </a:rPr>
-              <a:t>##Explicitness</a:t>
-            </a:r>
-          </a:p>
-          <a:p>
-            <a:pPr algn="l"/>
-            <a:r>
-              <a:rPr lang="en-US" b="0" i="0" dirty="0">
-                <a:solidFill>
-                  <a:srgbClr val="1D1C1D"/>
-                </a:solidFill>
-                <a:effectLst/>
-                <a:latin typeface="Monaco"/>
-              </a:rPr>
-              <a:t>The popularity of explicit songs has increased over time as well. They used to be basically non-existent, but cultural standards (particularly around the late ‘60s) began to loosen in relation to what was allowed on disc. Where making a song that couldn’t be played on the radio was once a deal-breaker for many artists, the largely streaming-based nature of most music (and the perpetually near-impossible nature of actually getting a song on the radio) now makes the decision of how explicit a song should be less relevant to many artists. This gives them significantly more freedom.</a:t>
-            </a:r>
-          </a:p>
-          <a:p>
-            <a:pPr algn="l"/>
-            <a:r>
-              <a:rPr lang="en-US" b="0" i="0" dirty="0">
-                <a:solidFill>
-                  <a:srgbClr val="1D1C1D"/>
-                </a:solidFill>
-                <a:effectLst/>
-                <a:latin typeface="Monaco"/>
-              </a:rPr>
-              <a:t>​</a:t>
-            </a:r>
-          </a:p>
-          <a:p>
-            <a:pPr algn="l"/>
-            <a:r>
-              <a:rPr lang="en-US" b="0" i="0" dirty="0">
-                <a:solidFill>
-                  <a:srgbClr val="1D1C1D"/>
-                </a:solidFill>
-                <a:effectLst/>
-                <a:latin typeface="Monaco"/>
-              </a:rPr>
-              <a:t>And most listeners do not seem put off by the explicit nature of popular songs. Just like popular cable shows like </a:t>
-            </a:r>
-            <a:r>
-              <a:rPr lang="en-US" b="0" i="1" dirty="0">
-                <a:solidFill>
-                  <a:srgbClr val="1D1C1D"/>
-                </a:solidFill>
-                <a:effectLst/>
-                <a:latin typeface="Monaco"/>
-              </a:rPr>
-              <a:t>*The Sopranos*</a:t>
-            </a:r>
-            <a:r>
-              <a:rPr lang="en-US" b="0" i="0" dirty="0">
-                <a:solidFill>
-                  <a:srgbClr val="1D1C1D"/>
-                </a:solidFill>
-                <a:effectLst/>
-                <a:latin typeface="Monaco"/>
-              </a:rPr>
-              <a:t> and </a:t>
-            </a:r>
-            <a:r>
-              <a:rPr lang="en-US" b="0" i="1" dirty="0">
-                <a:solidFill>
-                  <a:srgbClr val="1D1C1D"/>
-                </a:solidFill>
-                <a:effectLst/>
-                <a:latin typeface="Monaco"/>
-              </a:rPr>
-              <a:t>*Game of Thrones*</a:t>
-            </a:r>
-            <a:r>
-              <a:rPr lang="en-US" b="0" i="0" dirty="0">
-                <a:solidFill>
-                  <a:srgbClr val="1D1C1D"/>
-                </a:solidFill>
-                <a:effectLst/>
-                <a:latin typeface="Monaco"/>
-              </a:rPr>
-              <a:t> offer viewers with “premium” content often more explicit than what they can see in movie theaters, occasional explicit words or themes can remind listeners that they are getting their money’s worth over the same handful of “clean edits” that make their way into popular radio rotation.</a:t>
+              <a:t>value to be 0.05</a:t>
             </a:r>
           </a:p>
           <a:p>
@@ -1575,7 +2230,7 @@
     </p:spTree>
     <p:extLst>
       <p:ext uri="{BB962C8B-B14F-4D97-AF65-F5344CB8AC3E}">
-        <p14:creationId xmlns:p14="http://schemas.microsoft.com/office/powerpoint/2010/main" val="582708718"/>
+        <p14:creationId xmlns:p14="http://schemas.microsoft.com/office/powerpoint/2010/main" val="128223356"/>
       </p:ext>
     </p:extLst>
   </p:cSld>
@@ -1629,6 +2284,45 @@
           <a:bodyPr/>
           <a:lstStyle/>
           <a:p>
+            <a:pPr algn="l"/>
+            <a:r>
+              <a:rPr lang="en-US" b="0" i="0" dirty="0">
+                <a:solidFill>
+                  <a:srgbClr val="1D1C1D"/>
+                </a:solidFill>
+                <a:effectLst/>
+                <a:latin typeface="Monaco"/>
+              </a:rPr>
+              <a:t>##Energy</a:t>
+            </a:r>
+          </a:p>
+          <a:p>
+            <a:pPr algn="l"/>
+            <a:r>
+              <a:rPr lang="en-US" b="0" i="0" dirty="0">
+                <a:solidFill>
+                  <a:srgbClr val="1D1C1D"/>
+                </a:solidFill>
+                <a:effectLst/>
+                <a:latin typeface="Monaco"/>
+              </a:rPr>
+              <a:t>Popular music has become more energetic as time has gone on. This increase very likely has more to do with the capabilities and innovation of modern instruments. Electric and electronic instrumentation have allowed artists to exponentially increase the energy, and listeners and dance floors have been eager to keep up.</a:t>
+            </a:r>
+          </a:p>
+          <a:p>
+            <a:pPr algn="l"/>
+            <a:r>
+              <a:rPr lang="en-US" b="0" i="0" dirty="0">
+                <a:solidFill>
+                  <a:srgbClr val="1D1C1D"/>
+                </a:solidFill>
+                <a:effectLst/>
+                <a:latin typeface="Monaco"/>
+              </a:rPr>
+              <a:t>​</a:t>
+            </a:r>
+          </a:p>
+          <a:p>
             <a:endParaRPr lang="en-US" dirty="0"/>
           </a:p>
         </p:txBody>
@@ -1650,7 +2344,7 @@
           <a:p>
             <a:fld id="{3E3BB913-60C7-43E3-B2B5-53B86365DC39}" type="slidenum">
               <a:rPr lang="en-US" smtClean="0"/>
-              <a:t>9</a:t>
+              <a:t>8</a:t>
             </a:fld>
             <a:endParaRPr lang="en-US"/>
           </a:p>
@@ -1659,7 +2353,7 @@
     </p:spTree>
     <p:extLst>
       <p:ext uri="{BB962C8B-B14F-4D97-AF65-F5344CB8AC3E}">
-        <p14:creationId xmlns:p14="http://schemas.microsoft.com/office/powerpoint/2010/main" val="444601832"/>
+        <p14:creationId xmlns:p14="http://schemas.microsoft.com/office/powerpoint/2010/main" val="3677490936"/>
       </p:ext>
     </p:extLst>
   </p:cSld>
@@ -1713,100 +2407,53 @@
           <a:bodyPr/>
           <a:lstStyle/>
           <a:p>
-            <a:r>
-              <a:rPr lang="en-US" b="1" dirty="0"/>
-              <a:t>Problem solving along the way: </a:t>
-            </a:r>
-          </a:p>
-          <a:p>
-            <a:r>
-              <a:rPr lang="en-US" dirty="0"/>
-              <a:t>Our approach was to split up the work load and really dive into the material individually that they had chosen or been assigned.</a:t>
-            </a:r>
-          </a:p>
-          <a:p>
-            <a:r>
-              <a:rPr lang="en-US" dirty="0"/>
-              <a:t>When people got stuck we were able to come together as a team and look through to see if we needed to adjust code, attack the data in a different way, or change the question being asked to something plausible</a:t>
-            </a:r>
-          </a:p>
-          <a:p>
-            <a:r>
-              <a:rPr lang="en-US" dirty="0"/>
-              <a:t>By approaching problems this way we were able to leverage all of our strengths into a cohesive unit and kept progress moving</a:t>
+            <a:pPr algn="l"/>
+            <a:r>
+              <a:rPr lang="en-US" b="1" i="0" dirty="0">
+                <a:solidFill>
+                  <a:srgbClr val="1D1C1D"/>
+                </a:solidFill>
+                <a:effectLst/>
+                <a:latin typeface="Monaco"/>
+              </a:rPr>
+              <a:t>##Acousticness</a:t>
+            </a:r>
+          </a:p>
+          <a:p>
+            <a:pPr algn="l"/>
+            <a:r>
+              <a:rPr lang="en-US" b="0" i="0" dirty="0">
+                <a:solidFill>
+                  <a:srgbClr val="1D1C1D"/>
+                </a:solidFill>
+                <a:effectLst/>
+                <a:latin typeface="Monaco"/>
+              </a:rPr>
+              <a:t>The similarity between the graphs for both most popular and least popular songs by </a:t>
+            </a:r>
+            <a:r>
+              <a:rPr lang="en-US" b="0" i="0" dirty="0" err="1">
+                <a:solidFill>
+                  <a:srgbClr val="1D1C1D"/>
+                </a:solidFill>
+                <a:effectLst/>
+                <a:latin typeface="Monaco"/>
+              </a:rPr>
+              <a:t>Acousticness</a:t>
+            </a:r>
+            <a:r>
+              <a:rPr lang="en-US" b="0" i="0" dirty="0">
+                <a:solidFill>
+                  <a:srgbClr val="1D1C1D"/>
+                </a:solidFill>
+                <a:effectLst/>
+                <a:latin typeface="Monaco"/>
+              </a:rPr>
+              <a:t> speaks towards the decrease in popularity of acoustic instrumentation in contemporary popular music. A far-cry from the audience that sparked a now legendary near-riot when Dylan went electric in 1965 at the Newport Folk Festival, today’s listeners show a clear preference towards songs with electric/electronic instrumentation. Acoustic vs electric/electronic is now more of a matter of choice for musicians, and the meaning of sounds has thus changed over time. To most contemporary listeners, acoustic instrumentation often sets the expectation that a song or album will be of the more introspective singer/songwriter variety (think John Mayer or Sufjan Stevens) and very likely “sad”. With this in mind, it should not come to a surprise that listeners looking to lift their spirits during the Pandemic seem to have been drawn more towards less Acoustic music. </a:t>
             </a:r>
           </a:p>
           <a:p>
             <a:endParaRPr lang="en-US" dirty="0"/>
-          </a:p>
-          <a:p>
-            <a:r>
-              <a:rPr lang="en-US" b="1" dirty="0"/>
-              <a:t>Expanded research possibilities</a:t>
-            </a:r>
-          </a:p>
-          <a:p>
-            <a:pPr marL="0" indent="0">
-              <a:buFontTx/>
-              <a:buNone/>
-            </a:pPr>
-            <a:r>
-              <a:rPr lang="en-US" b="0" dirty="0"/>
-              <a:t>Taking the time periods leading up to and immediately following major world events to see how music was altered</a:t>
-            </a:r>
-          </a:p>
-          <a:p>
-            <a:pPr marL="0" indent="0">
-              <a:buFontTx/>
-              <a:buNone/>
-            </a:pPr>
-            <a:r>
-              <a:rPr lang="en-US" b="0" dirty="0"/>
-              <a:t>Or doing the same thing but with specific influential artists </a:t>
-            </a:r>
-            <a:r>
-              <a:rPr lang="en-US" b="0" dirty="0" err="1"/>
-              <a:t>ie</a:t>
-            </a:r>
-            <a:r>
-              <a:rPr lang="en-US" b="0" dirty="0"/>
-              <a:t>.- </a:t>
-            </a:r>
-            <a:r>
-              <a:rPr lang="en-US" b="0" dirty="0" err="1"/>
-              <a:t>beatles</a:t>
-            </a:r>
-            <a:r>
-              <a:rPr lang="en-US" b="0" dirty="0"/>
-              <a:t>, NWA, Elvis, </a:t>
-            </a:r>
-          </a:p>
-          <a:p>
-            <a:pPr marL="0" indent="0">
-              <a:buFontTx/>
-              <a:buNone/>
-            </a:pPr>
-            <a:r>
-              <a:rPr lang="en-US" b="0" dirty="0"/>
-              <a:t>Take our approach from a decade by decade approach</a:t>
-            </a:r>
-          </a:p>
-          <a:p>
-            <a:pPr marL="0" indent="0">
-              <a:buFontTx/>
-              <a:buNone/>
-            </a:pPr>
-            <a:r>
-              <a:rPr lang="en-US" b="0" dirty="0"/>
-              <a:t>Assign value ranges for genres to consolidate the genre list that is present in this dataset</a:t>
-            </a:r>
-          </a:p>
-          <a:p>
-            <a:pPr marL="0" indent="0">
-              <a:buFontTx/>
-              <a:buNone/>
-            </a:pPr>
-            <a:endParaRPr lang="en-US" b="1" dirty="0"/>
           </a:p>
         </p:txBody>
       </p:sp>
@@ -1827,7 +2474,7 @@
           <a:p>
             <a:fld id="{3E3BB913-60C7-43E3-B2B5-53B86365DC39}" type="slidenum">
               <a:rPr lang="en-US" smtClean="0"/>
-              <a:t>10</a:t>
+              <a:t>9</a:t>
             </a:fld>
             <a:endParaRPr lang="en-US"/>
           </a:p>
@@ -1836,7 +2483,7 @@
     </p:spTree>
     <p:extLst>
       <p:ext uri="{BB962C8B-B14F-4D97-AF65-F5344CB8AC3E}">
-        <p14:creationId xmlns:p14="http://schemas.microsoft.com/office/powerpoint/2010/main" val="4171389560"/>
+        <p14:creationId xmlns:p14="http://schemas.microsoft.com/office/powerpoint/2010/main" val="460662706"/>
       </p:ext>
     </p:extLst>
   </p:cSld>
@@ -1890,6 +2537,52 @@
           <a:bodyPr/>
           <a:lstStyle/>
           <a:p>
+            <a:pPr algn="l"/>
+            <a:r>
+              <a:rPr lang="en-US" b="0" i="0" dirty="0">
+                <a:solidFill>
+                  <a:srgbClr val="1D1C1D"/>
+                </a:solidFill>
+                <a:effectLst/>
+                <a:latin typeface="Monaco"/>
+              </a:rPr>
+              <a:t>##Instrumentalness</a:t>
+            </a:r>
+          </a:p>
+          <a:p>
+            <a:pPr algn="l"/>
+            <a:r>
+              <a:rPr lang="en-US" b="0" i="0" dirty="0">
+                <a:solidFill>
+                  <a:srgbClr val="1D1C1D"/>
+                </a:solidFill>
+                <a:effectLst/>
+                <a:latin typeface="Monaco"/>
+              </a:rPr>
+              <a:t>As improvements in recording technology made it easier for artists to mix vocal tracks into their recordings, listeners have essentially never looked back. By 1960, songs without vocals nearly flatline in popularity. The only significant outlier is the sudden increase just after the year 2000 on the graph. This can almost certainly be attributed to Daft Punk’s Electronic Dance Music album </a:t>
+            </a:r>
+            <a:r>
+              <a:rPr lang="en-US" b="0" i="1" dirty="0">
+                <a:solidFill>
+                  <a:srgbClr val="1D1C1D"/>
+                </a:solidFill>
+                <a:effectLst/>
+                <a:latin typeface="Monaco"/>
+              </a:rPr>
+              <a:t>*Discovery*</a:t>
+            </a:r>
+            <a:r>
+              <a:rPr lang="en-US" b="0" i="0" dirty="0">
+                <a:solidFill>
+                  <a:srgbClr val="1D1C1D"/>
+                </a:solidFill>
+                <a:effectLst/>
+                <a:latin typeface="Monaco"/>
+              </a:rPr>
+              <a:t>, which was released to enormous popularity in 2001 and spawned countless imitators while blurring the already fuzzy lines between rock music and dance music.</a:t>
+            </a:r>
+          </a:p>
+          <a:p>
             <a:endParaRPr lang="en-US" dirty="0"/>
           </a:p>
         </p:txBody>
@@ -1911,7 +2604,7 @@
           <a:p>
             <a:fld id="{3E3BB913-60C7-43E3-B2B5-53B86365DC39}" type="slidenum">
               <a:rPr lang="en-US" smtClean="0"/>
-              <a:t>11</a:t>
+              <a:t>10</a:t>
             </a:fld>
             <a:endParaRPr lang="en-US"/>
           </a:p>
@@ -1920,7 +2613,7 @@
     </p:spTree>
     <p:extLst>
       <p:ext uri="{BB962C8B-B14F-4D97-AF65-F5344CB8AC3E}">
-        <p14:creationId xmlns:p14="http://schemas.microsoft.com/office/powerpoint/2010/main" val="1287062211"/>
+        <p14:creationId xmlns:p14="http://schemas.microsoft.com/office/powerpoint/2010/main" val="1568351864"/>
       </p:ext>
     </p:extLst>
   </p:cSld>
@@ -2152,7 +2845,7 @@
             <a:fld id="{A37D6D71-8B28-4ED6-B932-04B197003D23}" type="datetimeFigureOut">
               <a:rPr lang="en-US" smtClean="0"/>
               <a:pPr algn="r"/>
-              <a:t>4/4/2021</a:t>
+              <a:t>4/5/2021</a:t>
             </a:fld>
             <a:endParaRPr lang="en-US" dirty="0"/>
           </a:p>
@@ -2377,7 +3070,7 @@
             <a:fld id="{A37D6D71-8B28-4ED6-B932-04B197003D23}" type="datetimeFigureOut">
               <a:rPr lang="en-US" smtClean="0"/>
               <a:pPr algn="r"/>
-              <a:t>4/4/2021</a:t>
+              <a:t>4/5/2021</a:t>
             </a:fld>
             <a:endParaRPr lang="en-US" dirty="0"/>
           </a:p>
@@ -2663,7 +3356,7 @@
             <a:fld id="{A37D6D71-8B28-4ED6-B932-04B197003D23}" type="datetimeFigureOut">
               <a:rPr lang="en-US" smtClean="0"/>
               <a:pPr algn="r"/>
-              <a:t>4/4/2021</a:t>
+              <a:t>4/5/2021</a:t>
             </a:fld>
             <a:endParaRPr lang="en-US" dirty="0"/>
           </a:p>
@@ -2880,7 +3573,7 @@
             <a:fld id="{A37D6D71-8B28-4ED6-B932-04B197003D23}" type="datetimeFigureOut">
               <a:rPr lang="en-US" smtClean="0"/>
               <a:pPr algn="r"/>
-              <a:t>4/4/2021</a:t>
+              <a:t>4/5/2021</a:t>
             </a:fld>
             <a:endParaRPr lang="en-US" dirty="0"/>
           </a:p>
@@ -3221,7 +3914,7 @@
             <a:fld id="{A37D6D71-8B28-4ED6-B932-04B197003D23}" type="datetimeFigureOut">
               <a:rPr lang="en-US" smtClean="0"/>
               <a:pPr algn="r"/>
-              <a:t>4/4/2021</a:t>
+              <a:t>4/5/2021</a:t>
             </a:fld>
             <a:endParaRPr lang="en-US" dirty="0"/>
           </a:p>
@@ -3499,7 +4192,7 @@
             <a:fld id="{A37D6D71-8B28-4ED6-B932-04B197003D23}" type="datetimeFigureOut">
               <a:rPr lang="en-US" smtClean="0"/>
               <a:pPr algn="r"/>
-              <a:t>4/4/2021</a:t>
+              <a:t>4/5/2021</a:t>
             </a:fld>
             <a:endParaRPr lang="en-US" dirty="0"/>
           </a:p>
@@ -3891,7 +4584,7 @@
             <a:fld id="{A37D6D71-8B28-4ED6-B932-04B197003D23}" type="datetimeFigureOut">
               <a:rPr lang="en-US" smtClean="0"/>
               <a:pPr algn="r"/>
-              <a:t>4/4/2021</a:t>
+              <a:t>4/5/2021</a:t>
             </a:fld>
             <a:endParaRPr lang="en-US" dirty="0"/>
           </a:p>
@@ -4071,7 +4764,7 @@
             <a:fld id="{A37D6D71-8B28-4ED6-B932-04B197003D23}" type="datetimeFigureOut">
               <a:rPr lang="en-US" smtClean="0"/>
               <a:pPr algn="r"/>
-              <a:t>4/4/2021</a:t>
+              <a:t>4/5/2021</a:t>
             </a:fld>
             <a:endParaRPr lang="en-US" dirty="0"/>
           </a:p>
@@ -4195,7 +4888,7 @@
             <a:fld id="{A37D6D71-8B28-4ED6-B932-04B197003D23}" type="datetimeFigureOut">
               <a:rPr lang="en-US" smtClean="0"/>
               <a:pPr algn="r"/>
-              <a:t>4/4/2021</a:t>
+              <a:t>4/5/2021</a:t>
             </a:fld>
             <a:endParaRPr lang="en-US" dirty="0"/>
           </a:p>
@@ -4483,7 +5176,7 @@
             <a:fld id="{A37D6D71-8B28-4ED6-B932-04B197003D23}" type="datetimeFigureOut">
               <a:rPr lang="en-US" smtClean="0"/>
               <a:pPr algn="r"/>
-              <a:t>4/4/2021</a:t>
+              <a:t>4/5/2021</a:t>
             </a:fld>
             <a:endParaRPr lang="en-US" dirty="0"/>
           </a:p>
@@ -4787,7 +5480,7 @@
             <a:fld id="{A37D6D71-8B28-4ED6-B932-04B197003D23}" type="datetimeFigureOut">
               <a:rPr lang="en-US" smtClean="0"/>
               <a:pPr algn="r"/>
-              <a:t>4/4/2021</a:t>
+              <a:t>4/5/2021</a:t>
             </a:fld>
             <a:endParaRPr lang="en-US" dirty="0"/>
           </a:p>
@@ -5138,7 +5831,7 @@
             <a:fld id="{A37D6D71-8B28-4ED6-B932-04B197003D23}" type="datetimeFigureOut">
               <a:rPr lang="en-US" smtClean="0"/>
               <a:pPr algn="r"/>
-              <a:t>4/4/2021</a:t>
+              <a:t>4/5/2021</a:t>
             </a:fld>
             <a:endParaRPr lang="en-US" spc="50" dirty="0"/>
           </a:p>
@@ -5882,6 +6575,1220 @@
           <a:lstStyle/>
           <a:p>
             <a:r>
+              <a:rPr lang="en-US" sz="5400" dirty="0" err="1"/>
+              <a:t>Instrumentalness</a:t>
+            </a:r>
+            <a:endParaRPr lang="en-US" sz="5400" dirty="0"/>
+          </a:p>
+        </p:txBody>
+      </p:sp>
+      <p:pic>
+        <p:nvPicPr>
+          <p:cNvPr id="1032" name="Picture 8" descr="Music notes sign Pink neon icon in the brick wall - stock vector |  Crushpixel">
+            <a:extLst>
+              <a:ext uri="{FF2B5EF4-FFF2-40B4-BE49-F238E27FC236}">
+                <a16:creationId xmlns:a16="http://schemas.microsoft.com/office/drawing/2014/main" id="{FCFF1D86-4905-429B-BDC1-BB20988244CF}"/>
+              </a:ext>
+            </a:extLst>
+          </p:cNvPr>
+          <p:cNvPicPr>
+            <a:picLocks noChangeAspect="1" noChangeArrowheads="1"/>
+          </p:cNvPicPr>
+          <p:nvPr/>
+        </p:nvPicPr>
+        <p:blipFill>
+          <a:blip r:embed="rId3">
+            <a:extLst>
+              <a:ext uri="{28A0092B-C50C-407E-A947-70E740481C1C}">
+                <a14:useLocalDpi xmlns:a14="http://schemas.microsoft.com/office/drawing/2010/main" val="0"/>
+              </a:ext>
+            </a:extLst>
+          </a:blip>
+          <a:srcRect/>
+          <a:stretch>
+            <a:fillRect/>
+          </a:stretch>
+        </p:blipFill>
+        <p:spPr bwMode="auto">
+          <a:xfrm>
+            <a:off x="9559637" y="0"/>
+            <a:ext cx="2632364" cy="2216727"/>
+          </a:xfrm>
+          <a:prstGeom prst="rect">
+            <a:avLst/>
+          </a:prstGeom>
+          <a:noFill/>
+          <a:extLst>
+            <a:ext uri="{909E8E84-426E-40DD-AFC4-6F175D3DCCD1}">
+              <a14:hiddenFill xmlns:a14="http://schemas.microsoft.com/office/drawing/2010/main">
+                <a:solidFill>
+                  <a:srgbClr val="FFFFFF"/>
+                </a:solidFill>
+              </a14:hiddenFill>
+            </a:ext>
+          </a:extLst>
+        </p:spPr>
+      </p:pic>
+      <p:pic>
+        <p:nvPicPr>
+          <p:cNvPr id="7" name="Content Placeholder 4" descr="Graphical user interface, application&#10;&#10;Description automatically generated with medium confidence">
+            <a:extLst>
+              <a:ext uri="{FF2B5EF4-FFF2-40B4-BE49-F238E27FC236}">
+                <a16:creationId xmlns:a16="http://schemas.microsoft.com/office/drawing/2014/main" id="{AC6DFCDD-B209-4528-AFBF-4AE087C925DA}"/>
+              </a:ext>
+            </a:extLst>
+          </p:cNvPr>
+          <p:cNvPicPr>
+            <a:picLocks noChangeAspect="1"/>
+          </p:cNvPicPr>
+          <p:nvPr/>
+        </p:nvPicPr>
+        <p:blipFill rotWithShape="1">
+          <a:blip r:embed="rId4">
+            <a:extLst>
+              <a:ext uri="{28A0092B-C50C-407E-A947-70E740481C1C}">
+                <a14:useLocalDpi xmlns:a14="http://schemas.microsoft.com/office/drawing/2010/main" val="0"/>
+              </a:ext>
+            </a:extLst>
+          </a:blip>
+          <a:srcRect l="1006" t="3306" r="80976" b="74979"/>
+          <a:stretch/>
+        </p:blipFill>
+        <p:spPr>
+          <a:xfrm>
+            <a:off x="244161" y="2436993"/>
+            <a:ext cx="5152592" cy="4428013"/>
+          </a:xfrm>
+          <a:prstGeom prst="rect">
+            <a:avLst/>
+          </a:prstGeom>
+        </p:spPr>
+      </p:pic>
+      <p:pic>
+        <p:nvPicPr>
+          <p:cNvPr id="6146" name="Picture 2" descr="Instrumentalness">
+            <a:extLst>
+              <a:ext uri="{FF2B5EF4-FFF2-40B4-BE49-F238E27FC236}">
+                <a16:creationId xmlns:a16="http://schemas.microsoft.com/office/drawing/2014/main" id="{551A7CF3-6642-4EAB-87DB-0F7161F4CD68}"/>
+              </a:ext>
+            </a:extLst>
+          </p:cNvPr>
+          <p:cNvPicPr>
+            <a:picLocks noChangeAspect="1" noChangeArrowheads="1"/>
+          </p:cNvPicPr>
+          <p:nvPr/>
+        </p:nvPicPr>
+        <p:blipFill>
+          <a:blip r:embed="rId5">
+            <a:extLst>
+              <a:ext uri="{28A0092B-C50C-407E-A947-70E740481C1C}">
+                <a14:useLocalDpi xmlns:a14="http://schemas.microsoft.com/office/drawing/2010/main" val="0"/>
+              </a:ext>
+            </a:extLst>
+          </a:blip>
+          <a:srcRect/>
+          <a:stretch>
+            <a:fillRect/>
+          </a:stretch>
+        </p:blipFill>
+        <p:spPr bwMode="auto">
+          <a:xfrm>
+            <a:off x="5518999" y="2887798"/>
+            <a:ext cx="6257085" cy="3238457"/>
+          </a:xfrm>
+          <a:prstGeom prst="rect">
+            <a:avLst/>
+          </a:prstGeom>
+          <a:noFill/>
+          <a:extLst>
+            <a:ext uri="{909E8E84-426E-40DD-AFC4-6F175D3DCCD1}">
+              <a14:hiddenFill xmlns:a14="http://schemas.microsoft.com/office/drawing/2010/main">
+                <a:solidFill>
+                  <a:srgbClr val="FFFFFF"/>
+                </a:solidFill>
+              </a14:hiddenFill>
+            </a:ext>
+          </a:extLst>
+        </p:spPr>
+      </p:pic>
+    </p:spTree>
+    <p:extLst>
+      <p:ext uri="{BB962C8B-B14F-4D97-AF65-F5344CB8AC3E}">
+        <p14:creationId xmlns:p14="http://schemas.microsoft.com/office/powerpoint/2010/main" val="3419562103"/>
+      </p:ext>
+    </p:extLst>
+  </p:cSld>
+  <p:clrMapOvr>
+    <a:masterClrMapping/>
+  </p:clrMapOvr>
+  <p:transition>
+    <p:wipe/>
+  </p:transition>
+</p:sld>
+</file>
+
+<file path=ppt/slides/slide11.xml><?xml version="1.0" encoding="utf-8"?>
+<p:sld xmlns:a="http://schemas.openxmlformats.org/drawingml/2006/main" xmlns:r="http://schemas.openxmlformats.org/officeDocument/2006/relationships" xmlns:p="http://schemas.openxmlformats.org/presentationml/2006/main">
+  <p:cSld>
+    <p:spTree>
+      <p:nvGrpSpPr>
+        <p:cNvPr id="1" name=""/>
+        <p:cNvGrpSpPr/>
+        <p:nvPr/>
+      </p:nvGrpSpPr>
+      <p:grpSpPr>
+        <a:xfrm>
+          <a:off x="0" y="0"/>
+          <a:ext cx="0" cy="0"/>
+          <a:chOff x="0" y="0"/>
+          <a:chExt cx="0" cy="0"/>
+        </a:xfrm>
+      </p:grpSpPr>
+      <p:sp>
+        <p:nvSpPr>
+          <p:cNvPr id="2" name="Title 1">
+            <a:extLst>
+              <a:ext uri="{FF2B5EF4-FFF2-40B4-BE49-F238E27FC236}">
+                <a16:creationId xmlns:a16="http://schemas.microsoft.com/office/drawing/2014/main" id="{FE04FC5D-740C-495D-BE03-23B345B8902E}"/>
+              </a:ext>
+            </a:extLst>
+          </p:cNvPr>
+          <p:cNvSpPr>
+            <a:spLocks noGrp="1"/>
+          </p:cNvSpPr>
+          <p:nvPr>
+            <p:ph type="title"/>
+          </p:nvPr>
+        </p:nvSpPr>
+        <p:spPr/>
+        <p:txBody>
+          <a:bodyPr anchor="ctr">
+            <a:normAutofit/>
+          </a:bodyPr>
+          <a:lstStyle/>
+          <a:p>
+            <a:r>
+              <a:rPr lang="en-US" sz="5400" dirty="0"/>
+              <a:t>Key</a:t>
+            </a:r>
+          </a:p>
+        </p:txBody>
+      </p:sp>
+      <p:pic>
+        <p:nvPicPr>
+          <p:cNvPr id="1032" name="Picture 8" descr="Music notes sign Pink neon icon in the brick wall - stock vector |  Crushpixel">
+            <a:extLst>
+              <a:ext uri="{FF2B5EF4-FFF2-40B4-BE49-F238E27FC236}">
+                <a16:creationId xmlns:a16="http://schemas.microsoft.com/office/drawing/2014/main" id="{FCFF1D86-4905-429B-BDC1-BB20988244CF}"/>
+              </a:ext>
+            </a:extLst>
+          </p:cNvPr>
+          <p:cNvPicPr>
+            <a:picLocks noChangeAspect="1" noChangeArrowheads="1"/>
+          </p:cNvPicPr>
+          <p:nvPr/>
+        </p:nvPicPr>
+        <p:blipFill>
+          <a:blip r:embed="rId3">
+            <a:extLst>
+              <a:ext uri="{28A0092B-C50C-407E-A947-70E740481C1C}">
+                <a14:useLocalDpi xmlns:a14="http://schemas.microsoft.com/office/drawing/2010/main" val="0"/>
+              </a:ext>
+            </a:extLst>
+          </a:blip>
+          <a:srcRect/>
+          <a:stretch>
+            <a:fillRect/>
+          </a:stretch>
+        </p:blipFill>
+        <p:spPr bwMode="auto">
+          <a:xfrm>
+            <a:off x="9559637" y="0"/>
+            <a:ext cx="2632364" cy="2216727"/>
+          </a:xfrm>
+          <a:prstGeom prst="rect">
+            <a:avLst/>
+          </a:prstGeom>
+          <a:noFill/>
+          <a:extLst>
+            <a:ext uri="{909E8E84-426E-40DD-AFC4-6F175D3DCCD1}">
+              <a14:hiddenFill xmlns:a14="http://schemas.microsoft.com/office/drawing/2010/main">
+                <a:solidFill>
+                  <a:srgbClr val="FFFFFF"/>
+                </a:solidFill>
+              </a14:hiddenFill>
+            </a:ext>
+          </a:extLst>
+        </p:spPr>
+      </p:pic>
+      <p:pic>
+        <p:nvPicPr>
+          <p:cNvPr id="1026" name="Picture 2">
+            <a:extLst>
+              <a:ext uri="{FF2B5EF4-FFF2-40B4-BE49-F238E27FC236}">
+                <a16:creationId xmlns:a16="http://schemas.microsoft.com/office/drawing/2014/main" id="{E4DD7AE2-6F0C-48EF-9890-C98CA11DCF7A}"/>
+              </a:ext>
+            </a:extLst>
+          </p:cNvPr>
+          <p:cNvPicPr>
+            <a:picLocks noChangeAspect="1" noChangeArrowheads="1"/>
+          </p:cNvPicPr>
+          <p:nvPr/>
+        </p:nvPicPr>
+        <p:blipFill>
+          <a:blip r:embed="rId4">
+            <a:extLst>
+              <a:ext uri="{28A0092B-C50C-407E-A947-70E740481C1C}">
+                <a14:useLocalDpi xmlns:a14="http://schemas.microsoft.com/office/drawing/2010/main" val="0"/>
+              </a:ext>
+            </a:extLst>
+          </a:blip>
+          <a:srcRect/>
+          <a:stretch>
+            <a:fillRect/>
+          </a:stretch>
+        </p:blipFill>
+        <p:spPr bwMode="auto">
+          <a:xfrm>
+            <a:off x="140073" y="2545976"/>
+            <a:ext cx="5544031" cy="4312024"/>
+          </a:xfrm>
+          <a:prstGeom prst="rect">
+            <a:avLst/>
+          </a:prstGeom>
+          <a:noFill/>
+          <a:extLst>
+            <a:ext uri="{909E8E84-426E-40DD-AFC4-6F175D3DCCD1}">
+              <a14:hiddenFill xmlns:a14="http://schemas.microsoft.com/office/drawing/2010/main">
+                <a:solidFill>
+                  <a:srgbClr val="FFFFFF"/>
+                </a:solidFill>
+              </a14:hiddenFill>
+            </a:ext>
+          </a:extLst>
+        </p:spPr>
+      </p:pic>
+      <p:pic>
+        <p:nvPicPr>
+          <p:cNvPr id="1028" name="Picture 4" descr="Key">
+            <a:extLst>
+              <a:ext uri="{FF2B5EF4-FFF2-40B4-BE49-F238E27FC236}">
+                <a16:creationId xmlns:a16="http://schemas.microsoft.com/office/drawing/2014/main" id="{A63D1263-DAF3-4CB4-94C4-5892A75177BA}"/>
+              </a:ext>
+            </a:extLst>
+          </p:cNvPr>
+          <p:cNvPicPr>
+            <a:picLocks noChangeAspect="1" noChangeArrowheads="1"/>
+          </p:cNvPicPr>
+          <p:nvPr/>
+        </p:nvPicPr>
+        <p:blipFill>
+          <a:blip r:embed="rId5">
+            <a:extLst>
+              <a:ext uri="{28A0092B-C50C-407E-A947-70E740481C1C}">
+                <a14:useLocalDpi xmlns:a14="http://schemas.microsoft.com/office/drawing/2010/main" val="0"/>
+              </a:ext>
+            </a:extLst>
+          </a:blip>
+          <a:srcRect/>
+          <a:stretch>
+            <a:fillRect/>
+          </a:stretch>
+        </p:blipFill>
+        <p:spPr bwMode="auto">
+          <a:xfrm>
+            <a:off x="6095518" y="3428750"/>
+            <a:ext cx="5544032" cy="2876800"/>
+          </a:xfrm>
+          <a:prstGeom prst="rect">
+            <a:avLst/>
+          </a:prstGeom>
+          <a:noFill/>
+          <a:extLst>
+            <a:ext uri="{909E8E84-426E-40DD-AFC4-6F175D3DCCD1}">
+              <a14:hiddenFill xmlns:a14="http://schemas.microsoft.com/office/drawing/2010/main">
+                <a:solidFill>
+                  <a:srgbClr val="FFFFFF"/>
+                </a:solidFill>
+              </a14:hiddenFill>
+            </a:ext>
+          </a:extLst>
+        </p:spPr>
+      </p:pic>
+    </p:spTree>
+    <p:extLst>
+      <p:ext uri="{BB962C8B-B14F-4D97-AF65-F5344CB8AC3E}">
+        <p14:creationId xmlns:p14="http://schemas.microsoft.com/office/powerpoint/2010/main" val="302686026"/>
+      </p:ext>
+    </p:extLst>
+  </p:cSld>
+  <p:clrMapOvr>
+    <a:masterClrMapping/>
+  </p:clrMapOvr>
+  <p:transition>
+    <p:wipe/>
+  </p:transition>
+</p:sld>
+</file>
+
+<file path=ppt/slides/slide12.xml><?xml version="1.0" encoding="utf-8"?>
+<p:sld xmlns:a="http://schemas.openxmlformats.org/drawingml/2006/main" xmlns:r="http://schemas.openxmlformats.org/officeDocument/2006/relationships" xmlns:p="http://schemas.openxmlformats.org/presentationml/2006/main">
+  <p:cSld>
+    <p:spTree>
+      <p:nvGrpSpPr>
+        <p:cNvPr id="1" name=""/>
+        <p:cNvGrpSpPr/>
+        <p:nvPr/>
+      </p:nvGrpSpPr>
+      <p:grpSpPr>
+        <a:xfrm>
+          <a:off x="0" y="0"/>
+          <a:ext cx="0" cy="0"/>
+          <a:chOff x="0" y="0"/>
+          <a:chExt cx="0" cy="0"/>
+        </a:xfrm>
+      </p:grpSpPr>
+      <p:sp>
+        <p:nvSpPr>
+          <p:cNvPr id="2" name="Title 1">
+            <a:extLst>
+              <a:ext uri="{FF2B5EF4-FFF2-40B4-BE49-F238E27FC236}">
+                <a16:creationId xmlns:a16="http://schemas.microsoft.com/office/drawing/2014/main" id="{FE04FC5D-740C-495D-BE03-23B345B8902E}"/>
+              </a:ext>
+            </a:extLst>
+          </p:cNvPr>
+          <p:cNvSpPr>
+            <a:spLocks noGrp="1"/>
+          </p:cNvSpPr>
+          <p:nvPr>
+            <p:ph type="title"/>
+          </p:nvPr>
+        </p:nvSpPr>
+        <p:spPr/>
+        <p:txBody>
+          <a:bodyPr anchor="ctr">
+            <a:normAutofit/>
+          </a:bodyPr>
+          <a:lstStyle/>
+          <a:p>
+            <a:r>
+              <a:rPr lang="en-US" sz="5400" dirty="0"/>
+              <a:t>Loudness</a:t>
+            </a:r>
+          </a:p>
+        </p:txBody>
+      </p:sp>
+      <p:pic>
+        <p:nvPicPr>
+          <p:cNvPr id="1032" name="Picture 8" descr="Music notes sign Pink neon icon in the brick wall - stock vector |  Crushpixel">
+            <a:extLst>
+              <a:ext uri="{FF2B5EF4-FFF2-40B4-BE49-F238E27FC236}">
+                <a16:creationId xmlns:a16="http://schemas.microsoft.com/office/drawing/2014/main" id="{FCFF1D86-4905-429B-BDC1-BB20988244CF}"/>
+              </a:ext>
+            </a:extLst>
+          </p:cNvPr>
+          <p:cNvPicPr>
+            <a:picLocks noChangeAspect="1" noChangeArrowheads="1"/>
+          </p:cNvPicPr>
+          <p:nvPr/>
+        </p:nvPicPr>
+        <p:blipFill>
+          <a:blip r:embed="rId3">
+            <a:extLst>
+              <a:ext uri="{28A0092B-C50C-407E-A947-70E740481C1C}">
+                <a14:useLocalDpi xmlns:a14="http://schemas.microsoft.com/office/drawing/2010/main" val="0"/>
+              </a:ext>
+            </a:extLst>
+          </a:blip>
+          <a:srcRect/>
+          <a:stretch>
+            <a:fillRect/>
+          </a:stretch>
+        </p:blipFill>
+        <p:spPr bwMode="auto">
+          <a:xfrm>
+            <a:off x="9559637" y="0"/>
+            <a:ext cx="2632364" cy="2216727"/>
+          </a:xfrm>
+          <a:prstGeom prst="rect">
+            <a:avLst/>
+          </a:prstGeom>
+          <a:noFill/>
+          <a:extLst>
+            <a:ext uri="{909E8E84-426E-40DD-AFC4-6F175D3DCCD1}">
+              <a14:hiddenFill xmlns:a14="http://schemas.microsoft.com/office/drawing/2010/main">
+                <a:solidFill>
+                  <a:srgbClr val="FFFFFF"/>
+                </a:solidFill>
+              </a14:hiddenFill>
+            </a:ext>
+          </a:extLst>
+        </p:spPr>
+      </p:pic>
+      <p:pic>
+        <p:nvPicPr>
+          <p:cNvPr id="2050" name="Picture 2" descr="Loudness">
+            <a:extLst>
+              <a:ext uri="{FF2B5EF4-FFF2-40B4-BE49-F238E27FC236}">
+                <a16:creationId xmlns:a16="http://schemas.microsoft.com/office/drawing/2014/main" id="{3CFD4230-2FC2-4334-A170-F0D4E9398C6D}"/>
+              </a:ext>
+            </a:extLst>
+          </p:cNvPr>
+          <p:cNvPicPr>
+            <a:picLocks noChangeAspect="1" noChangeArrowheads="1"/>
+          </p:cNvPicPr>
+          <p:nvPr/>
+        </p:nvPicPr>
+        <p:blipFill>
+          <a:blip r:embed="rId4">
+            <a:extLst>
+              <a:ext uri="{28A0092B-C50C-407E-A947-70E740481C1C}">
+                <a14:useLocalDpi xmlns:a14="http://schemas.microsoft.com/office/drawing/2010/main" val="0"/>
+              </a:ext>
+            </a:extLst>
+          </a:blip>
+          <a:srcRect/>
+          <a:stretch>
+            <a:fillRect/>
+          </a:stretch>
+        </p:blipFill>
+        <p:spPr bwMode="auto">
+          <a:xfrm>
+            <a:off x="0" y="2420472"/>
+            <a:ext cx="5839982" cy="4365812"/>
+          </a:xfrm>
+          <a:prstGeom prst="rect">
+            <a:avLst/>
+          </a:prstGeom>
+          <a:noFill/>
+          <a:extLst>
+            <a:ext uri="{909E8E84-426E-40DD-AFC4-6F175D3DCCD1}">
+              <a14:hiddenFill xmlns:a14="http://schemas.microsoft.com/office/drawing/2010/main">
+                <a:solidFill>
+                  <a:srgbClr val="FFFFFF"/>
+                </a:solidFill>
+              </a14:hiddenFill>
+            </a:ext>
+          </a:extLst>
+        </p:spPr>
+      </p:pic>
+      <p:pic>
+        <p:nvPicPr>
+          <p:cNvPr id="2052" name="Picture 4" descr="Loudness">
+            <a:extLst>
+              <a:ext uri="{FF2B5EF4-FFF2-40B4-BE49-F238E27FC236}">
+                <a16:creationId xmlns:a16="http://schemas.microsoft.com/office/drawing/2014/main" id="{EDDFE770-C63C-4CA2-8177-DEAB3553A1BD}"/>
+              </a:ext>
+            </a:extLst>
+          </p:cNvPr>
+          <p:cNvPicPr>
+            <a:picLocks noChangeAspect="1" noChangeArrowheads="1"/>
+          </p:cNvPicPr>
+          <p:nvPr/>
+        </p:nvPicPr>
+        <p:blipFill>
+          <a:blip r:embed="rId5">
+            <a:extLst>
+              <a:ext uri="{28A0092B-C50C-407E-A947-70E740481C1C}">
+                <a14:useLocalDpi xmlns:a14="http://schemas.microsoft.com/office/drawing/2010/main" val="0"/>
+              </a:ext>
+            </a:extLst>
+          </a:blip>
+          <a:srcRect/>
+          <a:stretch>
+            <a:fillRect/>
+          </a:stretch>
+        </p:blipFill>
+        <p:spPr bwMode="auto">
+          <a:xfrm>
+            <a:off x="5701553" y="3227438"/>
+            <a:ext cx="6023722" cy="3078112"/>
+          </a:xfrm>
+          <a:prstGeom prst="rect">
+            <a:avLst/>
+          </a:prstGeom>
+          <a:noFill/>
+          <a:extLst>
+            <a:ext uri="{909E8E84-426E-40DD-AFC4-6F175D3DCCD1}">
+              <a14:hiddenFill xmlns:a14="http://schemas.microsoft.com/office/drawing/2010/main">
+                <a:solidFill>
+                  <a:srgbClr val="FFFFFF"/>
+                </a:solidFill>
+              </a14:hiddenFill>
+            </a:ext>
+          </a:extLst>
+        </p:spPr>
+      </p:pic>
+    </p:spTree>
+    <p:extLst>
+      <p:ext uri="{BB962C8B-B14F-4D97-AF65-F5344CB8AC3E}">
+        <p14:creationId xmlns:p14="http://schemas.microsoft.com/office/powerpoint/2010/main" val="3953960300"/>
+      </p:ext>
+    </p:extLst>
+  </p:cSld>
+  <p:clrMapOvr>
+    <a:masterClrMapping/>
+  </p:clrMapOvr>
+  <p:transition>
+    <p:wipe/>
+  </p:transition>
+</p:sld>
+</file>
+
+<file path=ppt/slides/slide13.xml><?xml version="1.0" encoding="utf-8"?>
+<p:sld xmlns:a="http://schemas.openxmlformats.org/drawingml/2006/main" xmlns:r="http://schemas.openxmlformats.org/officeDocument/2006/relationships" xmlns:p="http://schemas.openxmlformats.org/presentationml/2006/main">
+  <p:cSld>
+    <p:spTree>
+      <p:nvGrpSpPr>
+        <p:cNvPr id="1" name=""/>
+        <p:cNvGrpSpPr/>
+        <p:nvPr/>
+      </p:nvGrpSpPr>
+      <p:grpSpPr>
+        <a:xfrm>
+          <a:off x="0" y="0"/>
+          <a:ext cx="0" cy="0"/>
+          <a:chOff x="0" y="0"/>
+          <a:chExt cx="0" cy="0"/>
+        </a:xfrm>
+      </p:grpSpPr>
+      <p:sp>
+        <p:nvSpPr>
+          <p:cNvPr id="2" name="Title 1">
+            <a:extLst>
+              <a:ext uri="{FF2B5EF4-FFF2-40B4-BE49-F238E27FC236}">
+                <a16:creationId xmlns:a16="http://schemas.microsoft.com/office/drawing/2014/main" id="{FE04FC5D-740C-495D-BE03-23B345B8902E}"/>
+              </a:ext>
+            </a:extLst>
+          </p:cNvPr>
+          <p:cNvSpPr>
+            <a:spLocks noGrp="1"/>
+          </p:cNvSpPr>
+          <p:nvPr>
+            <p:ph type="title"/>
+          </p:nvPr>
+        </p:nvSpPr>
+        <p:spPr/>
+        <p:txBody>
+          <a:bodyPr anchor="ctr">
+            <a:normAutofit/>
+          </a:bodyPr>
+          <a:lstStyle/>
+          <a:p>
+            <a:r>
+              <a:rPr lang="en-US" sz="5400" dirty="0" err="1"/>
+              <a:t>Speechiness</a:t>
+            </a:r>
+            <a:endParaRPr lang="en-US" sz="5400" dirty="0"/>
+          </a:p>
+        </p:txBody>
+      </p:sp>
+      <p:pic>
+        <p:nvPicPr>
+          <p:cNvPr id="1032" name="Picture 8" descr="Music notes sign Pink neon icon in the brick wall - stock vector |  Crushpixel">
+            <a:extLst>
+              <a:ext uri="{FF2B5EF4-FFF2-40B4-BE49-F238E27FC236}">
+                <a16:creationId xmlns:a16="http://schemas.microsoft.com/office/drawing/2014/main" id="{FCFF1D86-4905-429B-BDC1-BB20988244CF}"/>
+              </a:ext>
+            </a:extLst>
+          </p:cNvPr>
+          <p:cNvPicPr>
+            <a:picLocks noChangeAspect="1" noChangeArrowheads="1"/>
+          </p:cNvPicPr>
+          <p:nvPr/>
+        </p:nvPicPr>
+        <p:blipFill>
+          <a:blip r:embed="rId3">
+            <a:extLst>
+              <a:ext uri="{28A0092B-C50C-407E-A947-70E740481C1C}">
+                <a14:useLocalDpi xmlns:a14="http://schemas.microsoft.com/office/drawing/2010/main" val="0"/>
+              </a:ext>
+            </a:extLst>
+          </a:blip>
+          <a:srcRect/>
+          <a:stretch>
+            <a:fillRect/>
+          </a:stretch>
+        </p:blipFill>
+        <p:spPr bwMode="auto">
+          <a:xfrm>
+            <a:off x="9559637" y="0"/>
+            <a:ext cx="2632364" cy="2216727"/>
+          </a:xfrm>
+          <a:prstGeom prst="rect">
+            <a:avLst/>
+          </a:prstGeom>
+          <a:noFill/>
+          <a:extLst>
+            <a:ext uri="{909E8E84-426E-40DD-AFC4-6F175D3DCCD1}">
+              <a14:hiddenFill xmlns:a14="http://schemas.microsoft.com/office/drawing/2010/main">
+                <a:solidFill>
+                  <a:srgbClr val="FFFFFF"/>
+                </a:solidFill>
+              </a14:hiddenFill>
+            </a:ext>
+          </a:extLst>
+        </p:spPr>
+      </p:pic>
+      <p:pic>
+        <p:nvPicPr>
+          <p:cNvPr id="3074" name="Picture 2" descr="Speechiness">
+            <a:extLst>
+              <a:ext uri="{FF2B5EF4-FFF2-40B4-BE49-F238E27FC236}">
+                <a16:creationId xmlns:a16="http://schemas.microsoft.com/office/drawing/2014/main" id="{15F223B8-0DAD-4713-BE75-7FE030285821}"/>
+              </a:ext>
+            </a:extLst>
+          </p:cNvPr>
+          <p:cNvPicPr>
+            <a:picLocks noChangeAspect="1" noChangeArrowheads="1"/>
+          </p:cNvPicPr>
+          <p:nvPr/>
+        </p:nvPicPr>
+        <p:blipFill>
+          <a:blip r:embed="rId4">
+            <a:extLst>
+              <a:ext uri="{28A0092B-C50C-407E-A947-70E740481C1C}">
+                <a14:useLocalDpi xmlns:a14="http://schemas.microsoft.com/office/drawing/2010/main" val="0"/>
+              </a:ext>
+            </a:extLst>
+          </a:blip>
+          <a:srcRect/>
+          <a:stretch>
+            <a:fillRect/>
+          </a:stretch>
+        </p:blipFill>
+        <p:spPr bwMode="auto">
+          <a:xfrm>
+            <a:off x="-1" y="2336412"/>
+            <a:ext cx="6127607" cy="4472282"/>
+          </a:xfrm>
+          <a:prstGeom prst="rect">
+            <a:avLst/>
+          </a:prstGeom>
+          <a:noFill/>
+          <a:extLst>
+            <a:ext uri="{909E8E84-426E-40DD-AFC4-6F175D3DCCD1}">
+              <a14:hiddenFill xmlns:a14="http://schemas.microsoft.com/office/drawing/2010/main">
+                <a:solidFill>
+                  <a:srgbClr val="FFFFFF"/>
+                </a:solidFill>
+              </a14:hiddenFill>
+            </a:ext>
+          </a:extLst>
+        </p:spPr>
+      </p:pic>
+      <p:pic>
+        <p:nvPicPr>
+          <p:cNvPr id="3076" name="Picture 4" descr="Speechiness">
+            <a:extLst>
+              <a:ext uri="{FF2B5EF4-FFF2-40B4-BE49-F238E27FC236}">
+                <a16:creationId xmlns:a16="http://schemas.microsoft.com/office/drawing/2014/main" id="{21ECB65A-6232-4DD1-A280-BED061AD7E0D}"/>
+              </a:ext>
+            </a:extLst>
+          </p:cNvPr>
+          <p:cNvPicPr>
+            <a:picLocks noChangeAspect="1" noChangeArrowheads="1"/>
+          </p:cNvPicPr>
+          <p:nvPr/>
+        </p:nvPicPr>
+        <p:blipFill>
+          <a:blip r:embed="rId5">
+            <a:extLst>
+              <a:ext uri="{28A0092B-C50C-407E-A947-70E740481C1C}">
+                <a14:useLocalDpi xmlns:a14="http://schemas.microsoft.com/office/drawing/2010/main" val="0"/>
+              </a:ext>
+            </a:extLst>
+          </a:blip>
+          <a:srcRect/>
+          <a:stretch>
+            <a:fillRect/>
+          </a:stretch>
+        </p:blipFill>
+        <p:spPr bwMode="auto">
+          <a:xfrm>
+            <a:off x="6096000" y="3202999"/>
+            <a:ext cx="5557838" cy="2876550"/>
+          </a:xfrm>
+          <a:prstGeom prst="rect">
+            <a:avLst/>
+          </a:prstGeom>
+          <a:noFill/>
+          <a:extLst>
+            <a:ext uri="{909E8E84-426E-40DD-AFC4-6F175D3DCCD1}">
+              <a14:hiddenFill xmlns:a14="http://schemas.microsoft.com/office/drawing/2010/main">
+                <a:solidFill>
+                  <a:srgbClr val="FFFFFF"/>
+                </a:solidFill>
+              </a14:hiddenFill>
+            </a:ext>
+          </a:extLst>
+        </p:spPr>
+      </p:pic>
+    </p:spTree>
+    <p:extLst>
+      <p:ext uri="{BB962C8B-B14F-4D97-AF65-F5344CB8AC3E}">
+        <p14:creationId xmlns:p14="http://schemas.microsoft.com/office/powerpoint/2010/main" val="2812230889"/>
+      </p:ext>
+    </p:extLst>
+  </p:cSld>
+  <p:clrMapOvr>
+    <a:masterClrMapping/>
+  </p:clrMapOvr>
+  <p:transition>
+    <p:wipe/>
+  </p:transition>
+</p:sld>
+</file>
+
+<file path=ppt/slides/slide14.xml><?xml version="1.0" encoding="utf-8"?>
+<p:sld xmlns:a="http://schemas.openxmlformats.org/drawingml/2006/main" xmlns:r="http://schemas.openxmlformats.org/officeDocument/2006/relationships" xmlns:p="http://schemas.openxmlformats.org/presentationml/2006/main">
+  <p:cSld>
+    <p:spTree>
+      <p:nvGrpSpPr>
+        <p:cNvPr id="1" name=""/>
+        <p:cNvGrpSpPr/>
+        <p:nvPr/>
+      </p:nvGrpSpPr>
+      <p:grpSpPr>
+        <a:xfrm>
+          <a:off x="0" y="0"/>
+          <a:ext cx="0" cy="0"/>
+          <a:chOff x="0" y="0"/>
+          <a:chExt cx="0" cy="0"/>
+        </a:xfrm>
+      </p:grpSpPr>
+      <p:sp>
+        <p:nvSpPr>
+          <p:cNvPr id="2" name="Title 1">
+            <a:extLst>
+              <a:ext uri="{FF2B5EF4-FFF2-40B4-BE49-F238E27FC236}">
+                <a16:creationId xmlns:a16="http://schemas.microsoft.com/office/drawing/2014/main" id="{FE04FC5D-740C-495D-BE03-23B345B8902E}"/>
+              </a:ext>
+            </a:extLst>
+          </p:cNvPr>
+          <p:cNvSpPr>
+            <a:spLocks noGrp="1"/>
+          </p:cNvSpPr>
+          <p:nvPr>
+            <p:ph type="title"/>
+          </p:nvPr>
+        </p:nvSpPr>
+        <p:spPr/>
+        <p:txBody>
+          <a:bodyPr anchor="ctr">
+            <a:normAutofit/>
+          </a:bodyPr>
+          <a:lstStyle/>
+          <a:p>
+            <a:r>
+              <a:rPr lang="en-US" sz="5400" dirty="0"/>
+              <a:t>Summary</a:t>
+            </a:r>
+          </a:p>
+        </p:txBody>
+      </p:sp>
+      <p:pic>
+        <p:nvPicPr>
+          <p:cNvPr id="1032" name="Picture 8" descr="Music notes sign Pink neon icon in the brick wall - stock vector |  Crushpixel">
+            <a:extLst>
+              <a:ext uri="{FF2B5EF4-FFF2-40B4-BE49-F238E27FC236}">
+                <a16:creationId xmlns:a16="http://schemas.microsoft.com/office/drawing/2014/main" id="{FCFF1D86-4905-429B-BDC1-BB20988244CF}"/>
+              </a:ext>
+            </a:extLst>
+          </p:cNvPr>
+          <p:cNvPicPr>
+            <a:picLocks noChangeAspect="1" noChangeArrowheads="1"/>
+          </p:cNvPicPr>
+          <p:nvPr/>
+        </p:nvPicPr>
+        <p:blipFill>
+          <a:blip r:embed="rId3">
+            <a:extLst>
+              <a:ext uri="{28A0092B-C50C-407E-A947-70E740481C1C}">
+                <a14:useLocalDpi xmlns:a14="http://schemas.microsoft.com/office/drawing/2010/main" val="0"/>
+              </a:ext>
+            </a:extLst>
+          </a:blip>
+          <a:srcRect/>
+          <a:stretch>
+            <a:fillRect/>
+          </a:stretch>
+        </p:blipFill>
+        <p:spPr bwMode="auto">
+          <a:xfrm>
+            <a:off x="9559637" y="0"/>
+            <a:ext cx="2632364" cy="2216727"/>
+          </a:xfrm>
+          <a:prstGeom prst="rect">
+            <a:avLst/>
+          </a:prstGeom>
+          <a:noFill/>
+          <a:extLst>
+            <a:ext uri="{909E8E84-426E-40DD-AFC4-6F175D3DCCD1}">
+              <a14:hiddenFill xmlns:a14="http://schemas.microsoft.com/office/drawing/2010/main">
+                <a:solidFill>
+                  <a:srgbClr val="FFFFFF"/>
+                </a:solidFill>
+              </a14:hiddenFill>
+            </a:ext>
+          </a:extLst>
+        </p:spPr>
+      </p:pic>
+      <p:graphicFrame>
+        <p:nvGraphicFramePr>
+          <p:cNvPr id="6" name="Table 6">
+            <a:extLst>
+              <a:ext uri="{FF2B5EF4-FFF2-40B4-BE49-F238E27FC236}">
+                <a16:creationId xmlns:a16="http://schemas.microsoft.com/office/drawing/2014/main" id="{3F359E4D-5380-4E13-AFB3-9F3C0B1D9E4F}"/>
+              </a:ext>
+            </a:extLst>
+          </p:cNvPr>
+          <p:cNvGraphicFramePr>
+            <a:graphicFrameLocks noGrp="1"/>
+          </p:cNvGraphicFramePr>
+          <p:nvPr>
+            <p:extLst>
+              <p:ext uri="{D42A27DB-BD31-4B8C-83A1-F6EECF244321}">
+                <p14:modId xmlns:p14="http://schemas.microsoft.com/office/powerpoint/2010/main" val="3925225815"/>
+              </p:ext>
+            </p:extLst>
+          </p:nvPr>
+        </p:nvGraphicFramePr>
+        <p:xfrm>
+          <a:off x="751692" y="3901686"/>
+          <a:ext cx="10685568" cy="1479176"/>
+        </p:xfrm>
+        <a:graphic>
+          <a:graphicData uri="http://schemas.openxmlformats.org/drawingml/2006/table">
+            <a:tbl>
+              <a:tblPr firstRow="1" bandRow="1">
+                <a:tableStyleId>{F5AB1C69-6EDB-4FF4-983F-18BD219EF322}</a:tableStyleId>
+              </a:tblPr>
+              <a:tblGrid>
+                <a:gridCol w="1632920">
+                  <a:extLst>
+                    <a:ext uri="{9D8B030D-6E8A-4147-A177-3AD203B41FA5}">
+                      <a16:colId xmlns:a16="http://schemas.microsoft.com/office/drawing/2014/main" val="3679015013"/>
+                    </a:ext>
+                  </a:extLst>
+                </a:gridCol>
+                <a:gridCol w="1703294">
+                  <a:extLst>
+                    <a:ext uri="{9D8B030D-6E8A-4147-A177-3AD203B41FA5}">
+                      <a16:colId xmlns:a16="http://schemas.microsoft.com/office/drawing/2014/main" val="96594447"/>
+                    </a:ext>
+                  </a:extLst>
+                </a:gridCol>
+                <a:gridCol w="2133600">
+                  <a:extLst>
+                    <a:ext uri="{9D8B030D-6E8A-4147-A177-3AD203B41FA5}">
+                      <a16:colId xmlns:a16="http://schemas.microsoft.com/office/drawing/2014/main" val="3649829042"/>
+                    </a:ext>
+                  </a:extLst>
+                </a:gridCol>
+                <a:gridCol w="1653898">
+                  <a:extLst>
+                    <a:ext uri="{9D8B030D-6E8A-4147-A177-3AD203B41FA5}">
+                      <a16:colId xmlns:a16="http://schemas.microsoft.com/office/drawing/2014/main" val="68304975"/>
+                    </a:ext>
+                  </a:extLst>
+                </a:gridCol>
+                <a:gridCol w="1780928">
+                  <a:extLst>
+                    <a:ext uri="{9D8B030D-6E8A-4147-A177-3AD203B41FA5}">
+                      <a16:colId xmlns:a16="http://schemas.microsoft.com/office/drawing/2014/main" val="3663446367"/>
+                    </a:ext>
+                  </a:extLst>
+                </a:gridCol>
+                <a:gridCol w="1780928">
+                  <a:extLst>
+                    <a:ext uri="{9D8B030D-6E8A-4147-A177-3AD203B41FA5}">
+                      <a16:colId xmlns:a16="http://schemas.microsoft.com/office/drawing/2014/main" val="1066230244"/>
+                    </a:ext>
+                  </a:extLst>
+                </a:gridCol>
+              </a:tblGrid>
+              <a:tr h="537882">
+                <a:tc>
+                  <a:txBody>
+                    <a:bodyPr/>
+                    <a:lstStyle/>
+                    <a:p>
+                      <a:pPr algn="ctr"/>
+                      <a:r>
+                        <a:rPr lang="en-US" sz="2000" b="1" dirty="0"/>
+                        <a:t>Energy</a:t>
+                      </a:r>
+                    </a:p>
+                  </a:txBody>
+                  <a:tcPr anchor="ctr"/>
+                </a:tc>
+                <a:tc>
+                  <a:txBody>
+                    <a:bodyPr/>
+                    <a:lstStyle/>
+                    <a:p>
+                      <a:pPr algn="ctr"/>
+                      <a:r>
+                        <a:rPr lang="en-US" sz="2000" b="1" dirty="0" err="1"/>
+                        <a:t>Acousticness</a:t>
+                      </a:r>
+                      <a:endParaRPr lang="en-US" sz="2000" b="1" dirty="0"/>
+                    </a:p>
+                  </a:txBody>
+                  <a:tcPr anchor="ctr"/>
+                </a:tc>
+                <a:tc>
+                  <a:txBody>
+                    <a:bodyPr/>
+                    <a:lstStyle/>
+                    <a:p>
+                      <a:pPr algn="ctr"/>
+                      <a:r>
+                        <a:rPr lang="en-US" sz="2000" b="1" dirty="0" err="1"/>
+                        <a:t>Instrumentalness</a:t>
+                      </a:r>
+                      <a:endParaRPr lang="en-US" sz="2000" b="1" dirty="0"/>
+                    </a:p>
+                  </a:txBody>
+                  <a:tcPr anchor="ctr"/>
+                </a:tc>
+                <a:tc>
+                  <a:txBody>
+                    <a:bodyPr/>
+                    <a:lstStyle/>
+                    <a:p>
+                      <a:pPr algn="ctr"/>
+                      <a:r>
+                        <a:rPr lang="en-US" sz="2000" b="1" dirty="0"/>
+                        <a:t>Key</a:t>
+                      </a:r>
+                    </a:p>
+                  </a:txBody>
+                  <a:tcPr anchor="ctr"/>
+                </a:tc>
+                <a:tc>
+                  <a:txBody>
+                    <a:bodyPr/>
+                    <a:lstStyle/>
+                    <a:p>
+                      <a:pPr algn="ctr"/>
+                      <a:r>
+                        <a:rPr lang="en-US" sz="2000" b="1" dirty="0"/>
+                        <a:t>Loudness</a:t>
+                      </a:r>
+                    </a:p>
+                  </a:txBody>
+                  <a:tcPr anchor="ctr"/>
+                </a:tc>
+                <a:tc>
+                  <a:txBody>
+                    <a:bodyPr/>
+                    <a:lstStyle/>
+                    <a:p>
+                      <a:pPr algn="ctr"/>
+                      <a:r>
+                        <a:rPr lang="en-US" sz="2000" b="1" dirty="0" err="1"/>
+                        <a:t>Speechiness</a:t>
+                      </a:r>
+                      <a:endParaRPr lang="en-US" sz="2000" b="1" dirty="0"/>
+                    </a:p>
+                  </a:txBody>
+                  <a:tcPr anchor="ctr"/>
+                </a:tc>
+                <a:extLst>
+                  <a:ext uri="{0D108BD9-81ED-4DB2-BD59-A6C34878D82A}">
+                    <a16:rowId xmlns:a16="http://schemas.microsoft.com/office/drawing/2014/main" val="3436913292"/>
+                  </a:ext>
+                </a:extLst>
+              </a:tr>
+              <a:tr h="941294">
+                <a:tc>
+                  <a:txBody>
+                    <a:bodyPr/>
+                    <a:lstStyle/>
+                    <a:p>
+                      <a:pPr algn="ctr"/>
+                      <a:r>
+                        <a:rPr lang="en-US" sz="2000" b="1" dirty="0"/>
+                        <a:t>0.5</a:t>
+                      </a:r>
+                    </a:p>
+                  </a:txBody>
+                  <a:tcPr anchor="ctr"/>
+                </a:tc>
+                <a:tc>
+                  <a:txBody>
+                    <a:bodyPr/>
+                    <a:lstStyle/>
+                    <a:p>
+                      <a:pPr algn="ctr"/>
+                      <a:r>
+                        <a:rPr lang="en-US" sz="2000" b="1" dirty="0"/>
+                        <a:t>0.5</a:t>
+                      </a:r>
+                    </a:p>
+                  </a:txBody>
+                  <a:tcPr anchor="ctr"/>
+                </a:tc>
+                <a:tc>
+                  <a:txBody>
+                    <a:bodyPr/>
+                    <a:lstStyle/>
+                    <a:p>
+                      <a:pPr algn="ctr"/>
+                      <a:r>
+                        <a:rPr lang="en-US" sz="2000" b="1" dirty="0"/>
+                        <a:t>.1</a:t>
+                      </a:r>
+                    </a:p>
+                  </a:txBody>
+                  <a:tcPr anchor="ctr"/>
+                </a:tc>
+                <a:tc>
+                  <a:txBody>
+                    <a:bodyPr/>
+                    <a:lstStyle/>
+                    <a:p>
+                      <a:pPr algn="ctr"/>
+                      <a:r>
+                        <a:rPr lang="en-US" sz="2000" b="1" dirty="0"/>
+                        <a:t>C  (Value of 0 in dataset)</a:t>
+                      </a:r>
+                    </a:p>
+                  </a:txBody>
+                  <a:tcPr anchor="ctr"/>
+                </a:tc>
+                <a:tc>
+                  <a:txBody>
+                    <a:bodyPr/>
+                    <a:lstStyle/>
+                    <a:p>
+                      <a:pPr algn="ctr"/>
+                      <a:r>
+                        <a:rPr lang="en-US" sz="2000" b="1" dirty="0"/>
+                        <a:t>-9.9</a:t>
+                      </a:r>
+                    </a:p>
+                  </a:txBody>
+                  <a:tcPr anchor="ctr"/>
+                </a:tc>
+                <a:tc>
+                  <a:txBody>
+                    <a:bodyPr/>
+                    <a:lstStyle/>
+                    <a:p>
+                      <a:pPr algn="ctr"/>
+                      <a:r>
+                        <a:rPr lang="en-US" sz="2000" b="1" dirty="0"/>
+                        <a:t>0.1</a:t>
+                      </a:r>
+                    </a:p>
+                  </a:txBody>
+                  <a:tcPr anchor="ctr"/>
+                </a:tc>
+                <a:extLst>
+                  <a:ext uri="{0D108BD9-81ED-4DB2-BD59-A6C34878D82A}">
+                    <a16:rowId xmlns:a16="http://schemas.microsoft.com/office/drawing/2014/main" val="819133677"/>
+                  </a:ext>
+                </a:extLst>
+              </a:tr>
+            </a:tbl>
+          </a:graphicData>
+        </a:graphic>
+      </p:graphicFrame>
+      <p:sp>
+        <p:nvSpPr>
+          <p:cNvPr id="7" name="TextBox 6">
+            <a:extLst>
+              <a:ext uri="{FF2B5EF4-FFF2-40B4-BE49-F238E27FC236}">
+                <a16:creationId xmlns:a16="http://schemas.microsoft.com/office/drawing/2014/main" id="{4C42D3F8-DAA8-4934-8729-38B6EC993EE3}"/>
+              </a:ext>
+            </a:extLst>
+          </p:cNvPr>
+          <p:cNvSpPr txBox="1"/>
+          <p:nvPr/>
+        </p:nvSpPr>
+        <p:spPr>
+          <a:xfrm>
+            <a:off x="751692" y="2806032"/>
+            <a:ext cx="11093824" cy="492443"/>
+          </a:xfrm>
+          <a:prstGeom prst="rect">
+            <a:avLst/>
+          </a:prstGeom>
+          <a:noFill/>
+        </p:spPr>
+        <p:txBody>
+          <a:bodyPr wrap="square" rtlCol="0">
+            <a:spAutoFit/>
+          </a:bodyPr>
+          <a:lstStyle/>
+          <a:p>
+            <a:r>
+              <a:rPr lang="en-US" sz="2600" dirty="0"/>
+              <a:t>To create a song that fits current popularity trends we recommend:</a:t>
+            </a:r>
+          </a:p>
+        </p:txBody>
+      </p:sp>
+    </p:spTree>
+    <p:extLst>
+      <p:ext uri="{BB962C8B-B14F-4D97-AF65-F5344CB8AC3E}">
+        <p14:creationId xmlns:p14="http://schemas.microsoft.com/office/powerpoint/2010/main" val="2053556735"/>
+      </p:ext>
+    </p:extLst>
+  </p:cSld>
+  <p:clrMapOvr>
+    <a:masterClrMapping/>
+  </p:clrMapOvr>
+  <p:transition>
+    <p:wipe/>
+  </p:transition>
+</p:sld>
+</file>
+
+<file path=ppt/slides/slide15.xml><?xml version="1.0" encoding="utf-8"?>
+<p:sld xmlns:a="http://schemas.openxmlformats.org/drawingml/2006/main" xmlns:r="http://schemas.openxmlformats.org/officeDocument/2006/relationships" xmlns:p="http://schemas.openxmlformats.org/presentationml/2006/main">
+  <p:cSld>
+    <p:spTree>
+      <p:nvGrpSpPr>
+        <p:cNvPr id="1" name=""/>
+        <p:cNvGrpSpPr/>
+        <p:nvPr/>
+      </p:nvGrpSpPr>
+      <p:grpSpPr>
+        <a:xfrm>
+          <a:off x="0" y="0"/>
+          <a:ext cx="0" cy="0"/>
+          <a:chOff x="0" y="0"/>
+          <a:chExt cx="0" cy="0"/>
+        </a:xfrm>
+      </p:grpSpPr>
+      <p:sp>
+        <p:nvSpPr>
+          <p:cNvPr id="2" name="Title 1">
+            <a:extLst>
+              <a:ext uri="{FF2B5EF4-FFF2-40B4-BE49-F238E27FC236}">
+                <a16:creationId xmlns:a16="http://schemas.microsoft.com/office/drawing/2014/main" id="{FE04FC5D-740C-495D-BE03-23B345B8902E}"/>
+              </a:ext>
+            </a:extLst>
+          </p:cNvPr>
+          <p:cNvSpPr>
+            <a:spLocks noGrp="1"/>
+          </p:cNvSpPr>
+          <p:nvPr>
+            <p:ph type="title"/>
+          </p:nvPr>
+        </p:nvSpPr>
+        <p:spPr/>
+        <p:txBody>
+          <a:bodyPr anchor="ctr">
+            <a:normAutofit/>
+          </a:bodyPr>
+          <a:lstStyle/>
+          <a:p>
+            <a:r>
               <a:rPr lang="en-US" sz="5400" dirty="0"/>
               <a:t>Post Mortem</a:t>
             </a:r>
@@ -5916,6 +7823,16 @@
             <a:r>
               <a:rPr lang="en-US" dirty="0"/>
               <a:t>Problem solving along the way</a:t>
+            </a:r>
+          </a:p>
+          <a:p>
+            <a:pPr marL="457200" indent="-457200">
+              <a:buFont typeface="Wingdings" panose="05000000000000000000" pitchFamily="2" charset="2"/>
+              <a:buChar char="Ø"/>
+            </a:pPr>
+            <a:r>
+              <a:rPr lang="en-US" dirty="0"/>
+              <a:t>Data limitations</a:t>
             </a:r>
           </a:p>
           <a:p>
@@ -5993,7 +7910,7 @@
 </p:sld>
 </file>
 
-<file path=ppt/slides/slide11.xml><?xml version="1.0" encoding="utf-8"?>
+<file path=ppt/slides/slide16.xml><?xml version="1.0" encoding="utf-8"?>
 <p:sld xmlns:a="http://schemas.openxmlformats.org/drawingml/2006/main" xmlns:r="http://schemas.openxmlformats.org/officeDocument/2006/relationships" xmlns:p="http://schemas.openxmlformats.org/presentationml/2006/main">
   <p:cSld>
     <p:bg>
@@ -6378,6 +8295,52 @@
           </a:extLst>
         </p:spPr>
       </p:pic>
+      <p:pic>
+        <p:nvPicPr>
+          <p:cNvPr id="5" name="Picture 2" descr="What is a good question? | Dragonfly Training">
+            <a:extLst>
+              <a:ext uri="{FF2B5EF4-FFF2-40B4-BE49-F238E27FC236}">
+                <a16:creationId xmlns:a16="http://schemas.microsoft.com/office/drawing/2014/main" id="{16C76ECA-4454-428B-ABDC-A86033A98510}"/>
+              </a:ext>
+            </a:extLst>
+          </p:cNvPr>
+          <p:cNvPicPr>
+            <a:picLocks noChangeAspect="1" noChangeArrowheads="1"/>
+          </p:cNvPicPr>
+          <p:nvPr/>
+        </p:nvPicPr>
+        <p:blipFill rotWithShape="1">
+          <a:blip r:embed="rId4">
+            <a:extLst>
+              <a:ext uri="{28A0092B-C50C-407E-A947-70E740481C1C}">
+                <a14:useLocalDpi xmlns:a14="http://schemas.microsoft.com/office/drawing/2010/main" val="0"/>
+              </a:ext>
+            </a:extLst>
+          </a:blip>
+          <a:srcRect l="23748" r="8658"/>
+          <a:stretch/>
+        </p:blipFill>
+        <p:spPr bwMode="auto">
+          <a:xfrm>
+            <a:off x="6956136" y="2587752"/>
+            <a:ext cx="2603501" cy="3851691"/>
+          </a:xfrm>
+          <a:prstGeom prst="rect">
+            <a:avLst/>
+          </a:prstGeom>
+          <a:noFill/>
+          <a:effectLst/>
+          <a:extLst>
+            <a:ext uri="{909E8E84-426E-40DD-AFC4-6F175D3DCCD1}">
+              <a14:hiddenFill xmlns:a14="http://schemas.microsoft.com/office/drawing/2010/main">
+                <a:solidFill>
+                  <a:srgbClr val="FFFFFF"/>
+                </a:solidFill>
+              </a14:hiddenFill>
+            </a:ext>
+          </a:extLst>
+        </p:spPr>
+      </p:pic>
     </p:spTree>
     <p:extLst>
       <p:ext uri="{BB962C8B-B14F-4D97-AF65-F5344CB8AC3E}">
@@ -6459,46 +8422,204 @@
         </p:nvSpPr>
         <p:spPr/>
         <p:txBody>
-          <a:bodyPr/>
-          <a:lstStyle/>
-          <a:p>
-            <a:pPr marL="514350" indent="-514350">
+          <a:bodyPr>
+            <a:noAutofit/>
+          </a:bodyPr>
+          <a:lstStyle/>
+          <a:p>
+            <a:pPr marL="474345" lvl="0" indent="-342900" algn="l" rtl="0">
+              <a:lnSpc>
+                <a:spcPct val="150000"/>
+              </a:lnSpc>
+              <a:spcBef>
+                <a:spcPts val="0"/>
+              </a:spcBef>
+              <a:spcAft>
+                <a:spcPts val="0"/>
+              </a:spcAft>
+              <a:buSzPct val="69230"/>
               <a:buFont typeface="Wingdings" panose="05000000000000000000" pitchFamily="2" charset="2"/>
               <a:buChar char="Ø"/>
             </a:pPr>
             <a:r>
-              <a:rPr lang="en-US" dirty="0"/>
-              <a:t>Spotify Dataset (1920 – 2020)</a:t>
-            </a:r>
-          </a:p>
-          <a:p>
-            <a:pPr marL="514350" indent="-514350">
+              <a:rPr lang="en-US" sz="2400" dirty="0"/>
+              <a:t>Dataset Considerations:</a:t>
+            </a:r>
+          </a:p>
+          <a:p>
+            <a:pPr marL="931545" lvl="1" indent="-342900" algn="l" rtl="0">
+              <a:lnSpc>
+                <a:spcPct val="150000"/>
+              </a:lnSpc>
+              <a:spcBef>
+                <a:spcPts val="0"/>
+              </a:spcBef>
+              <a:spcAft>
+                <a:spcPts val="0"/>
+              </a:spcAft>
+              <a:buSzPct val="78260"/>
               <a:buFont typeface="Wingdings" panose="05000000000000000000" pitchFamily="2" charset="2"/>
               <a:buChar char="Ø"/>
             </a:pPr>
             <a:r>
-              <a:rPr lang="en-US" dirty="0"/>
-              <a:t>Numerical data</a:t>
-            </a:r>
-          </a:p>
-          <a:p>
-            <a:pPr marL="514350" indent="-514350">
+              <a:rPr lang="en-US" sz="1900" dirty="0"/>
+              <a:t>Large dataset with tracks from previous years</a:t>
+            </a:r>
+          </a:p>
+          <a:p>
+            <a:pPr marL="931545" lvl="1" indent="-342900" algn="l" rtl="0">
+              <a:lnSpc>
+                <a:spcPct val="150000"/>
+              </a:lnSpc>
+              <a:spcBef>
+                <a:spcPts val="0"/>
+              </a:spcBef>
+              <a:spcAft>
+                <a:spcPts val="0"/>
+              </a:spcAft>
+              <a:buSzPct val="78260"/>
               <a:buFont typeface="Wingdings" panose="05000000000000000000" pitchFamily="2" charset="2"/>
               <a:buChar char="Ø"/>
             </a:pPr>
             <a:r>
-              <a:rPr lang="en-US" dirty="0"/>
-              <a:t>Categorical data</a:t>
-            </a:r>
-          </a:p>
-          <a:p>
-            <a:pPr marL="514350" indent="-514350">
+              <a:rPr lang="en-US" sz="1900" dirty="0"/>
+              <a:t>Music attributes</a:t>
+            </a:r>
+          </a:p>
+          <a:p>
+            <a:pPr marL="931545" lvl="1" indent="-342900" algn="l" rtl="0">
+              <a:lnSpc>
+                <a:spcPct val="150000"/>
+              </a:lnSpc>
+              <a:spcBef>
+                <a:spcPts val="0"/>
+              </a:spcBef>
+              <a:spcAft>
+                <a:spcPts val="0"/>
+              </a:spcAft>
+              <a:buSzPct val="78260"/>
               <a:buFont typeface="Wingdings" panose="05000000000000000000" pitchFamily="2" charset="2"/>
               <a:buChar char="Ø"/>
             </a:pPr>
             <a:r>
-              <a:rPr lang="en-US" dirty="0"/>
-              <a:t>Questions asked</a:t>
+              <a:rPr lang="en-US" sz="1900" dirty="0"/>
+              <a:t>Popularity metric</a:t>
+            </a:r>
+          </a:p>
+          <a:p>
+            <a:pPr marL="931545" lvl="1" indent="-342900" algn="l" rtl="0">
+              <a:lnSpc>
+                <a:spcPct val="150000"/>
+              </a:lnSpc>
+              <a:spcBef>
+                <a:spcPts val="0"/>
+              </a:spcBef>
+              <a:spcAft>
+                <a:spcPts val="0"/>
+              </a:spcAft>
+              <a:buSzPct val="78260"/>
+              <a:buFont typeface="Wingdings" panose="05000000000000000000" pitchFamily="2" charset="2"/>
+              <a:buChar char="Ø"/>
+            </a:pPr>
+            <a:r>
+              <a:rPr lang="en-US" sz="1900" dirty="0"/>
+              <a:t>Category by genre/artist</a:t>
+            </a:r>
+          </a:p>
+          <a:p>
+            <a:pPr marL="474345" lvl="0" indent="-342900" algn="l" rtl="0">
+              <a:lnSpc>
+                <a:spcPct val="150000"/>
+              </a:lnSpc>
+              <a:spcBef>
+                <a:spcPts val="0"/>
+              </a:spcBef>
+              <a:spcAft>
+                <a:spcPts val="0"/>
+              </a:spcAft>
+              <a:buSzPct val="69230"/>
+              <a:buFont typeface="Wingdings" panose="05000000000000000000" pitchFamily="2" charset="2"/>
+              <a:buChar char="Ø"/>
+            </a:pPr>
+            <a:r>
+              <a:rPr lang="en-US" sz="2400" dirty="0"/>
+              <a:t>Dataset Source: </a:t>
+            </a:r>
+          </a:p>
+          <a:p>
+            <a:pPr marL="931545" lvl="1" indent="-342900" algn="l" rtl="0">
+              <a:lnSpc>
+                <a:spcPct val="150000"/>
+              </a:lnSpc>
+              <a:spcBef>
+                <a:spcPts val="0"/>
+              </a:spcBef>
+              <a:spcAft>
+                <a:spcPts val="0"/>
+              </a:spcAft>
+              <a:buSzPct val="78260"/>
+              <a:buFont typeface="Wingdings" panose="05000000000000000000" pitchFamily="2" charset="2"/>
+              <a:buChar char="Ø"/>
+            </a:pPr>
+            <a:r>
+              <a:rPr lang="en-US" sz="1900" dirty="0"/>
+              <a:t>Spotify Dataset by </a:t>
+            </a:r>
+            <a:r>
+              <a:rPr lang="en-US" sz="1900" dirty="0" err="1"/>
+              <a:t>Yamac</a:t>
+            </a:r>
+            <a:r>
+              <a:rPr lang="en-US" sz="1900" dirty="0"/>
+              <a:t> </a:t>
+            </a:r>
+            <a:r>
+              <a:rPr lang="en-US" sz="1900" dirty="0" err="1"/>
+              <a:t>Eren</a:t>
+            </a:r>
+            <a:r>
+              <a:rPr lang="en-US" sz="1900" dirty="0"/>
+              <a:t> Ay</a:t>
+            </a:r>
+          </a:p>
+          <a:p>
+            <a:pPr marL="931545" lvl="1" indent="-342900" algn="l" rtl="0">
+              <a:lnSpc>
+                <a:spcPct val="150000"/>
+              </a:lnSpc>
+              <a:spcBef>
+                <a:spcPts val="0"/>
+              </a:spcBef>
+              <a:spcAft>
+                <a:spcPts val="0"/>
+              </a:spcAft>
+              <a:buSzPct val="78260"/>
+              <a:buFont typeface="Wingdings" panose="05000000000000000000" pitchFamily="2" charset="2"/>
+              <a:buChar char="Ø"/>
+            </a:pPr>
+            <a:r>
+              <a:rPr lang="en-US" sz="1900" dirty="0"/>
+              <a:t>160k+ tracks from 1921-Jan. 2021</a:t>
+            </a:r>
+          </a:p>
+          <a:p>
+            <a:pPr marL="931545" lvl="1" indent="-342900" algn="l" rtl="0">
+              <a:lnSpc>
+                <a:spcPct val="150000"/>
+              </a:lnSpc>
+              <a:spcBef>
+                <a:spcPts val="0"/>
+              </a:spcBef>
+              <a:spcAft>
+                <a:spcPts val="0"/>
+              </a:spcAft>
+              <a:buSzPct val="78260"/>
+              <a:buFont typeface="Wingdings" panose="05000000000000000000" pitchFamily="2" charset="2"/>
+              <a:buChar char="Ø"/>
+            </a:pPr>
+            <a:r>
+              <a:rPr lang="en-US" sz="1900" dirty="0"/>
+              <a:t>CSV files with numerical and categorical data</a:t>
             </a:r>
           </a:p>
         </p:txBody>
@@ -6548,6 +8669,39 @@
               </a14:hiddenFill>
             </a:ext>
           </a:extLst>
+        </p:spPr>
+      </p:pic>
+      <p:pic>
+        <p:nvPicPr>
+          <p:cNvPr id="5" name="Google Shape;113;p3">
+            <a:extLst>
+              <a:ext uri="{FF2B5EF4-FFF2-40B4-BE49-F238E27FC236}">
+                <a16:creationId xmlns:a16="http://schemas.microsoft.com/office/drawing/2014/main" id="{5FAF1943-74AF-4825-AE20-DF162329438A}"/>
+              </a:ext>
+            </a:extLst>
+          </p:cNvPr>
+          <p:cNvPicPr preferRelativeResize="0"/>
+          <p:nvPr/>
+        </p:nvPicPr>
+        <p:blipFill rotWithShape="1">
+          <a:blip r:embed="rId4">
+            <a:alphaModFix/>
+          </a:blip>
+          <a:srcRect r="39824"/>
+          <a:stretch/>
+        </p:blipFill>
+        <p:spPr>
+          <a:xfrm>
+            <a:off x="7229425" y="2282775"/>
+            <a:ext cx="4267498" cy="4575225"/>
+          </a:xfrm>
+          <a:prstGeom prst="rect">
+            <a:avLst/>
+          </a:prstGeom>
+          <a:noFill/>
+          <a:ln>
+            <a:noFill/>
+          </a:ln>
         </p:spPr>
       </p:pic>
     </p:spTree>
@@ -6634,68 +8788,95 @@
           <a:bodyPr/>
           <a:lstStyle/>
           <a:p>
+            <a:pPr marL="571500" lvl="0" indent="-457200" algn="l" rtl="0">
+              <a:lnSpc>
+                <a:spcPct val="150000"/>
+              </a:lnSpc>
+              <a:spcBef>
+                <a:spcPts val="0"/>
+              </a:spcBef>
+              <a:spcAft>
+                <a:spcPts val="0"/>
+              </a:spcAft>
+              <a:buSzPts val="1800"/>
+              <a:buFont typeface="Wingdings" panose="05000000000000000000" pitchFamily="2" charset="2"/>
+              <a:buChar char="Ø"/>
+            </a:pPr>
+            <a:r>
+              <a:rPr lang="en-US" dirty="0"/>
+              <a:t>Explore Parameters</a:t>
+            </a:r>
+          </a:p>
+          <a:p>
+            <a:pPr marL="571500" lvl="0" indent="-457200" algn="l" rtl="0">
+              <a:lnSpc>
+                <a:spcPct val="150000"/>
+              </a:lnSpc>
+              <a:spcBef>
+                <a:spcPts val="0"/>
+              </a:spcBef>
+              <a:spcAft>
+                <a:spcPts val="0"/>
+              </a:spcAft>
+              <a:buSzPts val="1800"/>
+              <a:buFont typeface="Wingdings" panose="05000000000000000000" pitchFamily="2" charset="2"/>
+              <a:buChar char="Ø"/>
+            </a:pPr>
+            <a:r>
+              <a:rPr lang="en-US" dirty="0"/>
+              <a:t>Choose Sample Size</a:t>
+            </a:r>
+          </a:p>
+          <a:p>
+            <a:pPr marL="571500" lvl="0" indent="-457200" algn="l" rtl="0">
+              <a:lnSpc>
+                <a:spcPct val="150000"/>
+              </a:lnSpc>
+              <a:spcBef>
+                <a:spcPts val="0"/>
+              </a:spcBef>
+              <a:spcAft>
+                <a:spcPts val="0"/>
+              </a:spcAft>
+              <a:buSzPts val="1800"/>
+              <a:buFont typeface="Wingdings" panose="05000000000000000000" pitchFamily="2" charset="2"/>
+              <a:buChar char="Ø"/>
+            </a:pPr>
+            <a:r>
+              <a:rPr lang="en-US" dirty="0" err="1"/>
+              <a:t>Dataframe</a:t>
+            </a:r>
+            <a:r>
+              <a:rPr lang="en-US" dirty="0"/>
+              <a:t> Cleanup</a:t>
+            </a:r>
+          </a:p>
+          <a:p>
+            <a:pPr marL="571500" lvl="0" indent="-457200" algn="l" rtl="0">
+              <a:lnSpc>
+                <a:spcPct val="150000"/>
+              </a:lnSpc>
+              <a:spcBef>
+                <a:spcPts val="0"/>
+              </a:spcBef>
+              <a:spcAft>
+                <a:spcPts val="0"/>
+              </a:spcAft>
+              <a:buSzPts val="1800"/>
+              <a:buFont typeface="Wingdings" panose="05000000000000000000" pitchFamily="2" charset="2"/>
+              <a:buChar char="Ø"/>
+            </a:pPr>
+            <a:r>
+              <a:rPr lang="en-US" dirty="0"/>
+              <a:t>Save to CSV</a:t>
+            </a:r>
+          </a:p>
+          <a:p>
             <a:pPr marL="514350" indent="-514350">
               <a:buFont typeface="Wingdings" panose="05000000000000000000" pitchFamily="2" charset="2"/>
               <a:buChar char="Ø"/>
             </a:pPr>
-            <a:r>
-              <a:rPr lang="en-US" dirty="0"/>
-              <a:t>Exploration</a:t>
-            </a:r>
-          </a:p>
-          <a:p>
-            <a:pPr marL="788670" lvl="1" indent="-514350">
-              <a:buFont typeface="Wingdings" panose="05000000000000000000" pitchFamily="2" charset="2"/>
-              <a:buChar char="Ø"/>
-            </a:pPr>
-            <a:r>
-              <a:rPr lang="en-US" dirty="0"/>
-              <a:t>Explore Parameters</a:t>
-            </a:r>
-          </a:p>
-          <a:p>
-            <a:pPr marL="788670" lvl="1" indent="-514350">
-              <a:buFont typeface="Wingdings" panose="05000000000000000000" pitchFamily="2" charset="2"/>
-              <a:buChar char="Ø"/>
-            </a:pPr>
-            <a:r>
-              <a:rPr lang="en-US" dirty="0"/>
-              <a:t>Choose Sample Size</a:t>
-            </a:r>
-          </a:p>
-          <a:p>
-            <a:pPr marL="514350" indent="-514350">
-              <a:buFont typeface="Wingdings" panose="05000000000000000000" pitchFamily="2" charset="2"/>
-              <a:buChar char="Ø"/>
-            </a:pPr>
-            <a:r>
-              <a:rPr lang="en-US" dirty="0" err="1"/>
-              <a:t>DataFrame</a:t>
-            </a:r>
-            <a:r>
-              <a:rPr lang="en-US" dirty="0"/>
-              <a:t> Cleanup</a:t>
-            </a:r>
-          </a:p>
-          <a:p>
-            <a:pPr marL="514350" indent="-514350">
-              <a:buFont typeface="Wingdings" panose="05000000000000000000" pitchFamily="2" charset="2"/>
-              <a:buChar char="Ø"/>
-            </a:pPr>
-            <a:r>
-              <a:rPr lang="en-US" dirty="0"/>
-              <a:t>Save to CSV</a:t>
-            </a:r>
-          </a:p>
-          <a:p>
-            <a:pPr marL="514350" indent="-514350">
-              <a:buFont typeface="Wingdings" panose="05000000000000000000" pitchFamily="2" charset="2"/>
-              <a:buChar char="Ø"/>
-            </a:pPr>
-            <a:r>
-              <a:rPr lang="en-US" dirty="0"/>
-              <a:t>Consolidating &amp; revising questions</a:t>
-            </a:r>
+            <a:endParaRPr lang="en-US" dirty="0"/>
           </a:p>
         </p:txBody>
       </p:sp>
@@ -6748,25 +8929,19 @@
       </p:pic>
       <p:pic>
         <p:nvPicPr>
-          <p:cNvPr id="5" name="Picture 4">
-            <a:extLst>
-              <a:ext uri="{FF2B5EF4-FFF2-40B4-BE49-F238E27FC236}">
-                <a16:creationId xmlns:a16="http://schemas.microsoft.com/office/drawing/2014/main" id="{1E8BE2A6-34CA-4DA4-9F81-9CBE1E37C8E8}"/>
-              </a:ext>
-            </a:extLst>
-          </p:cNvPr>
-          <p:cNvPicPr>
-            <a:picLocks noChangeAspect="1"/>
-          </p:cNvPicPr>
+          <p:cNvPr id="6" name="Google Shape;122;p4">
+            <a:extLst>
+              <a:ext uri="{FF2B5EF4-FFF2-40B4-BE49-F238E27FC236}">
+                <a16:creationId xmlns:a16="http://schemas.microsoft.com/office/drawing/2014/main" id="{F820C22D-A38F-44C6-9570-6C803C470852}"/>
+              </a:ext>
+            </a:extLst>
+          </p:cNvPr>
+          <p:cNvPicPr preferRelativeResize="0"/>
           <p:nvPr/>
         </p:nvPicPr>
         <p:blipFill>
           <a:blip r:embed="rId4">
-            <a:extLst>
-              <a:ext uri="{28A0092B-C50C-407E-A947-70E740481C1C}">
-                <a14:useLocalDpi xmlns:a14="http://schemas.microsoft.com/office/drawing/2010/main" val="0"/>
-              </a:ext>
-            </a:extLst>
+            <a:alphaModFix/>
           </a:blip>
           <a:stretch>
             <a:fillRect/>
@@ -6774,12 +8949,49 @@
         </p:blipFill>
         <p:spPr>
           <a:xfrm>
-            <a:off x="6927614" y="2390035"/>
-            <a:ext cx="4990209" cy="3219490"/>
+            <a:off x="4971480" y="2788773"/>
+            <a:ext cx="2573350" cy="3191550"/>
           </a:xfrm>
           <a:prstGeom prst="rect">
             <a:avLst/>
           </a:prstGeom>
+          <a:noFill/>
+          <a:ln>
+            <a:noFill/>
+          </a:ln>
+        </p:spPr>
+      </p:pic>
+      <p:pic>
+        <p:nvPicPr>
+          <p:cNvPr id="7" name="Google Shape;123;p4">
+            <a:extLst>
+              <a:ext uri="{FF2B5EF4-FFF2-40B4-BE49-F238E27FC236}">
+                <a16:creationId xmlns:a16="http://schemas.microsoft.com/office/drawing/2014/main" id="{29F9E596-21CC-4837-84CF-C006A613DE7F}"/>
+              </a:ext>
+            </a:extLst>
+          </p:cNvPr>
+          <p:cNvPicPr preferRelativeResize="0"/>
+          <p:nvPr/>
+        </p:nvPicPr>
+        <p:blipFill rotWithShape="1">
+          <a:blip r:embed="rId5">
+            <a:alphaModFix/>
+          </a:blip>
+          <a:srcRect r="40863"/>
+          <a:stretch/>
+        </p:blipFill>
+        <p:spPr>
+          <a:xfrm>
+            <a:off x="7942874" y="3181627"/>
+            <a:ext cx="4249126" cy="2003800"/>
+          </a:xfrm>
+          <a:prstGeom prst="rect">
+            <a:avLst/>
+          </a:prstGeom>
+          <a:noFill/>
+          <a:ln>
+            <a:noFill/>
+          </a:ln>
         </p:spPr>
       </p:pic>
     </p:spTree>
@@ -6840,7 +9052,7 @@
           <a:p>
             <a:r>
               <a:rPr lang="en-US" sz="5400" dirty="0"/>
-              <a:t>Our base </a:t>
+              <a:t>Clean </a:t>
             </a:r>
             <a:r>
               <a:rPr lang="en-US" sz="5400" dirty="0" err="1"/>
@@ -6984,60 +9196,7 @@
           <a:p>
             <a:r>
               <a:rPr lang="en-US" sz="5400" dirty="0"/>
-              <a:t>Data Analysis</a:t>
-            </a:r>
-          </a:p>
-        </p:txBody>
-      </p:sp>
-      <p:sp>
-        <p:nvSpPr>
-          <p:cNvPr id="3" name="Content Placeholder 2">
-            <a:extLst>
-              <a:ext uri="{FF2B5EF4-FFF2-40B4-BE49-F238E27FC236}">
-                <a16:creationId xmlns:a16="http://schemas.microsoft.com/office/drawing/2014/main" id="{FD456E9F-06AD-4361-89B7-68735BC26226}"/>
-              </a:ext>
-            </a:extLst>
-          </p:cNvPr>
-          <p:cNvSpPr>
-            <a:spLocks noGrp="1"/>
-          </p:cNvSpPr>
-          <p:nvPr>
-            <p:ph idx="1"/>
-          </p:nvPr>
-        </p:nvSpPr>
-        <p:spPr/>
-        <p:txBody>
-          <a:bodyPr/>
-          <a:lstStyle/>
-          <a:p>
-            <a:pPr marL="457200" indent="-457200">
-              <a:buFont typeface="Wingdings" panose="05000000000000000000" pitchFamily="2" charset="2"/>
-              <a:buChar char="Ø"/>
-            </a:pPr>
-            <a:r>
-              <a:rPr lang="en-US" dirty="0"/>
-              <a:t>Tempo</a:t>
-            </a:r>
-          </a:p>
-          <a:p>
-            <a:pPr marL="457200" indent="-457200">
-              <a:buFont typeface="Wingdings" panose="05000000000000000000" pitchFamily="2" charset="2"/>
-              <a:buChar char="Ø"/>
-            </a:pPr>
-            <a:r>
-              <a:rPr lang="en-US" dirty="0" err="1"/>
-              <a:t>Accousticness</a:t>
-            </a:r>
-            <a:endParaRPr lang="en-US" dirty="0"/>
-          </a:p>
-          <a:p>
-            <a:pPr marL="457200" indent="-457200">
-              <a:buFont typeface="Wingdings" panose="05000000000000000000" pitchFamily="2" charset="2"/>
-              <a:buChar char="Ø"/>
-            </a:pPr>
-            <a:r>
-              <a:rPr lang="en-US" dirty="0"/>
-              <a:t>Danceability</a:t>
+              <a:t>Statistical Analysis</a:t>
             </a:r>
           </a:p>
         </p:txBody>
@@ -7073,6 +9232,480 @@
           <a:xfrm>
             <a:off x="9559637" y="0"/>
             <a:ext cx="2632364" cy="2216727"/>
+          </a:xfrm>
+          <a:prstGeom prst="rect">
+            <a:avLst/>
+          </a:prstGeom>
+          <a:noFill/>
+          <a:extLst>
+            <a:ext uri="{909E8E84-426E-40DD-AFC4-6F175D3DCCD1}">
+              <a14:hiddenFill xmlns:a14="http://schemas.microsoft.com/office/drawing/2010/main">
+                <a:solidFill>
+                  <a:srgbClr val="FFFFFF"/>
+                </a:solidFill>
+              </a14:hiddenFill>
+            </a:ext>
+          </a:extLst>
+        </p:spPr>
+      </p:pic>
+      <p:pic>
+        <p:nvPicPr>
+          <p:cNvPr id="7" name="Content Placeholder 4" descr="Chart&#10;&#10;Description automatically generated with medium confidence">
+            <a:extLst>
+              <a:ext uri="{FF2B5EF4-FFF2-40B4-BE49-F238E27FC236}">
+                <a16:creationId xmlns:a16="http://schemas.microsoft.com/office/drawing/2014/main" id="{8A44F19A-DD7A-40C0-861E-884D51ABE306}"/>
+              </a:ext>
+            </a:extLst>
+          </p:cNvPr>
+          <p:cNvPicPr>
+            <a:picLocks noChangeAspect="1"/>
+          </p:cNvPicPr>
+          <p:nvPr/>
+        </p:nvPicPr>
+        <p:blipFill rotWithShape="1">
+          <a:blip r:embed="rId4">
+            <a:extLst>
+              <a:ext uri="{28A0092B-C50C-407E-A947-70E740481C1C}">
+                <a14:useLocalDpi xmlns:a14="http://schemas.microsoft.com/office/drawing/2010/main" val="0"/>
+              </a:ext>
+            </a:extLst>
+          </a:blip>
+          <a:srcRect l="20" t="2707" r="-3274" b="-3292"/>
+          <a:stretch/>
+        </p:blipFill>
+        <p:spPr>
+          <a:xfrm>
+            <a:off x="3685159" y="2447507"/>
+            <a:ext cx="4818634" cy="4368246"/>
+          </a:xfrm>
+          <a:prstGeom prst="rect">
+            <a:avLst/>
+          </a:prstGeom>
+        </p:spPr>
+      </p:pic>
+    </p:spTree>
+    <p:extLst>
+      <p:ext uri="{BB962C8B-B14F-4D97-AF65-F5344CB8AC3E}">
+        <p14:creationId xmlns:p14="http://schemas.microsoft.com/office/powerpoint/2010/main" val="1672478332"/>
+      </p:ext>
+    </p:extLst>
+  </p:cSld>
+  <p:clrMapOvr>
+    <a:masterClrMapping/>
+  </p:clrMapOvr>
+  <p:transition>
+    <p:wipe/>
+  </p:transition>
+</p:sld>
+</file>
+
+<file path=ppt/slides/slide7.xml><?xml version="1.0" encoding="utf-8"?>
+<p:sld xmlns:a="http://schemas.openxmlformats.org/drawingml/2006/main" xmlns:r="http://schemas.openxmlformats.org/officeDocument/2006/relationships" xmlns:p="http://schemas.openxmlformats.org/presentationml/2006/main">
+  <p:cSld>
+    <p:spTree>
+      <p:nvGrpSpPr>
+        <p:cNvPr id="1" name=""/>
+        <p:cNvGrpSpPr/>
+        <p:nvPr/>
+      </p:nvGrpSpPr>
+      <p:grpSpPr>
+        <a:xfrm>
+          <a:off x="0" y="0"/>
+          <a:ext cx="0" cy="0"/>
+          <a:chOff x="0" y="0"/>
+          <a:chExt cx="0" cy="0"/>
+        </a:xfrm>
+      </p:grpSpPr>
+      <p:sp>
+        <p:nvSpPr>
+          <p:cNvPr id="2" name="Title 1">
+            <a:extLst>
+              <a:ext uri="{FF2B5EF4-FFF2-40B4-BE49-F238E27FC236}">
+                <a16:creationId xmlns:a16="http://schemas.microsoft.com/office/drawing/2014/main" id="{FE04FC5D-740C-495D-BE03-23B345B8902E}"/>
+              </a:ext>
+            </a:extLst>
+          </p:cNvPr>
+          <p:cNvSpPr>
+            <a:spLocks noGrp="1"/>
+          </p:cNvSpPr>
+          <p:nvPr>
+            <p:ph type="title"/>
+          </p:nvPr>
+        </p:nvSpPr>
+        <p:spPr/>
+        <p:txBody>
+          <a:bodyPr anchor="ctr">
+            <a:normAutofit/>
+          </a:bodyPr>
+          <a:lstStyle/>
+          <a:p>
+            <a:r>
+              <a:rPr lang="en-US" sz="5400" dirty="0"/>
+              <a:t>Statistical Analysis</a:t>
+            </a:r>
+          </a:p>
+        </p:txBody>
+      </p:sp>
+      <p:pic>
+        <p:nvPicPr>
+          <p:cNvPr id="1032" name="Picture 8" descr="Music notes sign Pink neon icon in the brick wall - stock vector |  Crushpixel">
+            <a:extLst>
+              <a:ext uri="{FF2B5EF4-FFF2-40B4-BE49-F238E27FC236}">
+                <a16:creationId xmlns:a16="http://schemas.microsoft.com/office/drawing/2014/main" id="{FCFF1D86-4905-429B-BDC1-BB20988244CF}"/>
+              </a:ext>
+            </a:extLst>
+          </p:cNvPr>
+          <p:cNvPicPr>
+            <a:picLocks noChangeAspect="1" noChangeArrowheads="1"/>
+          </p:cNvPicPr>
+          <p:nvPr/>
+        </p:nvPicPr>
+        <p:blipFill>
+          <a:blip r:embed="rId3">
+            <a:extLst>
+              <a:ext uri="{28A0092B-C50C-407E-A947-70E740481C1C}">
+                <a14:useLocalDpi xmlns:a14="http://schemas.microsoft.com/office/drawing/2010/main" val="0"/>
+              </a:ext>
+            </a:extLst>
+          </a:blip>
+          <a:srcRect/>
+          <a:stretch>
+            <a:fillRect/>
+          </a:stretch>
+        </p:blipFill>
+        <p:spPr bwMode="auto">
+          <a:xfrm>
+            <a:off x="9559637" y="0"/>
+            <a:ext cx="2632364" cy="2216727"/>
+          </a:xfrm>
+          <a:prstGeom prst="rect">
+            <a:avLst/>
+          </a:prstGeom>
+          <a:noFill/>
+          <a:extLst>
+            <a:ext uri="{909E8E84-426E-40DD-AFC4-6F175D3DCCD1}">
+              <a14:hiddenFill xmlns:a14="http://schemas.microsoft.com/office/drawing/2010/main">
+                <a:solidFill>
+                  <a:srgbClr val="FFFFFF"/>
+                </a:solidFill>
+              </a14:hiddenFill>
+            </a:ext>
+          </a:extLst>
+        </p:spPr>
+      </p:pic>
+      <p:pic>
+        <p:nvPicPr>
+          <p:cNvPr id="11" name="Picture 10">
+            <a:extLst>
+              <a:ext uri="{FF2B5EF4-FFF2-40B4-BE49-F238E27FC236}">
+                <a16:creationId xmlns:a16="http://schemas.microsoft.com/office/drawing/2014/main" id="{E4CF8AF9-64B0-4E1F-809D-FAB64949A863}"/>
+              </a:ext>
+            </a:extLst>
+          </p:cNvPr>
+          <p:cNvPicPr/>
+          <p:nvPr/>
+        </p:nvPicPr>
+        <p:blipFill>
+          <a:blip r:embed="rId4"/>
+          <a:stretch>
+            <a:fillRect/>
+          </a:stretch>
+        </p:blipFill>
+        <p:spPr>
+          <a:xfrm>
+            <a:off x="9601056" y="2653088"/>
+            <a:ext cx="1905000" cy="3686175"/>
+          </a:xfrm>
+          <a:prstGeom prst="rect">
+            <a:avLst/>
+          </a:prstGeom>
+        </p:spPr>
+      </p:pic>
+      <p:pic>
+        <p:nvPicPr>
+          <p:cNvPr id="12" name="Picture 11">
+            <a:extLst>
+              <a:ext uri="{FF2B5EF4-FFF2-40B4-BE49-F238E27FC236}">
+                <a16:creationId xmlns:a16="http://schemas.microsoft.com/office/drawing/2014/main" id="{4ABDE58B-05DB-4980-B433-9A9F44B8EDAC}"/>
+              </a:ext>
+            </a:extLst>
+          </p:cNvPr>
+          <p:cNvPicPr/>
+          <p:nvPr/>
+        </p:nvPicPr>
+        <p:blipFill>
+          <a:blip r:embed="rId5"/>
+          <a:stretch>
+            <a:fillRect/>
+          </a:stretch>
+        </p:blipFill>
+        <p:spPr>
+          <a:xfrm>
+            <a:off x="6156440" y="2653088"/>
+            <a:ext cx="2790336" cy="3686175"/>
+          </a:xfrm>
+          <a:prstGeom prst="rect">
+            <a:avLst/>
+          </a:prstGeom>
+        </p:spPr>
+      </p:pic>
+      <p:sp>
+        <p:nvSpPr>
+          <p:cNvPr id="5" name="TextBox 4">
+            <a:extLst>
+              <a:ext uri="{FF2B5EF4-FFF2-40B4-BE49-F238E27FC236}">
+                <a16:creationId xmlns:a16="http://schemas.microsoft.com/office/drawing/2014/main" id="{21D1584A-F0AA-4CA2-BBC8-32BDEC719D5A}"/>
+              </a:ext>
+            </a:extLst>
+          </p:cNvPr>
+          <p:cNvSpPr txBox="1"/>
+          <p:nvPr/>
+        </p:nvSpPr>
+        <p:spPr>
+          <a:xfrm>
+            <a:off x="806824" y="2904565"/>
+            <a:ext cx="5349616" cy="2419637"/>
+          </a:xfrm>
+          <a:prstGeom prst="rect">
+            <a:avLst/>
+          </a:prstGeom>
+          <a:noFill/>
+        </p:spPr>
+        <p:txBody>
+          <a:bodyPr wrap="square" rtlCol="0">
+            <a:spAutoFit/>
+          </a:bodyPr>
+          <a:lstStyle/>
+          <a:p>
+            <a:pPr marL="457200" indent="-457200">
+              <a:lnSpc>
+                <a:spcPct val="150000"/>
+              </a:lnSpc>
+              <a:buFont typeface="Wingdings" panose="05000000000000000000" pitchFamily="2" charset="2"/>
+              <a:buChar char="Ø"/>
+            </a:pPr>
+            <a:r>
+              <a:rPr lang="en-US" sz="2600" dirty="0"/>
+              <a:t>Hypothesis</a:t>
+            </a:r>
+          </a:p>
+          <a:p>
+            <a:pPr marL="457200" indent="-457200">
+              <a:lnSpc>
+                <a:spcPct val="150000"/>
+              </a:lnSpc>
+              <a:buFont typeface="Wingdings" panose="05000000000000000000" pitchFamily="2" charset="2"/>
+              <a:buChar char="Ø"/>
+            </a:pPr>
+            <a:r>
+              <a:rPr lang="en-US" sz="2600" dirty="0"/>
+              <a:t>Null Hypothesis</a:t>
+            </a:r>
+          </a:p>
+          <a:p>
+            <a:pPr marL="457200" indent="-457200">
+              <a:lnSpc>
+                <a:spcPct val="150000"/>
+              </a:lnSpc>
+              <a:buFont typeface="Wingdings" panose="05000000000000000000" pitchFamily="2" charset="2"/>
+              <a:buChar char="Ø"/>
+            </a:pPr>
+            <a:r>
+              <a:rPr lang="en-US" sz="2600" dirty="0"/>
+              <a:t>Pearson’s Correlation Test</a:t>
+            </a:r>
+          </a:p>
+          <a:p>
+            <a:pPr marL="457200" indent="-457200">
+              <a:lnSpc>
+                <a:spcPct val="150000"/>
+              </a:lnSpc>
+              <a:buFont typeface="Wingdings" panose="05000000000000000000" pitchFamily="2" charset="2"/>
+              <a:buChar char="Ø"/>
+            </a:pPr>
+            <a:r>
+              <a:rPr lang="en-US" sz="2600" dirty="0"/>
+              <a:t>Alpha Value = .05</a:t>
+            </a:r>
+          </a:p>
+        </p:txBody>
+      </p:sp>
+    </p:spTree>
+    <p:extLst>
+      <p:ext uri="{BB962C8B-B14F-4D97-AF65-F5344CB8AC3E}">
+        <p14:creationId xmlns:p14="http://schemas.microsoft.com/office/powerpoint/2010/main" val="3999110350"/>
+      </p:ext>
+    </p:extLst>
+  </p:cSld>
+  <p:clrMapOvr>
+    <a:masterClrMapping/>
+  </p:clrMapOvr>
+  <p:transition>
+    <p:wipe/>
+  </p:transition>
+</p:sld>
+</file>
+
+<file path=ppt/slides/slide8.xml><?xml version="1.0" encoding="utf-8"?>
+<p:sld xmlns:a="http://schemas.openxmlformats.org/drawingml/2006/main" xmlns:r="http://schemas.openxmlformats.org/officeDocument/2006/relationships" xmlns:p="http://schemas.openxmlformats.org/presentationml/2006/main">
+  <p:cSld>
+    <p:spTree>
+      <p:nvGrpSpPr>
+        <p:cNvPr id="1" name=""/>
+        <p:cNvGrpSpPr/>
+        <p:nvPr/>
+      </p:nvGrpSpPr>
+      <p:grpSpPr>
+        <a:xfrm>
+          <a:off x="0" y="0"/>
+          <a:ext cx="0" cy="0"/>
+          <a:chOff x="0" y="0"/>
+          <a:chExt cx="0" cy="0"/>
+        </a:xfrm>
+      </p:grpSpPr>
+      <p:sp>
+        <p:nvSpPr>
+          <p:cNvPr id="2" name="Title 1">
+            <a:extLst>
+              <a:ext uri="{FF2B5EF4-FFF2-40B4-BE49-F238E27FC236}">
+                <a16:creationId xmlns:a16="http://schemas.microsoft.com/office/drawing/2014/main" id="{FE04FC5D-740C-495D-BE03-23B345B8902E}"/>
+              </a:ext>
+            </a:extLst>
+          </p:cNvPr>
+          <p:cNvSpPr>
+            <a:spLocks noGrp="1"/>
+          </p:cNvSpPr>
+          <p:nvPr>
+            <p:ph type="title"/>
+          </p:nvPr>
+        </p:nvSpPr>
+        <p:spPr/>
+        <p:txBody>
+          <a:bodyPr anchor="ctr">
+            <a:normAutofit/>
+          </a:bodyPr>
+          <a:lstStyle/>
+          <a:p>
+            <a:r>
+              <a:rPr lang="en-US" sz="5400" dirty="0"/>
+              <a:t>Energy</a:t>
+            </a:r>
+          </a:p>
+        </p:txBody>
+      </p:sp>
+      <p:pic>
+        <p:nvPicPr>
+          <p:cNvPr id="1032" name="Picture 8" descr="Music notes sign Pink neon icon in the brick wall - stock vector |  Crushpixel">
+            <a:extLst>
+              <a:ext uri="{FF2B5EF4-FFF2-40B4-BE49-F238E27FC236}">
+                <a16:creationId xmlns:a16="http://schemas.microsoft.com/office/drawing/2014/main" id="{FCFF1D86-4905-429B-BDC1-BB20988244CF}"/>
+              </a:ext>
+            </a:extLst>
+          </p:cNvPr>
+          <p:cNvPicPr>
+            <a:picLocks noChangeAspect="1" noChangeArrowheads="1"/>
+          </p:cNvPicPr>
+          <p:nvPr/>
+        </p:nvPicPr>
+        <p:blipFill>
+          <a:blip r:embed="rId3">
+            <a:extLst>
+              <a:ext uri="{28A0092B-C50C-407E-A947-70E740481C1C}">
+                <a14:useLocalDpi xmlns:a14="http://schemas.microsoft.com/office/drawing/2010/main" val="0"/>
+              </a:ext>
+            </a:extLst>
+          </a:blip>
+          <a:srcRect/>
+          <a:stretch>
+            <a:fillRect/>
+          </a:stretch>
+        </p:blipFill>
+        <p:spPr bwMode="auto">
+          <a:xfrm>
+            <a:off x="9559637" y="0"/>
+            <a:ext cx="2632364" cy="2216727"/>
+          </a:xfrm>
+          <a:prstGeom prst="rect">
+            <a:avLst/>
+          </a:prstGeom>
+          <a:noFill/>
+          <a:extLst>
+            <a:ext uri="{909E8E84-426E-40DD-AFC4-6F175D3DCCD1}">
+              <a14:hiddenFill xmlns:a14="http://schemas.microsoft.com/office/drawing/2010/main">
+                <a:solidFill>
+                  <a:srgbClr val="FFFFFF"/>
+                </a:solidFill>
+              </a14:hiddenFill>
+            </a:ext>
+          </a:extLst>
+        </p:spPr>
+      </p:pic>
+      <p:pic>
+        <p:nvPicPr>
+          <p:cNvPr id="6" name="Content Placeholder 4" descr="Graphical user interface, text, application&#10;&#10;Description automatically generated">
+            <a:extLst>
+              <a:ext uri="{FF2B5EF4-FFF2-40B4-BE49-F238E27FC236}">
+                <a16:creationId xmlns:a16="http://schemas.microsoft.com/office/drawing/2014/main" id="{1DA456DA-9B27-4264-AD03-CCDAFFD617C1}"/>
+              </a:ext>
+            </a:extLst>
+          </p:cNvPr>
+          <p:cNvPicPr>
+            <a:picLocks noChangeAspect="1"/>
+          </p:cNvPicPr>
+          <p:nvPr/>
+        </p:nvPicPr>
+        <p:blipFill rotWithShape="1">
+          <a:blip r:embed="rId4">
+            <a:extLst>
+              <a:ext uri="{28A0092B-C50C-407E-A947-70E740481C1C}">
+                <a14:useLocalDpi xmlns:a14="http://schemas.microsoft.com/office/drawing/2010/main" val="0"/>
+              </a:ext>
+            </a:extLst>
+          </a:blip>
+          <a:srcRect l="534" t="2862" r="81209" b="74781"/>
+          <a:stretch/>
+        </p:blipFill>
+        <p:spPr>
+          <a:xfrm>
+            <a:off x="0" y="2336412"/>
+            <a:ext cx="5829708" cy="4521588"/>
+          </a:xfrm>
+          <a:prstGeom prst="rect">
+            <a:avLst/>
+          </a:prstGeom>
+        </p:spPr>
+      </p:pic>
+      <p:pic>
+        <p:nvPicPr>
+          <p:cNvPr id="5122" name="Picture 2" descr="Energy">
+            <a:extLst>
+              <a:ext uri="{FF2B5EF4-FFF2-40B4-BE49-F238E27FC236}">
+                <a16:creationId xmlns:a16="http://schemas.microsoft.com/office/drawing/2014/main" id="{DC3BDA06-09EB-40C4-B7BD-CE03EA80C943}"/>
+              </a:ext>
+            </a:extLst>
+          </p:cNvPr>
+          <p:cNvPicPr>
+            <a:picLocks noChangeAspect="1" noChangeArrowheads="1"/>
+          </p:cNvPicPr>
+          <p:nvPr/>
+        </p:nvPicPr>
+        <p:blipFill>
+          <a:blip r:embed="rId5">
+            <a:extLst>
+              <a:ext uri="{28A0092B-C50C-407E-A947-70E740481C1C}">
+                <a14:useLocalDpi xmlns:a14="http://schemas.microsoft.com/office/drawing/2010/main" val="0"/>
+              </a:ext>
+            </a:extLst>
+          </a:blip>
+          <a:srcRect/>
+          <a:stretch>
+            <a:fillRect/>
+          </a:stretch>
+        </p:blipFill>
+        <p:spPr bwMode="auto">
+          <a:xfrm>
+            <a:off x="5824130" y="3050495"/>
+            <a:ext cx="6006073" cy="3108542"/>
           </a:xfrm>
           <a:prstGeom prst="rect">
             <a:avLst/>
@@ -7105,7 +9738,7 @@
 </p:sld>
 </file>
 
-<file path=ppt/slides/slide7.xml><?xml version="1.0" encoding="utf-8"?>
+<file path=ppt/slides/slide9.xml><?xml version="1.0" encoding="utf-8"?>
 <p:sld xmlns:a="http://schemas.openxmlformats.org/drawingml/2006/main" xmlns:r="http://schemas.openxmlformats.org/officeDocument/2006/relationships" xmlns:p="http://schemas.openxmlformats.org/presentationml/2006/main">
   <p:cSld>
     <p:spTree>
@@ -7146,61 +9779,10 @@
           <a:lstStyle/>
           <a:p>
             <a:r>
-              <a:rPr lang="en-US" sz="5400" dirty="0"/>
-              <a:t>Data Analysis</a:t>
-            </a:r>
-          </a:p>
-        </p:txBody>
-      </p:sp>
-      <p:sp>
-        <p:nvSpPr>
-          <p:cNvPr id="3" name="Content Placeholder 2">
-            <a:extLst>
-              <a:ext uri="{FF2B5EF4-FFF2-40B4-BE49-F238E27FC236}">
-                <a16:creationId xmlns:a16="http://schemas.microsoft.com/office/drawing/2014/main" id="{FD456E9F-06AD-4361-89B7-68735BC26226}"/>
-              </a:ext>
-            </a:extLst>
-          </p:cNvPr>
-          <p:cNvSpPr>
-            <a:spLocks noGrp="1"/>
-          </p:cNvSpPr>
-          <p:nvPr>
-            <p:ph idx="1"/>
-          </p:nvPr>
-        </p:nvSpPr>
-        <p:spPr/>
-        <p:txBody>
-          <a:bodyPr/>
-          <a:lstStyle/>
-          <a:p>
-            <a:pPr marL="457200" indent="-457200">
-              <a:buFont typeface="Wingdings" panose="05000000000000000000" pitchFamily="2" charset="2"/>
-              <a:buChar char="Ø"/>
-            </a:pPr>
-            <a:r>
-              <a:rPr lang="en-US" dirty="0"/>
-              <a:t>Duration</a:t>
-            </a:r>
-          </a:p>
-          <a:p>
-            <a:pPr marL="457200" indent="-457200">
-              <a:buFont typeface="Wingdings" panose="05000000000000000000" pitchFamily="2" charset="2"/>
-              <a:buChar char="Ø"/>
-            </a:pPr>
-            <a:r>
-              <a:rPr lang="en-US" dirty="0"/>
-              <a:t>Energy</a:t>
-            </a:r>
-          </a:p>
-          <a:p>
-            <a:pPr marL="457200" indent="-457200">
-              <a:buFont typeface="Wingdings" panose="05000000000000000000" pitchFamily="2" charset="2"/>
-              <a:buChar char="Ø"/>
-            </a:pPr>
-            <a:r>
-              <a:rPr lang="en-US" dirty="0"/>
-              <a:t>Explicitness</a:t>
-            </a:r>
+              <a:rPr lang="en-US" sz="5400" dirty="0" err="1"/>
+              <a:t>Accousticness</a:t>
+            </a:r>
+            <a:endParaRPr lang="en-US" sz="5400" dirty="0"/>
           </a:p>
         </p:txBody>
       </p:sp>
@@ -7251,243 +9833,12 @@
           </a:extLst>
         </p:spPr>
       </p:pic>
-    </p:spTree>
-    <p:extLst>
-      <p:ext uri="{BB962C8B-B14F-4D97-AF65-F5344CB8AC3E}">
-        <p14:creationId xmlns:p14="http://schemas.microsoft.com/office/powerpoint/2010/main" val="302686026"/>
-      </p:ext>
-    </p:extLst>
-  </p:cSld>
-  <p:clrMapOvr>
-    <a:masterClrMapping/>
-  </p:clrMapOvr>
-  <p:transition>
-    <p:wipe/>
-  </p:transition>
-</p:sld>
-</file>
-
-<file path=ppt/slides/slide8.xml><?xml version="1.0" encoding="utf-8"?>
-<p:sld xmlns:a="http://schemas.openxmlformats.org/drawingml/2006/main" xmlns:r="http://schemas.openxmlformats.org/officeDocument/2006/relationships" xmlns:p="http://schemas.openxmlformats.org/presentationml/2006/main">
-  <p:cSld>
-    <p:bg>
-      <p:bgPr>
-        <a:solidFill>
-          <a:schemeClr val="bg1"/>
-        </a:solidFill>
-        <a:effectLst/>
-      </p:bgPr>
-    </p:bg>
-    <p:spTree>
-      <p:nvGrpSpPr>
-        <p:cNvPr id="1" name=""/>
-        <p:cNvGrpSpPr/>
-        <p:nvPr/>
-      </p:nvGrpSpPr>
-      <p:grpSpPr>
-        <a:xfrm>
-          <a:off x="0" y="0"/>
-          <a:ext cx="0" cy="0"/>
-          <a:chOff x="0" y="0"/>
-          <a:chExt cx="0" cy="0"/>
-        </a:xfrm>
-      </p:grpSpPr>
-      <p:sp useBgFill="1">
-        <p:nvSpPr>
-          <p:cNvPr id="12" name="Rectangle 11">
-            <a:extLst>
-              <a:ext uri="{FF2B5EF4-FFF2-40B4-BE49-F238E27FC236}">
-                <a16:creationId xmlns:a16="http://schemas.microsoft.com/office/drawing/2014/main" id="{EB6D1D7F-141C-4D8E-BFBA-D95B68E16385}"/>
-              </a:ext>
-              <a:ext uri="{C183D7F6-B498-43B3-948B-1728B52AA6E4}">
-                <adec:decorative xmlns:adec="http://schemas.microsoft.com/office/drawing/2017/decorative" val="1"/>
-              </a:ext>
-            </a:extLst>
-          </p:cNvPr>
-          <p:cNvSpPr>
-            <a:spLocks noGrp="1" noRot="1" noChangeAspect="1" noMove="1" noResize="1" noEditPoints="1" noAdjustHandles="1" noChangeArrowheads="1" noChangeShapeType="1" noTextEdit="1"/>
-          </p:cNvSpPr>
-          <p:nvPr>
-            <p:extLst>
-              <p:ext uri="{386F3935-93C4-4BCD-93E2-E3B085C9AB24}">
-                <p16:designElem xmlns:p16="http://schemas.microsoft.com/office/powerpoint/2015/main" val="1"/>
-              </p:ext>
-            </p:extLst>
-          </p:nvPr>
-        </p:nvSpPr>
-        <p:spPr>
-          <a:xfrm>
-            <a:off x="1524" y="0"/>
-            <a:ext cx="12188952" cy="6858000"/>
-          </a:xfrm>
-          <a:prstGeom prst="rect">
-            <a:avLst/>
-          </a:prstGeom>
-          <a:ln>
-            <a:noFill/>
-          </a:ln>
-        </p:spPr>
-        <p:style>
-          <a:lnRef idx="2">
-            <a:schemeClr val="accent1">
-              <a:shade val="50000"/>
-            </a:schemeClr>
-          </a:lnRef>
-          <a:fillRef idx="1">
-            <a:schemeClr val="accent1"/>
-          </a:fillRef>
-          <a:effectRef idx="0">
-            <a:schemeClr val="accent1"/>
-          </a:effectRef>
-          <a:fontRef idx="minor">
-            <a:schemeClr val="lt1"/>
-          </a:fontRef>
-        </p:style>
-        <p:txBody>
-          <a:bodyPr rtlCol="0" anchor="ctr"/>
-          <a:lstStyle/>
-          <a:p>
-            <a:pPr algn="ctr"/>
-            <a:endParaRPr lang="en-US"/>
-          </a:p>
-        </p:txBody>
-      </p:sp>
-      <p:sp>
-        <p:nvSpPr>
-          <p:cNvPr id="14" name="Rectangle 13">
-            <a:extLst>
-              <a:ext uri="{FF2B5EF4-FFF2-40B4-BE49-F238E27FC236}">
-                <a16:creationId xmlns:a16="http://schemas.microsoft.com/office/drawing/2014/main" id="{245B42B6-26F8-4E25-839B-FB38F13BEFFC}"/>
-              </a:ext>
-              <a:ext uri="{C183D7F6-B498-43B3-948B-1728B52AA6E4}">
-                <adec:decorative xmlns:adec="http://schemas.microsoft.com/office/drawing/2017/decorative" val="1"/>
-              </a:ext>
-            </a:extLst>
-          </p:cNvPr>
-          <p:cNvSpPr>
-            <a:spLocks noGrp="1" noRot="1" noChangeAspect="1" noMove="1" noResize="1" noEditPoints="1" noAdjustHandles="1" noChangeArrowheads="1" noChangeShapeType="1" noTextEdit="1"/>
-          </p:cNvSpPr>
-          <p:nvPr>
-            <p:extLst>
-              <p:ext uri="{386F3935-93C4-4BCD-93E2-E3B085C9AB24}">
-                <p16:designElem xmlns:p16="http://schemas.microsoft.com/office/powerpoint/2015/main" val="1"/>
-              </p:ext>
-            </p:extLst>
-          </p:nvPr>
-        </p:nvSpPr>
-        <p:spPr>
-          <a:xfrm>
-            <a:off x="0" y="0"/>
-            <a:ext cx="12192000" cy="2264989"/>
-          </a:xfrm>
-          <a:prstGeom prst="rect">
-            <a:avLst/>
-          </a:prstGeom>
-          <a:solidFill>
-            <a:schemeClr val="tx1"/>
-          </a:solidFill>
-          <a:ln>
-            <a:noFill/>
-          </a:ln>
-        </p:spPr>
-        <p:style>
-          <a:lnRef idx="2">
-            <a:schemeClr val="accent1">
-              <a:shade val="50000"/>
-            </a:schemeClr>
-          </a:lnRef>
-          <a:fillRef idx="1">
-            <a:schemeClr val="accent1"/>
-          </a:fillRef>
-          <a:effectRef idx="0">
-            <a:schemeClr val="accent1"/>
-          </a:effectRef>
-          <a:fontRef idx="minor">
-            <a:schemeClr val="lt1"/>
-          </a:fontRef>
-        </p:style>
-        <p:txBody>
-          <a:bodyPr rtlCol="0" anchor="ctr"/>
-          <a:lstStyle/>
-          <a:p>
-            <a:pPr algn="ctr"/>
-            <a:endParaRPr lang="en-US"/>
-          </a:p>
-        </p:txBody>
-      </p:sp>
-      <p:sp>
-        <p:nvSpPr>
-          <p:cNvPr id="2" name="Title 1">
-            <a:extLst>
-              <a:ext uri="{FF2B5EF4-FFF2-40B4-BE49-F238E27FC236}">
-                <a16:creationId xmlns:a16="http://schemas.microsoft.com/office/drawing/2014/main" id="{B6B59E8F-D6B6-4BF8-AAA4-34B9716D8D67}"/>
-              </a:ext>
-            </a:extLst>
-          </p:cNvPr>
-          <p:cNvSpPr>
-            <a:spLocks noGrp="1"/>
-          </p:cNvSpPr>
-          <p:nvPr>
-            <p:ph type="title"/>
-          </p:nvPr>
-        </p:nvSpPr>
-        <p:spPr>
-          <a:xfrm>
-            <a:off x="960120" y="317814"/>
-            <a:ext cx="10268712" cy="1700784"/>
-          </a:xfrm>
-        </p:spPr>
-        <p:txBody>
-          <a:bodyPr>
-            <a:normAutofit/>
-          </a:bodyPr>
-          <a:lstStyle/>
-          <a:p>
-            <a:r>
-              <a:rPr lang="en-US" dirty="0"/>
-              <a:t>Statistical analysis </a:t>
-            </a:r>
-          </a:p>
-        </p:txBody>
-      </p:sp>
-      <p:sp>
-        <p:nvSpPr>
-          <p:cNvPr id="9" name="Content Placeholder 8">
-            <a:extLst>
-              <a:ext uri="{FF2B5EF4-FFF2-40B4-BE49-F238E27FC236}">
-                <a16:creationId xmlns:a16="http://schemas.microsoft.com/office/drawing/2014/main" id="{8BB60D2C-ABFD-473E-8C30-869F8667E718}"/>
-              </a:ext>
-            </a:extLst>
-          </p:cNvPr>
-          <p:cNvSpPr>
-            <a:spLocks noGrp="1"/>
-          </p:cNvSpPr>
-          <p:nvPr>
-            <p:ph idx="1"/>
-          </p:nvPr>
-        </p:nvSpPr>
-        <p:spPr>
-          <a:xfrm>
-            <a:off x="668655" y="2582803"/>
-            <a:ext cx="5869303" cy="3593592"/>
-          </a:xfrm>
-        </p:spPr>
-        <p:txBody>
-          <a:bodyPr>
-            <a:normAutofit/>
-          </a:bodyPr>
-          <a:lstStyle/>
-          <a:p>
-            <a:endParaRPr lang="en-US" dirty="0"/>
-          </a:p>
-        </p:txBody>
-      </p:sp>
       <p:pic>
         <p:nvPicPr>
-          <p:cNvPr id="5" name="Content Placeholder 4" descr="Chart&#10;&#10;Description automatically generated with medium confidence">
-            <a:extLst>
-              <a:ext uri="{FF2B5EF4-FFF2-40B4-BE49-F238E27FC236}">
-                <a16:creationId xmlns:a16="http://schemas.microsoft.com/office/drawing/2014/main" id="{81EF7E69-500E-490B-B2DB-D5B6CB600628}"/>
+          <p:cNvPr id="5" name="Content Placeholder 4" descr="Graphical user interface, text, application&#10;&#10;Description automatically generated">
+            <a:extLst>
+              <a:ext uri="{FF2B5EF4-FFF2-40B4-BE49-F238E27FC236}">
+                <a16:creationId xmlns:a16="http://schemas.microsoft.com/office/drawing/2014/main" id="{B8D2CD55-C7B4-493C-AA50-99839136D813}"/>
               </a:ext>
             </a:extLst>
           </p:cNvPr>
@@ -7497,120 +9848,32 @@
           <p:nvPr/>
         </p:nvPicPr>
         <p:blipFill rotWithShape="1">
-          <a:blip r:embed="rId2">
+          <a:blip r:embed="rId4">
             <a:extLst>
               <a:ext uri="{28A0092B-C50C-407E-A947-70E740481C1C}">
                 <a14:useLocalDpi xmlns:a14="http://schemas.microsoft.com/office/drawing/2010/main" val="0"/>
               </a:ext>
             </a:extLst>
           </a:blip>
-          <a:srcRect l="20" t="2707" r="-3274" b="-3292"/>
+          <a:srcRect l="1715" t="3377" r="73842" b="66124"/>
           <a:stretch/>
         </p:blipFill>
         <p:spPr>
           <a:xfrm>
-            <a:off x="7086217" y="2276424"/>
-            <a:ext cx="5189857" cy="4704771"/>
+            <a:off x="-1" y="2336413"/>
+            <a:ext cx="5802693" cy="4521588"/>
           </a:xfrm>
           <a:prstGeom prst="rect">
             <a:avLst/>
           </a:prstGeom>
         </p:spPr>
       </p:pic>
-    </p:spTree>
-    <p:extLst>
-      <p:ext uri="{BB962C8B-B14F-4D97-AF65-F5344CB8AC3E}">
-        <p14:creationId xmlns:p14="http://schemas.microsoft.com/office/powerpoint/2010/main" val="4012827547"/>
-      </p:ext>
-    </p:extLst>
-  </p:cSld>
-  <p:clrMapOvr>
-    <a:masterClrMapping/>
-  </p:clrMapOvr>
-  <p:transition>
-    <p:wipe/>
-  </p:transition>
-</p:sld>
-</file>
-
-<file path=ppt/slides/slide9.xml><?xml version="1.0" encoding="utf-8"?>
-<p:sld xmlns:a="http://schemas.openxmlformats.org/drawingml/2006/main" xmlns:r="http://schemas.openxmlformats.org/officeDocument/2006/relationships" xmlns:p="http://schemas.openxmlformats.org/presentationml/2006/main">
-  <p:cSld>
-    <p:spTree>
-      <p:nvGrpSpPr>
-        <p:cNvPr id="1" name=""/>
-        <p:cNvGrpSpPr/>
-        <p:nvPr/>
-      </p:nvGrpSpPr>
-      <p:grpSpPr>
-        <a:xfrm>
-          <a:off x="0" y="0"/>
-          <a:ext cx="0" cy="0"/>
-          <a:chOff x="0" y="0"/>
-          <a:chExt cx="0" cy="0"/>
-        </a:xfrm>
-      </p:grpSpPr>
-      <p:sp>
-        <p:nvSpPr>
-          <p:cNvPr id="2" name="Title 1">
-            <a:extLst>
-              <a:ext uri="{FF2B5EF4-FFF2-40B4-BE49-F238E27FC236}">
-                <a16:creationId xmlns:a16="http://schemas.microsoft.com/office/drawing/2014/main" id="{FE04FC5D-740C-495D-BE03-23B345B8902E}"/>
-              </a:ext>
-            </a:extLst>
-          </p:cNvPr>
-          <p:cNvSpPr>
-            <a:spLocks noGrp="1"/>
-          </p:cNvSpPr>
-          <p:nvPr>
-            <p:ph type="title"/>
-          </p:nvPr>
-        </p:nvSpPr>
-        <p:spPr/>
-        <p:txBody>
-          <a:bodyPr anchor="ctr">
-            <a:normAutofit/>
-          </a:bodyPr>
-          <a:lstStyle/>
-          <a:p>
-            <a:r>
-              <a:rPr lang="en-US" sz="5400" dirty="0"/>
-              <a:t>Discussion</a:t>
-            </a:r>
-          </a:p>
-        </p:txBody>
-      </p:sp>
-      <p:sp>
-        <p:nvSpPr>
-          <p:cNvPr id="3" name="Content Placeholder 2">
-            <a:extLst>
-              <a:ext uri="{FF2B5EF4-FFF2-40B4-BE49-F238E27FC236}">
-                <a16:creationId xmlns:a16="http://schemas.microsoft.com/office/drawing/2014/main" id="{FD456E9F-06AD-4361-89B7-68735BC26226}"/>
-              </a:ext>
-            </a:extLst>
-          </p:cNvPr>
-          <p:cNvSpPr>
-            <a:spLocks noGrp="1"/>
-          </p:cNvSpPr>
-          <p:nvPr>
-            <p:ph idx="1"/>
-          </p:nvPr>
-        </p:nvSpPr>
-        <p:spPr/>
-        <p:txBody>
-          <a:bodyPr/>
-          <a:lstStyle/>
-          <a:p>
-            <a:endParaRPr lang="en-US" dirty="0"/>
-          </a:p>
-        </p:txBody>
-      </p:sp>
       <p:pic>
         <p:nvPicPr>
-          <p:cNvPr id="1032" name="Picture 8" descr="Music notes sign Pink neon icon in the brick wall - stock vector |  Crushpixel">
-            <a:extLst>
-              <a:ext uri="{FF2B5EF4-FFF2-40B4-BE49-F238E27FC236}">
-                <a16:creationId xmlns:a16="http://schemas.microsoft.com/office/drawing/2014/main" id="{FCFF1D86-4905-429B-BDC1-BB20988244CF}"/>
+          <p:cNvPr id="4098" name="Picture 2" descr="Acousticness">
+            <a:extLst>
+              <a:ext uri="{FF2B5EF4-FFF2-40B4-BE49-F238E27FC236}">
+                <a16:creationId xmlns:a16="http://schemas.microsoft.com/office/drawing/2014/main" id="{C20862F2-97B2-4FC0-9277-394F5B9D8702}"/>
               </a:ext>
             </a:extLst>
           </p:cNvPr>
@@ -7620,7 +9883,7 @@
           <p:nvPr/>
         </p:nvPicPr>
         <p:blipFill>
-          <a:blip r:embed="rId3">
+          <a:blip r:embed="rId5">
             <a:extLst>
               <a:ext uri="{28A0092B-C50C-407E-A947-70E740481C1C}">
                 <a14:useLocalDpi xmlns:a14="http://schemas.microsoft.com/office/drawing/2010/main" val="0"/>
@@ -7634,8 +9897,8 @@
         </p:blipFill>
         <p:spPr bwMode="auto">
           <a:xfrm>
-            <a:off x="9559637" y="0"/>
-            <a:ext cx="2632364" cy="2216727"/>
+            <a:off x="5802692" y="3090586"/>
+            <a:ext cx="5851146" cy="3028357"/>
           </a:xfrm>
           <a:prstGeom prst="rect">
             <a:avLst/>
@@ -7655,7 +9918,7 @@
     </p:spTree>
     <p:extLst>
       <p:ext uri="{BB962C8B-B14F-4D97-AF65-F5344CB8AC3E}">
-        <p14:creationId xmlns:p14="http://schemas.microsoft.com/office/powerpoint/2010/main" val="2053556735"/>
+        <p14:creationId xmlns:p14="http://schemas.microsoft.com/office/powerpoint/2010/main" val="2458276485"/>
       </p:ext>
     </p:extLst>
   </p:cSld>

</xml_diff>

<commit_message>
just need notes for the key section then done
</commit_message>
<xml_diff>
--- a/Turn Up The Data.pptx
+++ b/Turn Up The Data.pptx
@@ -6757,53 +6757,119 @@
           </a:prstGeom>
         </p:spPr>
       </p:pic>
-      <p:pic>
-        <p:nvPicPr>
-          <p:cNvPr id="6146" name="Picture 2" descr="Instrumentalness">
-            <a:extLst>
-              <a:ext uri="{FF2B5EF4-FFF2-40B4-BE49-F238E27FC236}">
-                <a16:creationId xmlns:a16="http://schemas.microsoft.com/office/drawing/2014/main" id="{551A7CF3-6642-4EAB-87DB-0F7161F4CD68}"/>
-              </a:ext>
-            </a:extLst>
-          </p:cNvPr>
-          <p:cNvPicPr>
-            <a:picLocks noChangeAspect="1" noChangeArrowheads="1"/>
-          </p:cNvPicPr>
+      <p:grpSp>
+        <p:nvGrpSpPr>
+          <p:cNvPr id="6" name="Group 5">
+            <a:extLst>
+              <a:ext uri="{FF2B5EF4-FFF2-40B4-BE49-F238E27FC236}">
+                <a16:creationId xmlns:a16="http://schemas.microsoft.com/office/drawing/2014/main" id="{26408209-5BA6-4443-8A1F-0E01945FD969}"/>
+              </a:ext>
+            </a:extLst>
+          </p:cNvPr>
+          <p:cNvGrpSpPr/>
           <p:nvPr/>
-        </p:nvPicPr>
-        <p:blipFill>
-          <a:blip r:embed="rId5">
-            <a:extLst>
-              <a:ext uri="{28A0092B-C50C-407E-A947-70E740481C1C}">
-                <a14:useLocalDpi xmlns:a14="http://schemas.microsoft.com/office/drawing/2010/main" val="0"/>
-              </a:ext>
-            </a:extLst>
-          </a:blip>
-          <a:srcRect/>
-          <a:stretch>
-            <a:fillRect/>
-          </a:stretch>
-        </p:blipFill>
-        <p:spPr bwMode="auto">
+        </p:nvGrpSpPr>
+        <p:grpSpPr>
           <a:xfrm>
-            <a:off x="5518999" y="2887798"/>
-            <a:ext cx="6257085" cy="3238457"/>
+            <a:off x="5842947" y="2844478"/>
+            <a:ext cx="5759303" cy="3593591"/>
+            <a:chOff x="6291183" y="2582802"/>
+            <a:chExt cx="5759303" cy="3593591"/>
           </a:xfrm>
-          <a:prstGeom prst="rect">
-            <a:avLst/>
-          </a:prstGeom>
-          <a:noFill/>
-          <a:extLst>
-            <a:ext uri="{909E8E84-426E-40DD-AFC4-6F175D3DCCD1}">
-              <a14:hiddenFill xmlns:a14="http://schemas.microsoft.com/office/drawing/2010/main">
-                <a:solidFill>
-                  <a:srgbClr val="FFFFFF"/>
-                </a:solidFill>
-              </a14:hiddenFill>
-            </a:ext>
-          </a:extLst>
-        </p:spPr>
-      </p:pic>
+        </p:grpSpPr>
+        <p:pic>
+          <p:nvPicPr>
+            <p:cNvPr id="8" name="Picture 2">
+              <a:extLst>
+                <a:ext uri="{FF2B5EF4-FFF2-40B4-BE49-F238E27FC236}">
+                  <a16:creationId xmlns:a16="http://schemas.microsoft.com/office/drawing/2014/main" id="{C8B614F9-2858-419B-9086-E93EBEE084D5}"/>
+                </a:ext>
+              </a:extLst>
+            </p:cNvPr>
+            <p:cNvPicPr>
+              <a:picLocks noChangeAspect="1" noChangeArrowheads="1"/>
+            </p:cNvPicPr>
+            <p:nvPr/>
+          </p:nvPicPr>
+          <p:blipFill>
+            <a:blip r:embed="rId5">
+              <a:extLst>
+                <a:ext uri="{28A0092B-C50C-407E-A947-70E740481C1C}">
+                  <a14:useLocalDpi xmlns:a14="http://schemas.microsoft.com/office/drawing/2010/main" val="0"/>
+                </a:ext>
+              </a:extLst>
+            </a:blip>
+            <a:srcRect/>
+            <a:stretch>
+              <a:fillRect/>
+            </a:stretch>
+          </p:blipFill>
+          <p:spPr bwMode="auto">
+            <a:xfrm>
+              <a:off x="6291183" y="2582802"/>
+              <a:ext cx="5759303" cy="3593591"/>
+            </a:xfrm>
+            <a:prstGeom prst="rect">
+              <a:avLst/>
+            </a:prstGeom>
+            <a:noFill/>
+            <a:extLst>
+              <a:ext uri="{909E8E84-426E-40DD-AFC4-6F175D3DCCD1}">
+                <a14:hiddenFill xmlns:a14="http://schemas.microsoft.com/office/drawing/2010/main">
+                  <a:solidFill>
+                    <a:srgbClr val="FFFFFF"/>
+                  </a:solidFill>
+                </a14:hiddenFill>
+              </a:ext>
+            </a:extLst>
+          </p:spPr>
+        </p:pic>
+        <p:pic>
+          <p:nvPicPr>
+            <p:cNvPr id="9" name="Picture 4" descr="Daft Punk On 'The Soul That A Musician Can Bring' : NPR">
+              <a:extLst>
+                <a:ext uri="{FF2B5EF4-FFF2-40B4-BE49-F238E27FC236}">
+                  <a16:creationId xmlns:a16="http://schemas.microsoft.com/office/drawing/2014/main" id="{01F4B16A-4200-4098-9B30-C0E07A521C88}"/>
+                </a:ext>
+              </a:extLst>
+            </p:cNvPr>
+            <p:cNvPicPr>
+              <a:picLocks noChangeAspect="1" noChangeArrowheads="1"/>
+            </p:cNvPicPr>
+            <p:nvPr/>
+          </p:nvPicPr>
+          <p:blipFill rotWithShape="1">
+            <a:blip r:embed="rId6">
+              <a:extLst>
+                <a:ext uri="{28A0092B-C50C-407E-A947-70E740481C1C}">
+                  <a14:useLocalDpi xmlns:a14="http://schemas.microsoft.com/office/drawing/2010/main" val="0"/>
+                </a:ext>
+              </a:extLst>
+            </a:blip>
+            <a:srcRect l="11085" r="12796"/>
+            <a:stretch/>
+          </p:blipFill>
+          <p:spPr bwMode="auto">
+            <a:xfrm>
+              <a:off x="8427307" y="3195322"/>
+              <a:ext cx="2409569" cy="2368550"/>
+            </a:xfrm>
+            <a:prstGeom prst="rect">
+              <a:avLst/>
+            </a:prstGeom>
+            <a:noFill/>
+            <a:extLst>
+              <a:ext uri="{909E8E84-426E-40DD-AFC4-6F175D3DCCD1}">
+                <a14:hiddenFill xmlns:a14="http://schemas.microsoft.com/office/drawing/2010/main">
+                  <a:solidFill>
+                    <a:srgbClr val="FFFFFF"/>
+                  </a:solidFill>
+                </a14:hiddenFill>
+              </a:ext>
+            </a:extLst>
+          </p:spPr>
+        </p:pic>
+      </p:grpSp>
     </p:spTree>
     <p:extLst>
       <p:ext uri="{BB962C8B-B14F-4D97-AF65-F5344CB8AC3E}">
@@ -7165,53 +7231,121 @@
           </a:extLst>
         </p:spPr>
       </p:pic>
-      <p:pic>
-        <p:nvPicPr>
-          <p:cNvPr id="2052" name="Picture 4" descr="Loudness">
-            <a:extLst>
-              <a:ext uri="{FF2B5EF4-FFF2-40B4-BE49-F238E27FC236}">
-                <a16:creationId xmlns:a16="http://schemas.microsoft.com/office/drawing/2014/main" id="{EDDFE770-C63C-4CA2-8177-DEAB3553A1BD}"/>
-              </a:ext>
-            </a:extLst>
-          </p:cNvPr>
-          <p:cNvPicPr>
-            <a:picLocks noChangeAspect="1" noChangeArrowheads="1"/>
-          </p:cNvPicPr>
+      <p:grpSp>
+        <p:nvGrpSpPr>
+          <p:cNvPr id="6" name="Group 5">
+            <a:extLst>
+              <a:ext uri="{FF2B5EF4-FFF2-40B4-BE49-F238E27FC236}">
+                <a16:creationId xmlns:a16="http://schemas.microsoft.com/office/drawing/2014/main" id="{A0400C9A-D3A1-423B-827B-285C89484636}"/>
+              </a:ext>
+            </a:extLst>
+          </p:cNvPr>
+          <p:cNvGrpSpPr/>
           <p:nvPr/>
-        </p:nvPicPr>
-        <p:blipFill>
-          <a:blip r:embed="rId5">
-            <a:extLst>
-              <a:ext uri="{28A0092B-C50C-407E-A947-70E740481C1C}">
-                <a14:useLocalDpi xmlns:a14="http://schemas.microsoft.com/office/drawing/2010/main" val="0"/>
-              </a:ext>
-            </a:extLst>
-          </a:blip>
-          <a:srcRect/>
-          <a:stretch>
-            <a:fillRect/>
-          </a:stretch>
-        </p:blipFill>
-        <p:spPr bwMode="auto">
+        </p:nvGrpSpPr>
+        <p:grpSpPr>
           <a:xfrm>
-            <a:off x="5701553" y="3227438"/>
-            <a:ext cx="6023722" cy="3078112"/>
+            <a:off x="5670783" y="2662582"/>
+            <a:ext cx="5869303" cy="3957383"/>
+            <a:chOff x="6190736" y="2582803"/>
+            <a:chExt cx="5869303" cy="3957383"/>
           </a:xfrm>
-          <a:prstGeom prst="rect">
-            <a:avLst/>
-          </a:prstGeom>
-          <a:noFill/>
-          <a:extLst>
-            <a:ext uri="{909E8E84-426E-40DD-AFC4-6F175D3DCCD1}">
-              <a14:hiddenFill xmlns:a14="http://schemas.microsoft.com/office/drawing/2010/main">
-                <a:solidFill>
-                  <a:srgbClr val="FFFFFF"/>
-                </a:solidFill>
-              </a14:hiddenFill>
-            </a:ext>
-          </a:extLst>
-        </p:spPr>
-      </p:pic>
+        </p:grpSpPr>
+        <p:pic>
+          <p:nvPicPr>
+            <p:cNvPr id="7" name="Picture 2">
+              <a:extLst>
+                <a:ext uri="{FF2B5EF4-FFF2-40B4-BE49-F238E27FC236}">
+                  <a16:creationId xmlns:a16="http://schemas.microsoft.com/office/drawing/2014/main" id="{9F0AC139-DCD2-4123-81CC-D78C7B80A9A4}"/>
+                </a:ext>
+              </a:extLst>
+            </p:cNvPr>
+            <p:cNvPicPr>
+              <a:picLocks noChangeAspect="1" noChangeArrowheads="1"/>
+            </p:cNvPicPr>
+            <p:nvPr/>
+          </p:nvPicPr>
+          <p:blipFill>
+            <a:blip r:embed="rId5">
+              <a:extLst>
+                <a:ext uri="{28A0092B-C50C-407E-A947-70E740481C1C}">
+                  <a14:useLocalDpi xmlns:a14="http://schemas.microsoft.com/office/drawing/2010/main" val="0"/>
+                </a:ext>
+              </a:extLst>
+            </a:blip>
+            <a:srcRect/>
+            <a:stretch>
+              <a:fillRect/>
+            </a:stretch>
+          </p:blipFill>
+          <p:spPr bwMode="auto">
+            <a:xfrm>
+              <a:off x="6190736" y="2582803"/>
+              <a:ext cx="5869303" cy="3957383"/>
+            </a:xfrm>
+            <a:prstGeom prst="rect">
+              <a:avLst/>
+            </a:prstGeom>
+            <a:noFill/>
+            <a:extLst>
+              <a:ext uri="{909E8E84-426E-40DD-AFC4-6F175D3DCCD1}">
+                <a14:hiddenFill xmlns:a14="http://schemas.microsoft.com/office/drawing/2010/main">
+                  <a:solidFill>
+                    <a:srgbClr val="FFFFFF"/>
+                  </a:solidFill>
+                </a14:hiddenFill>
+              </a:ext>
+            </a:extLst>
+          </p:spPr>
+        </p:pic>
+        <p:pic>
+          <p:nvPicPr>
+            <p:cNvPr id="8" name="Picture 4">
+              <a:extLst>
+                <a:ext uri="{FF2B5EF4-FFF2-40B4-BE49-F238E27FC236}">
+                  <a16:creationId xmlns:a16="http://schemas.microsoft.com/office/drawing/2014/main" id="{63702922-7AA2-4CCF-8B90-54DE9842F3C5}"/>
+                </a:ext>
+              </a:extLst>
+            </p:cNvPr>
+            <p:cNvPicPr>
+              <a:picLocks noChangeAspect="1" noChangeArrowheads="1"/>
+            </p:cNvPicPr>
+            <p:nvPr/>
+          </p:nvPicPr>
+          <p:blipFill>
+            <a:blip r:embed="rId6">
+              <a:extLst>
+                <a:ext uri="{28A0092B-C50C-407E-A947-70E740481C1C}">
+                  <a14:useLocalDpi xmlns:a14="http://schemas.microsoft.com/office/drawing/2010/main" val="0"/>
+                </a:ext>
+              </a:extLst>
+            </a:blip>
+            <a:srcRect/>
+            <a:stretch>
+              <a:fillRect/>
+            </a:stretch>
+          </p:blipFill>
+          <p:spPr bwMode="auto">
+            <a:xfrm>
+              <a:off x="9638614" y="4757351"/>
+              <a:ext cx="2337796" cy="1509633"/>
+            </a:xfrm>
+            <a:prstGeom prst="rect">
+              <a:avLst/>
+            </a:prstGeom>
+            <a:noFill/>
+            <a:extLst>
+              <a:ext uri="{909E8E84-426E-40DD-AFC4-6F175D3DCCD1}">
+                <a14:hiddenFill xmlns:a14="http://schemas.microsoft.com/office/drawing/2010/main">
+                  <a:solidFill>
+                    <a:srgbClr val="FFFFFF"/>
+                  </a:solidFill>
+                </a14:hiddenFill>
+              </a:ext>
+            </a:extLst>
+          </p:spPr>
+        </p:pic>
+      </p:grpSp>
     </p:spTree>
     <p:extLst>
       <p:ext uri="{BB962C8B-B14F-4D97-AF65-F5344CB8AC3E}">

</xml_diff>